<commit_message>
Respect the existing --start option.
</commit_message>
<xml_diff>
--- a/report-generator/src/report_generator/presets/templates/objectives.pptx
+++ b/report-generator/src/report_generator/presets/templates/objectives.pptx
@@ -212,7 +212,7 @@
                 </a:outerShdw>
               </a:effectLst>
             </c:spPr>
-            <c:extLst xmlns:lc="http://schemas.openxmlformats.org/drawingml/2006/lockedCanvas" xmlns:comp="http://schemas.openxmlformats.org/drawingml/2006/compatibility" xmlns:we="http://schemas.microsoft.com/office/webextensions/webextension/2010/11" xmlns:wetp="http://schemas.microsoft.com/office/webextensions/taskpanes/2010/11" xmlns:w16cid="http://schemas.microsoft.com/office/word/2016/wordml/cid" xmlns:w16se="http://schemas.microsoft.com/office/word/2015/wordml/symex" xmlns:wps="http://schemas.microsoft.com/office/word/2010/wordprocessingShape" xmlns:b="http://schemas.openxmlformats.org/officeDocument/2006/bibliography" xmlns:odgm="http://opendope.org/SmartArt/DataHierarchy" xmlns:odi="http://opendope.org/components" xmlns:oda="http://opendope.org/answers" xmlns:odq="http://opendope.org/questions" xmlns:odc="http://opendope.org/conditions" xmlns:odx="http://opendope.org/xpaths" xmlns:cppr="http://schemas.microsoft.com/office/2006/coverPageProps" xmlns:pvml="urn:schemas-microsoft-com:office:powerpoint" xmlns:w10="urn:schemas-microsoft-com:office:word" xmlns:v="urn:schemas-microsoft-com:vml" xmlns:o="urn:schemas-microsoft-com:office:office" xmlns:xvml="urn:schemas-microsoft-com:office:excel" xmlns:dsp="http://schemas.microsoft.com/office/drawing/2008/diagram" xmlns:xdr="http://schemas.openxmlformats.org/drawingml/2006/spreadsheetDrawing" xmlns:pic="http://schemas.openxmlformats.org/drawingml/2006/picture" xmlns:dgm="http://schemas.openxmlformats.org/drawingml/2006/diagram" xmlns:c14="http://schemas.microsoft.com/office/drawing/2007/8/2/chart" xmlns:cdr="http://schemas.openxmlformats.org/drawingml/2006/chartDrawing" xmlns:wne="http://schemas.microsoft.com/office/word/2006/wordml" xmlns:sl="http://schemas.openxmlformats.org/schemaLibrary/2006/main" xmlns:mc="http://schemas.openxmlformats.org/markup-compatibility/2006" xmlns:wp14="http://schemas.microsoft.com/office/word/2010/wordprocessingDrawing" xmlns:wp="http://schemas.openxmlformats.org/drawingml/2006/wordprocessingDrawing" xmlns:m="http://schemas.openxmlformats.org/officeDocument/2006/math" xmlns:w14="http://schemas.microsoft.com/office/word/2010/wordml" xmlns:w15="http://schemas.microsoft.com/office/word/2012/wordml" xmlns:w="http://schemas.openxmlformats.org/wordprocessingml/2006/main">
+            <c:extLst xmlns:w="http://schemas.openxmlformats.org/wordprocessingml/2006/main" xmlns:w15="http://schemas.microsoft.com/office/word/2012/wordml" xmlns:w14="http://schemas.microsoft.com/office/word/2010/wordml" xmlns:m="http://schemas.openxmlformats.org/officeDocument/2006/math" xmlns:wp="http://schemas.openxmlformats.org/drawingml/2006/wordprocessingDrawing" xmlns:wp14="http://schemas.microsoft.com/office/word/2010/wordprocessingDrawing" xmlns:mc="http://schemas.openxmlformats.org/markup-compatibility/2006" xmlns:sl="http://schemas.openxmlformats.org/schemaLibrary/2006/main" xmlns:wne="http://schemas.microsoft.com/office/word/2006/wordml" xmlns:cdr="http://schemas.openxmlformats.org/drawingml/2006/chartDrawing" xmlns:c14="http://schemas.microsoft.com/office/drawing/2007/8/2/chart" xmlns:dgm="http://schemas.openxmlformats.org/drawingml/2006/diagram" xmlns:pic="http://schemas.openxmlformats.org/drawingml/2006/picture" xmlns:xdr="http://schemas.openxmlformats.org/drawingml/2006/spreadsheetDrawing" xmlns:dsp="http://schemas.microsoft.com/office/drawing/2008/diagram" xmlns:xvml="urn:schemas-microsoft-com:office:excel" xmlns:o="urn:schemas-microsoft-com:office:office" xmlns:v="urn:schemas-microsoft-com:vml" xmlns:w10="urn:schemas-microsoft-com:office:word" xmlns:pvml="urn:schemas-microsoft-com:office:powerpoint" xmlns:cppr="http://schemas.microsoft.com/office/2006/coverPageProps" xmlns:odx="http://opendope.org/xpaths" xmlns:odc="http://opendope.org/conditions" xmlns:odq="http://opendope.org/questions" xmlns:oda="http://opendope.org/answers" xmlns:odi="http://opendope.org/components" xmlns:odgm="http://opendope.org/SmartArt/DataHierarchy" xmlns:b="http://schemas.openxmlformats.org/officeDocument/2006/bibliography" xmlns:wps="http://schemas.microsoft.com/office/word/2010/wordprocessingShape" xmlns:w16se="http://schemas.microsoft.com/office/word/2015/wordml/symex" xmlns:w16cid="http://schemas.microsoft.com/office/word/2016/wordml/cid" xmlns:wetp="http://schemas.microsoft.com/office/webextensions/taskpanes/2010/11" xmlns:we="http://schemas.microsoft.com/office/webextensions/webextension/2010/11" xmlns:comp="http://schemas.openxmlformats.org/drawingml/2006/compatibility" xmlns:lc="http://schemas.openxmlformats.org/drawingml/2006/lockedCanvas">
               <c:ext xmlns:c16="http://schemas.microsoft.com/office/drawing/2014/chart" uri="{C3380CC4-5D6E-409C-BE32-E72D297353CC}">
                 <c16:uniqueId val="{00000001-6147-E74A-AA7B-5531F0E4EE0C}"/>
               </c:ext>
@@ -241,7 +241,7 @@
               </c:numCache>
             </c:numRef>
           </c:val>
-          <c:extLst xmlns:lc="http://schemas.openxmlformats.org/drawingml/2006/lockedCanvas" xmlns:comp="http://schemas.openxmlformats.org/drawingml/2006/compatibility" xmlns:we="http://schemas.microsoft.com/office/webextensions/webextension/2010/11" xmlns:wetp="http://schemas.microsoft.com/office/webextensions/taskpanes/2010/11" xmlns:w16cid="http://schemas.microsoft.com/office/word/2016/wordml/cid" xmlns:w16se="http://schemas.microsoft.com/office/word/2015/wordml/symex" xmlns:wps="http://schemas.microsoft.com/office/word/2010/wordprocessingShape" xmlns:b="http://schemas.openxmlformats.org/officeDocument/2006/bibliography" xmlns:odgm="http://opendope.org/SmartArt/DataHierarchy" xmlns:odi="http://opendope.org/components" xmlns:oda="http://opendope.org/answers" xmlns:odq="http://opendope.org/questions" xmlns:odc="http://opendope.org/conditions" xmlns:odx="http://opendope.org/xpaths" xmlns:cppr="http://schemas.microsoft.com/office/2006/coverPageProps" xmlns:pvml="urn:schemas-microsoft-com:office:powerpoint" xmlns:w10="urn:schemas-microsoft-com:office:word" xmlns:v="urn:schemas-microsoft-com:vml" xmlns:o="urn:schemas-microsoft-com:office:office" xmlns:xvml="urn:schemas-microsoft-com:office:excel" xmlns:dsp="http://schemas.microsoft.com/office/drawing/2008/diagram" xmlns:xdr="http://schemas.openxmlformats.org/drawingml/2006/spreadsheetDrawing" xmlns:pic="http://schemas.openxmlformats.org/drawingml/2006/picture" xmlns:dgm="http://schemas.openxmlformats.org/drawingml/2006/diagram" xmlns:c14="http://schemas.microsoft.com/office/drawing/2007/8/2/chart" xmlns:cdr="http://schemas.openxmlformats.org/drawingml/2006/chartDrawing" xmlns:wne="http://schemas.microsoft.com/office/word/2006/wordml" xmlns:sl="http://schemas.openxmlformats.org/schemaLibrary/2006/main" xmlns:mc="http://schemas.openxmlformats.org/markup-compatibility/2006" xmlns:wp14="http://schemas.microsoft.com/office/word/2010/wordprocessingDrawing" xmlns:wp="http://schemas.openxmlformats.org/drawingml/2006/wordprocessingDrawing" xmlns:m="http://schemas.openxmlformats.org/officeDocument/2006/math" xmlns:w14="http://schemas.microsoft.com/office/word/2010/wordml" xmlns:w15="http://schemas.microsoft.com/office/word/2012/wordml" xmlns:w="http://schemas.openxmlformats.org/wordprocessingml/2006/main">
+          <c:extLst xmlns:w="http://schemas.openxmlformats.org/wordprocessingml/2006/main" xmlns:w15="http://schemas.microsoft.com/office/word/2012/wordml" xmlns:w14="http://schemas.microsoft.com/office/word/2010/wordml" xmlns:m="http://schemas.openxmlformats.org/officeDocument/2006/math" xmlns:wp="http://schemas.openxmlformats.org/drawingml/2006/wordprocessingDrawing" xmlns:wp14="http://schemas.microsoft.com/office/word/2010/wordprocessingDrawing" xmlns:mc="http://schemas.openxmlformats.org/markup-compatibility/2006" xmlns:sl="http://schemas.openxmlformats.org/schemaLibrary/2006/main" xmlns:wne="http://schemas.microsoft.com/office/word/2006/wordml" xmlns:cdr="http://schemas.openxmlformats.org/drawingml/2006/chartDrawing" xmlns:c14="http://schemas.microsoft.com/office/drawing/2007/8/2/chart" xmlns:dgm="http://schemas.openxmlformats.org/drawingml/2006/diagram" xmlns:pic="http://schemas.openxmlformats.org/drawingml/2006/picture" xmlns:xdr="http://schemas.openxmlformats.org/drawingml/2006/spreadsheetDrawing" xmlns:dsp="http://schemas.microsoft.com/office/drawing/2008/diagram" xmlns:xvml="urn:schemas-microsoft-com:office:excel" xmlns:o="urn:schemas-microsoft-com:office:office" xmlns:v="urn:schemas-microsoft-com:vml" xmlns:w10="urn:schemas-microsoft-com:office:word" xmlns:pvml="urn:schemas-microsoft-com:office:powerpoint" xmlns:cppr="http://schemas.microsoft.com/office/2006/coverPageProps" xmlns:odx="http://opendope.org/xpaths" xmlns:odc="http://opendope.org/conditions" xmlns:odq="http://opendope.org/questions" xmlns:oda="http://opendope.org/answers" xmlns:odi="http://opendope.org/components" xmlns:odgm="http://opendope.org/SmartArt/DataHierarchy" xmlns:b="http://schemas.openxmlformats.org/officeDocument/2006/bibliography" xmlns:wps="http://schemas.microsoft.com/office/word/2010/wordprocessingShape" xmlns:w16se="http://schemas.microsoft.com/office/word/2015/wordml/symex" xmlns:w16cid="http://schemas.microsoft.com/office/word/2016/wordml/cid" xmlns:wetp="http://schemas.microsoft.com/office/webextensions/taskpanes/2010/11" xmlns:we="http://schemas.microsoft.com/office/webextensions/webextension/2010/11" xmlns:comp="http://schemas.openxmlformats.org/drawingml/2006/compatibility" xmlns:lc="http://schemas.openxmlformats.org/drawingml/2006/lockedCanvas">
             <c:ext xmlns:c16="http://schemas.microsoft.com/office/drawing/2014/chart" uri="{C3380CC4-5D6E-409C-BE32-E72D297353CC}">
               <c16:uniqueId val="{00000002-6147-E74A-AA7B-5531F0E4EE0C}"/>
             </c:ext>
@@ -557,7 +557,7 @@
     </c:plotArea>
     <c:plotVisOnly val="1"/>
     <c:dispBlanksAs val="gap"/>
-    <c:extLst xmlns:lc="http://schemas.openxmlformats.org/drawingml/2006/lockedCanvas" xmlns:comp="http://schemas.openxmlformats.org/drawingml/2006/compatibility" xmlns:we="http://schemas.microsoft.com/office/webextensions/webextension/2010/11" xmlns:wetp="http://schemas.microsoft.com/office/webextensions/taskpanes/2010/11" xmlns:w16cid="http://schemas.microsoft.com/office/word/2016/wordml/cid" xmlns:w16se="http://schemas.microsoft.com/office/word/2015/wordml/symex" xmlns:wps="http://schemas.microsoft.com/office/word/2010/wordprocessingShape" xmlns:b="http://schemas.openxmlformats.org/officeDocument/2006/bibliography" xmlns:odgm="http://opendope.org/SmartArt/DataHierarchy" xmlns:odi="http://opendope.org/components" xmlns:oda="http://opendope.org/answers" xmlns:odq="http://opendope.org/questions" xmlns:odc="http://opendope.org/conditions" xmlns:odx="http://opendope.org/xpaths" xmlns:cppr="http://schemas.microsoft.com/office/2006/coverPageProps" xmlns:pvml="urn:schemas-microsoft-com:office:powerpoint" xmlns:w10="urn:schemas-microsoft-com:office:word" xmlns:v="urn:schemas-microsoft-com:vml" xmlns:o="urn:schemas-microsoft-com:office:office" xmlns:xvml="urn:schemas-microsoft-com:office:excel" xmlns:dsp="http://schemas.microsoft.com/office/drawing/2008/diagram" xmlns:xdr="http://schemas.openxmlformats.org/drawingml/2006/spreadsheetDrawing" xmlns:pic="http://schemas.openxmlformats.org/drawingml/2006/picture" xmlns:dgm="http://schemas.openxmlformats.org/drawingml/2006/diagram" xmlns:c14="http://schemas.microsoft.com/office/drawing/2007/8/2/chart" xmlns:cdr="http://schemas.openxmlformats.org/drawingml/2006/chartDrawing" xmlns:wne="http://schemas.microsoft.com/office/word/2006/wordml" xmlns:sl="http://schemas.openxmlformats.org/schemaLibrary/2006/main" xmlns:mc="http://schemas.openxmlformats.org/markup-compatibility/2006" xmlns:wp14="http://schemas.microsoft.com/office/word/2010/wordprocessingDrawing" xmlns:wp="http://schemas.openxmlformats.org/drawingml/2006/wordprocessingDrawing" xmlns:m="http://schemas.openxmlformats.org/officeDocument/2006/math" xmlns:w14="http://schemas.microsoft.com/office/word/2010/wordml" xmlns:w15="http://schemas.microsoft.com/office/word/2012/wordml" xmlns:w="http://schemas.openxmlformats.org/wordprocessingml/2006/main">
+    <c:extLst xmlns:w="http://schemas.openxmlformats.org/wordprocessingml/2006/main" xmlns:w15="http://schemas.microsoft.com/office/word/2012/wordml" xmlns:w14="http://schemas.microsoft.com/office/word/2010/wordml" xmlns:m="http://schemas.openxmlformats.org/officeDocument/2006/math" xmlns:wp="http://schemas.openxmlformats.org/drawingml/2006/wordprocessingDrawing" xmlns:wp14="http://schemas.microsoft.com/office/word/2010/wordprocessingDrawing" xmlns:mc="http://schemas.openxmlformats.org/markup-compatibility/2006" xmlns:sl="http://schemas.openxmlformats.org/schemaLibrary/2006/main" xmlns:wne="http://schemas.microsoft.com/office/word/2006/wordml" xmlns:cdr="http://schemas.openxmlformats.org/drawingml/2006/chartDrawing" xmlns:c14="http://schemas.microsoft.com/office/drawing/2007/8/2/chart" xmlns:dgm="http://schemas.openxmlformats.org/drawingml/2006/diagram" xmlns:pic="http://schemas.openxmlformats.org/drawingml/2006/picture" xmlns:xdr="http://schemas.openxmlformats.org/drawingml/2006/spreadsheetDrawing" xmlns:dsp="http://schemas.microsoft.com/office/drawing/2008/diagram" xmlns:xvml="urn:schemas-microsoft-com:office:excel" xmlns:o="urn:schemas-microsoft-com:office:office" xmlns:v="urn:schemas-microsoft-com:vml" xmlns:w10="urn:schemas-microsoft-com:office:word" xmlns:pvml="urn:schemas-microsoft-com:office:powerpoint" xmlns:cppr="http://schemas.microsoft.com/office/2006/coverPageProps" xmlns:odx="http://opendope.org/xpaths" xmlns:odc="http://opendope.org/conditions" xmlns:odq="http://opendope.org/questions" xmlns:oda="http://opendope.org/answers" xmlns:odi="http://opendope.org/components" xmlns:odgm="http://opendope.org/SmartArt/DataHierarchy" xmlns:b="http://schemas.openxmlformats.org/officeDocument/2006/bibliography" xmlns:wps="http://schemas.microsoft.com/office/word/2010/wordprocessingShape" xmlns:w16se="http://schemas.microsoft.com/office/word/2015/wordml/symex" xmlns:w16cid="http://schemas.microsoft.com/office/word/2016/wordml/cid" xmlns:wetp="http://schemas.microsoft.com/office/webextensions/taskpanes/2010/11" xmlns:we="http://schemas.microsoft.com/office/webextensions/webextension/2010/11" xmlns:comp="http://schemas.openxmlformats.org/drawingml/2006/compatibility" xmlns:lc="http://schemas.openxmlformats.org/drawingml/2006/lockedCanvas">
       <c:ext xmlns:c16r3="http://schemas.microsoft.com/office/drawing/2017/03/chart" uri="{56B9EC1D-385E-4148-901F-78D8002777C0}">
         <c16r3:dataDisplayOptions16>
           <c16r3:dispNaAsBlank val="1"/>
@@ -660,7 +660,7 @@
                 </a:outerShdw>
               </a:effectLst>
             </c:spPr>
-            <c:extLst xmlns:w="http://schemas.openxmlformats.org/wordprocessingml/2006/main" xmlns:w15="http://schemas.microsoft.com/office/word/2012/wordml" xmlns:w14="http://schemas.microsoft.com/office/word/2010/wordml" xmlns:m="http://schemas.openxmlformats.org/officeDocument/2006/math" xmlns:wp="http://schemas.openxmlformats.org/drawingml/2006/wordprocessingDrawing" xmlns:wp14="http://schemas.microsoft.com/office/word/2010/wordprocessingDrawing" xmlns:mc="http://schemas.openxmlformats.org/markup-compatibility/2006" xmlns:sl="http://schemas.openxmlformats.org/schemaLibrary/2006/main" xmlns:wne="http://schemas.microsoft.com/office/word/2006/wordml" xmlns:cdr="http://schemas.openxmlformats.org/drawingml/2006/chartDrawing" xmlns:c14="http://schemas.microsoft.com/office/drawing/2007/8/2/chart" xmlns:dgm="http://schemas.openxmlformats.org/drawingml/2006/diagram" xmlns:pic="http://schemas.openxmlformats.org/drawingml/2006/picture" xmlns:xdr="http://schemas.openxmlformats.org/drawingml/2006/spreadsheetDrawing" xmlns:dsp="http://schemas.microsoft.com/office/drawing/2008/diagram" xmlns:xvml="urn:schemas-microsoft-com:office:excel" xmlns:o="urn:schemas-microsoft-com:office:office" xmlns:v="urn:schemas-microsoft-com:vml" xmlns:w10="urn:schemas-microsoft-com:office:word" xmlns:pvml="urn:schemas-microsoft-com:office:powerpoint" xmlns:cppr="http://schemas.microsoft.com/office/2006/coverPageProps" xmlns:odx="http://opendope.org/xpaths" xmlns:odc="http://opendope.org/conditions" xmlns:odq="http://opendope.org/questions" xmlns:oda="http://opendope.org/answers" xmlns:odi="http://opendope.org/components" xmlns:odgm="http://opendope.org/SmartArt/DataHierarchy" xmlns:b="http://schemas.openxmlformats.org/officeDocument/2006/bibliography" xmlns:wps="http://schemas.microsoft.com/office/word/2010/wordprocessingShape" xmlns:w16se="http://schemas.microsoft.com/office/word/2015/wordml/symex" xmlns:w16cid="http://schemas.microsoft.com/office/word/2016/wordml/cid" xmlns:wetp="http://schemas.microsoft.com/office/webextensions/taskpanes/2010/11" xmlns:we="http://schemas.microsoft.com/office/webextensions/webextension/2010/11" xmlns:comp="http://schemas.openxmlformats.org/drawingml/2006/compatibility" xmlns:lc="http://schemas.openxmlformats.org/drawingml/2006/lockedCanvas">
+            <c:extLst xmlns:lc="http://schemas.openxmlformats.org/drawingml/2006/lockedCanvas" xmlns:comp="http://schemas.openxmlformats.org/drawingml/2006/compatibility" xmlns:we="http://schemas.microsoft.com/office/webextensions/webextension/2010/11" xmlns:wetp="http://schemas.microsoft.com/office/webextensions/taskpanes/2010/11" xmlns:w16cid="http://schemas.microsoft.com/office/word/2016/wordml/cid" xmlns:w16se="http://schemas.microsoft.com/office/word/2015/wordml/symex" xmlns:wps="http://schemas.microsoft.com/office/word/2010/wordprocessingShape" xmlns:b="http://schemas.openxmlformats.org/officeDocument/2006/bibliography" xmlns:odgm="http://opendope.org/SmartArt/DataHierarchy" xmlns:odi="http://opendope.org/components" xmlns:oda="http://opendope.org/answers" xmlns:odq="http://opendope.org/questions" xmlns:odc="http://opendope.org/conditions" xmlns:odx="http://opendope.org/xpaths" xmlns:cppr="http://schemas.microsoft.com/office/2006/coverPageProps" xmlns:pvml="urn:schemas-microsoft-com:office:powerpoint" xmlns:w10="urn:schemas-microsoft-com:office:word" xmlns:v="urn:schemas-microsoft-com:vml" xmlns:o="urn:schemas-microsoft-com:office:office" xmlns:xvml="urn:schemas-microsoft-com:office:excel" xmlns:dsp="http://schemas.microsoft.com/office/drawing/2008/diagram" xmlns:xdr="http://schemas.openxmlformats.org/drawingml/2006/spreadsheetDrawing" xmlns:pic="http://schemas.openxmlformats.org/drawingml/2006/picture" xmlns:dgm="http://schemas.openxmlformats.org/drawingml/2006/diagram" xmlns:c14="http://schemas.microsoft.com/office/drawing/2007/8/2/chart" xmlns:cdr="http://schemas.openxmlformats.org/drawingml/2006/chartDrawing" xmlns:wne="http://schemas.microsoft.com/office/word/2006/wordml" xmlns:sl="http://schemas.openxmlformats.org/schemaLibrary/2006/main" xmlns:mc="http://schemas.openxmlformats.org/markup-compatibility/2006" xmlns:wp14="http://schemas.microsoft.com/office/word/2010/wordprocessingDrawing" xmlns:wp="http://schemas.openxmlformats.org/drawingml/2006/wordprocessingDrawing" xmlns:m="http://schemas.openxmlformats.org/officeDocument/2006/math" xmlns:w14="http://schemas.microsoft.com/office/word/2010/wordml" xmlns:w15="http://schemas.microsoft.com/office/word/2012/wordml" xmlns:w="http://schemas.openxmlformats.org/wordprocessingml/2006/main">
               <c:ext xmlns:c16="http://schemas.microsoft.com/office/drawing/2014/chart" uri="{C3380CC4-5D6E-409C-BE32-E72D297353CC}">
                 <c16:uniqueId val="{00000001-6147-E74A-AA7B-5531F0E4EE0C}"/>
               </c:ext>
@@ -743,7 +743,7 @@
               </c:numCache>
             </c:numRef>
           </c:val>
-          <c:extLst xmlns:w="http://schemas.openxmlformats.org/wordprocessingml/2006/main" xmlns:w15="http://schemas.microsoft.com/office/word/2012/wordml" xmlns:w14="http://schemas.microsoft.com/office/word/2010/wordml" xmlns:m="http://schemas.openxmlformats.org/officeDocument/2006/math" xmlns:wp="http://schemas.openxmlformats.org/drawingml/2006/wordprocessingDrawing" xmlns:wp14="http://schemas.microsoft.com/office/word/2010/wordprocessingDrawing" xmlns:mc="http://schemas.openxmlformats.org/markup-compatibility/2006" xmlns:sl="http://schemas.openxmlformats.org/schemaLibrary/2006/main" xmlns:wne="http://schemas.microsoft.com/office/word/2006/wordml" xmlns:cdr="http://schemas.openxmlformats.org/drawingml/2006/chartDrawing" xmlns:c14="http://schemas.microsoft.com/office/drawing/2007/8/2/chart" xmlns:dgm="http://schemas.openxmlformats.org/drawingml/2006/diagram" xmlns:pic="http://schemas.openxmlformats.org/drawingml/2006/picture" xmlns:xdr="http://schemas.openxmlformats.org/drawingml/2006/spreadsheetDrawing" xmlns:dsp="http://schemas.microsoft.com/office/drawing/2008/diagram" xmlns:xvml="urn:schemas-microsoft-com:office:excel" xmlns:o="urn:schemas-microsoft-com:office:office" xmlns:v="urn:schemas-microsoft-com:vml" xmlns:w10="urn:schemas-microsoft-com:office:word" xmlns:pvml="urn:schemas-microsoft-com:office:powerpoint" xmlns:cppr="http://schemas.microsoft.com/office/2006/coverPageProps" xmlns:odx="http://opendope.org/xpaths" xmlns:odc="http://opendope.org/conditions" xmlns:odq="http://opendope.org/questions" xmlns:oda="http://opendope.org/answers" xmlns:odi="http://opendope.org/components" xmlns:odgm="http://opendope.org/SmartArt/DataHierarchy" xmlns:b="http://schemas.openxmlformats.org/officeDocument/2006/bibliography" xmlns:wps="http://schemas.microsoft.com/office/word/2010/wordprocessingShape" xmlns:w16se="http://schemas.microsoft.com/office/word/2015/wordml/symex" xmlns:w16cid="http://schemas.microsoft.com/office/word/2016/wordml/cid" xmlns:wetp="http://schemas.microsoft.com/office/webextensions/taskpanes/2010/11" xmlns:we="http://schemas.microsoft.com/office/webextensions/webextension/2010/11" xmlns:comp="http://schemas.openxmlformats.org/drawingml/2006/compatibility" xmlns:lc="http://schemas.openxmlformats.org/drawingml/2006/lockedCanvas">
+          <c:extLst xmlns:lc="http://schemas.openxmlformats.org/drawingml/2006/lockedCanvas" xmlns:comp="http://schemas.openxmlformats.org/drawingml/2006/compatibility" xmlns:we="http://schemas.microsoft.com/office/webextensions/webextension/2010/11" xmlns:wetp="http://schemas.microsoft.com/office/webextensions/taskpanes/2010/11" xmlns:w16cid="http://schemas.microsoft.com/office/word/2016/wordml/cid" xmlns:w16se="http://schemas.microsoft.com/office/word/2015/wordml/symex" xmlns:wps="http://schemas.microsoft.com/office/word/2010/wordprocessingShape" xmlns:b="http://schemas.openxmlformats.org/officeDocument/2006/bibliography" xmlns:odgm="http://opendope.org/SmartArt/DataHierarchy" xmlns:odi="http://opendope.org/components" xmlns:oda="http://opendope.org/answers" xmlns:odq="http://opendope.org/questions" xmlns:odc="http://opendope.org/conditions" xmlns:odx="http://opendope.org/xpaths" xmlns:cppr="http://schemas.microsoft.com/office/2006/coverPageProps" xmlns:pvml="urn:schemas-microsoft-com:office:powerpoint" xmlns:w10="urn:schemas-microsoft-com:office:word" xmlns:v="urn:schemas-microsoft-com:vml" xmlns:o="urn:schemas-microsoft-com:office:office" xmlns:xvml="urn:schemas-microsoft-com:office:excel" xmlns:dsp="http://schemas.microsoft.com/office/drawing/2008/diagram" xmlns:xdr="http://schemas.openxmlformats.org/drawingml/2006/spreadsheetDrawing" xmlns:pic="http://schemas.openxmlformats.org/drawingml/2006/picture" xmlns:dgm="http://schemas.openxmlformats.org/drawingml/2006/diagram" xmlns:c14="http://schemas.microsoft.com/office/drawing/2007/8/2/chart" xmlns:cdr="http://schemas.openxmlformats.org/drawingml/2006/chartDrawing" xmlns:wne="http://schemas.microsoft.com/office/word/2006/wordml" xmlns:sl="http://schemas.openxmlformats.org/schemaLibrary/2006/main" xmlns:mc="http://schemas.openxmlformats.org/markup-compatibility/2006" xmlns:wp14="http://schemas.microsoft.com/office/word/2010/wordprocessingDrawing" xmlns:wp="http://schemas.openxmlformats.org/drawingml/2006/wordprocessingDrawing" xmlns:m="http://schemas.openxmlformats.org/officeDocument/2006/math" xmlns:w14="http://schemas.microsoft.com/office/word/2010/wordml" xmlns:w15="http://schemas.microsoft.com/office/word/2012/wordml" xmlns:w="http://schemas.openxmlformats.org/wordprocessingml/2006/main">
             <c:ext xmlns:c16="http://schemas.microsoft.com/office/drawing/2014/chart" uri="{C3380CC4-5D6E-409C-BE32-E72D297353CC}">
               <c16:uniqueId val="{00000002-6147-E74A-AA7B-5531F0E4EE0C}"/>
             </c:ext>
@@ -1305,7 +1305,7 @@
     </c:plotArea>
     <c:plotVisOnly val="1"/>
     <c:dispBlanksAs val="gap"/>
-    <c:extLst xmlns:w="http://schemas.openxmlformats.org/wordprocessingml/2006/main" xmlns:w15="http://schemas.microsoft.com/office/word/2012/wordml" xmlns:w14="http://schemas.microsoft.com/office/word/2010/wordml" xmlns:m="http://schemas.openxmlformats.org/officeDocument/2006/math" xmlns:wp="http://schemas.openxmlformats.org/drawingml/2006/wordprocessingDrawing" xmlns:wp14="http://schemas.microsoft.com/office/word/2010/wordprocessingDrawing" xmlns:mc="http://schemas.openxmlformats.org/markup-compatibility/2006" xmlns:sl="http://schemas.openxmlformats.org/schemaLibrary/2006/main" xmlns:wne="http://schemas.microsoft.com/office/word/2006/wordml" xmlns:cdr="http://schemas.openxmlformats.org/drawingml/2006/chartDrawing" xmlns:c14="http://schemas.microsoft.com/office/drawing/2007/8/2/chart" xmlns:dgm="http://schemas.openxmlformats.org/drawingml/2006/diagram" xmlns:pic="http://schemas.openxmlformats.org/drawingml/2006/picture" xmlns:xdr="http://schemas.openxmlformats.org/drawingml/2006/spreadsheetDrawing" xmlns:dsp="http://schemas.microsoft.com/office/drawing/2008/diagram" xmlns:xvml="urn:schemas-microsoft-com:office:excel" xmlns:o="urn:schemas-microsoft-com:office:office" xmlns:v="urn:schemas-microsoft-com:vml" xmlns:w10="urn:schemas-microsoft-com:office:word" xmlns:pvml="urn:schemas-microsoft-com:office:powerpoint" xmlns:cppr="http://schemas.microsoft.com/office/2006/coverPageProps" xmlns:odx="http://opendope.org/xpaths" xmlns:odc="http://opendope.org/conditions" xmlns:odq="http://opendope.org/questions" xmlns:oda="http://opendope.org/answers" xmlns:odi="http://opendope.org/components" xmlns:odgm="http://opendope.org/SmartArt/DataHierarchy" xmlns:b="http://schemas.openxmlformats.org/officeDocument/2006/bibliography" xmlns:wps="http://schemas.microsoft.com/office/word/2010/wordprocessingShape" xmlns:w16se="http://schemas.microsoft.com/office/word/2015/wordml/symex" xmlns:w16cid="http://schemas.microsoft.com/office/word/2016/wordml/cid" xmlns:wetp="http://schemas.microsoft.com/office/webextensions/taskpanes/2010/11" xmlns:we="http://schemas.microsoft.com/office/webextensions/webextension/2010/11" xmlns:comp="http://schemas.openxmlformats.org/drawingml/2006/compatibility" xmlns:lc="http://schemas.openxmlformats.org/drawingml/2006/lockedCanvas">
+    <c:extLst xmlns:lc="http://schemas.openxmlformats.org/drawingml/2006/lockedCanvas" xmlns:comp="http://schemas.openxmlformats.org/drawingml/2006/compatibility" xmlns:we="http://schemas.microsoft.com/office/webextensions/webextension/2010/11" xmlns:wetp="http://schemas.microsoft.com/office/webextensions/taskpanes/2010/11" xmlns:w16cid="http://schemas.microsoft.com/office/word/2016/wordml/cid" xmlns:w16se="http://schemas.microsoft.com/office/word/2015/wordml/symex" xmlns:wps="http://schemas.microsoft.com/office/word/2010/wordprocessingShape" xmlns:b="http://schemas.openxmlformats.org/officeDocument/2006/bibliography" xmlns:odgm="http://opendope.org/SmartArt/DataHierarchy" xmlns:odi="http://opendope.org/components" xmlns:oda="http://opendope.org/answers" xmlns:odq="http://opendope.org/questions" xmlns:odc="http://opendope.org/conditions" xmlns:odx="http://opendope.org/xpaths" xmlns:cppr="http://schemas.microsoft.com/office/2006/coverPageProps" xmlns:pvml="urn:schemas-microsoft-com:office:powerpoint" xmlns:w10="urn:schemas-microsoft-com:office:word" xmlns:v="urn:schemas-microsoft-com:vml" xmlns:o="urn:schemas-microsoft-com:office:office" xmlns:xvml="urn:schemas-microsoft-com:office:excel" xmlns:dsp="http://schemas.microsoft.com/office/drawing/2008/diagram" xmlns:xdr="http://schemas.openxmlformats.org/drawingml/2006/spreadsheetDrawing" xmlns:pic="http://schemas.openxmlformats.org/drawingml/2006/picture" xmlns:dgm="http://schemas.openxmlformats.org/drawingml/2006/diagram" xmlns:c14="http://schemas.microsoft.com/office/drawing/2007/8/2/chart" xmlns:cdr="http://schemas.openxmlformats.org/drawingml/2006/chartDrawing" xmlns:wne="http://schemas.microsoft.com/office/word/2006/wordml" xmlns:sl="http://schemas.openxmlformats.org/schemaLibrary/2006/main" xmlns:mc="http://schemas.openxmlformats.org/markup-compatibility/2006" xmlns:wp14="http://schemas.microsoft.com/office/word/2010/wordprocessingDrawing" xmlns:wp="http://schemas.openxmlformats.org/drawingml/2006/wordprocessingDrawing" xmlns:m="http://schemas.openxmlformats.org/officeDocument/2006/math" xmlns:w14="http://schemas.microsoft.com/office/word/2010/wordml" xmlns:w15="http://schemas.microsoft.com/office/word/2012/wordml" xmlns:w="http://schemas.openxmlformats.org/wordprocessingml/2006/main">
       <c:ext xmlns:c16r3="http://schemas.microsoft.com/office/drawing/2017/03/chart" uri="{56B9EC1D-385E-4148-901F-78D8002777C0}">
         <c16r3:dataDisplayOptions16>
           <c16r3:dispNaAsBlank val="1"/>
@@ -1408,7 +1408,7 @@
                 </a:outerShdw>
               </a:effectLst>
             </c:spPr>
-            <c:extLst xmlns:w="http://schemas.openxmlformats.org/wordprocessingml/2006/main" xmlns:w15="http://schemas.microsoft.com/office/word/2012/wordml" xmlns:w14="http://schemas.microsoft.com/office/word/2010/wordml" xmlns:m="http://schemas.openxmlformats.org/officeDocument/2006/math" xmlns:wp="http://schemas.openxmlformats.org/drawingml/2006/wordprocessingDrawing" xmlns:wp14="http://schemas.microsoft.com/office/word/2010/wordprocessingDrawing" xmlns:mc="http://schemas.openxmlformats.org/markup-compatibility/2006" xmlns:sl="http://schemas.openxmlformats.org/schemaLibrary/2006/main" xmlns:wne="http://schemas.microsoft.com/office/word/2006/wordml" xmlns:cdr="http://schemas.openxmlformats.org/drawingml/2006/chartDrawing" xmlns:c14="http://schemas.microsoft.com/office/drawing/2007/8/2/chart" xmlns:dgm="http://schemas.openxmlformats.org/drawingml/2006/diagram" xmlns:pic="http://schemas.openxmlformats.org/drawingml/2006/picture" xmlns:xdr="http://schemas.openxmlformats.org/drawingml/2006/spreadsheetDrawing" xmlns:dsp="http://schemas.microsoft.com/office/drawing/2008/diagram" xmlns:xvml="urn:schemas-microsoft-com:office:excel" xmlns:o="urn:schemas-microsoft-com:office:office" xmlns:v="urn:schemas-microsoft-com:vml" xmlns:w10="urn:schemas-microsoft-com:office:word" xmlns:pvml="urn:schemas-microsoft-com:office:powerpoint" xmlns:cppr="http://schemas.microsoft.com/office/2006/coverPageProps" xmlns:odx="http://opendope.org/xpaths" xmlns:odc="http://opendope.org/conditions" xmlns:odq="http://opendope.org/questions" xmlns:oda="http://opendope.org/answers" xmlns:odi="http://opendope.org/components" xmlns:odgm="http://opendope.org/SmartArt/DataHierarchy" xmlns:b="http://schemas.openxmlformats.org/officeDocument/2006/bibliography" xmlns:wps="http://schemas.microsoft.com/office/word/2010/wordprocessingShape" xmlns:w16se="http://schemas.microsoft.com/office/word/2015/wordml/symex" xmlns:w16cid="http://schemas.microsoft.com/office/word/2016/wordml/cid" xmlns:wetp="http://schemas.microsoft.com/office/webextensions/taskpanes/2010/11" xmlns:we="http://schemas.microsoft.com/office/webextensions/webextension/2010/11" xmlns:comp="http://schemas.openxmlformats.org/drawingml/2006/compatibility" xmlns:lc="http://schemas.openxmlformats.org/drawingml/2006/lockedCanvas">
+            <c:extLst xmlns:lc="http://schemas.openxmlformats.org/drawingml/2006/lockedCanvas" xmlns:comp="http://schemas.openxmlformats.org/drawingml/2006/compatibility" xmlns:we="http://schemas.microsoft.com/office/webextensions/webextension/2010/11" xmlns:wetp="http://schemas.microsoft.com/office/webextensions/taskpanes/2010/11" xmlns:w16cid="http://schemas.microsoft.com/office/word/2016/wordml/cid" xmlns:w16se="http://schemas.microsoft.com/office/word/2015/wordml/symex" xmlns:wps="http://schemas.microsoft.com/office/word/2010/wordprocessingShape" xmlns:b="http://schemas.openxmlformats.org/officeDocument/2006/bibliography" xmlns:odgm="http://opendope.org/SmartArt/DataHierarchy" xmlns:odi="http://opendope.org/components" xmlns:oda="http://opendope.org/answers" xmlns:odq="http://opendope.org/questions" xmlns:odc="http://opendope.org/conditions" xmlns:odx="http://opendope.org/xpaths" xmlns:cppr="http://schemas.microsoft.com/office/2006/coverPageProps" xmlns:pvml="urn:schemas-microsoft-com:office:powerpoint" xmlns:w10="urn:schemas-microsoft-com:office:word" xmlns:v="urn:schemas-microsoft-com:vml" xmlns:o="urn:schemas-microsoft-com:office:office" xmlns:xvml="urn:schemas-microsoft-com:office:excel" xmlns:dsp="http://schemas.microsoft.com/office/drawing/2008/diagram" xmlns:xdr="http://schemas.openxmlformats.org/drawingml/2006/spreadsheetDrawing" xmlns:pic="http://schemas.openxmlformats.org/drawingml/2006/picture" xmlns:dgm="http://schemas.openxmlformats.org/drawingml/2006/diagram" xmlns:c14="http://schemas.microsoft.com/office/drawing/2007/8/2/chart" xmlns:cdr="http://schemas.openxmlformats.org/drawingml/2006/chartDrawing" xmlns:wne="http://schemas.microsoft.com/office/word/2006/wordml" xmlns:sl="http://schemas.openxmlformats.org/schemaLibrary/2006/main" xmlns:mc="http://schemas.openxmlformats.org/markup-compatibility/2006" xmlns:wp14="http://schemas.microsoft.com/office/word/2010/wordprocessingDrawing" xmlns:wp="http://schemas.openxmlformats.org/drawingml/2006/wordprocessingDrawing" xmlns:m="http://schemas.openxmlformats.org/officeDocument/2006/math" xmlns:w14="http://schemas.microsoft.com/office/word/2010/wordml" xmlns:w15="http://schemas.microsoft.com/office/word/2012/wordml" xmlns:w="http://schemas.openxmlformats.org/wordprocessingml/2006/main">
               <c:ext xmlns:c16="http://schemas.microsoft.com/office/drawing/2014/chart" uri="{C3380CC4-5D6E-409C-BE32-E72D297353CC}">
                 <c16:uniqueId val="{00000001-6147-E74A-AA7B-5531F0E4EE0C}"/>
               </c:ext>
@@ -1503,7 +1503,7 @@
               </c:numCache>
             </c:numRef>
           </c:val>
-          <c:extLst xmlns:w="http://schemas.openxmlformats.org/wordprocessingml/2006/main" xmlns:w15="http://schemas.microsoft.com/office/word/2012/wordml" xmlns:w14="http://schemas.microsoft.com/office/word/2010/wordml" xmlns:m="http://schemas.openxmlformats.org/officeDocument/2006/math" xmlns:wp="http://schemas.openxmlformats.org/drawingml/2006/wordprocessingDrawing" xmlns:wp14="http://schemas.microsoft.com/office/word/2010/wordprocessingDrawing" xmlns:mc="http://schemas.openxmlformats.org/markup-compatibility/2006" xmlns:sl="http://schemas.openxmlformats.org/schemaLibrary/2006/main" xmlns:wne="http://schemas.microsoft.com/office/word/2006/wordml" xmlns:cdr="http://schemas.openxmlformats.org/drawingml/2006/chartDrawing" xmlns:c14="http://schemas.microsoft.com/office/drawing/2007/8/2/chart" xmlns:dgm="http://schemas.openxmlformats.org/drawingml/2006/diagram" xmlns:pic="http://schemas.openxmlformats.org/drawingml/2006/picture" xmlns:xdr="http://schemas.openxmlformats.org/drawingml/2006/spreadsheetDrawing" xmlns:dsp="http://schemas.microsoft.com/office/drawing/2008/diagram" xmlns:xvml="urn:schemas-microsoft-com:office:excel" xmlns:o="urn:schemas-microsoft-com:office:office" xmlns:v="urn:schemas-microsoft-com:vml" xmlns:w10="urn:schemas-microsoft-com:office:word" xmlns:pvml="urn:schemas-microsoft-com:office:powerpoint" xmlns:cppr="http://schemas.microsoft.com/office/2006/coverPageProps" xmlns:odx="http://opendope.org/xpaths" xmlns:odc="http://opendope.org/conditions" xmlns:odq="http://opendope.org/questions" xmlns:oda="http://opendope.org/answers" xmlns:odi="http://opendope.org/components" xmlns:odgm="http://opendope.org/SmartArt/DataHierarchy" xmlns:b="http://schemas.openxmlformats.org/officeDocument/2006/bibliography" xmlns:wps="http://schemas.microsoft.com/office/word/2010/wordprocessingShape" xmlns:w16se="http://schemas.microsoft.com/office/word/2015/wordml/symex" xmlns:w16cid="http://schemas.microsoft.com/office/word/2016/wordml/cid" xmlns:wetp="http://schemas.microsoft.com/office/webextensions/taskpanes/2010/11" xmlns:we="http://schemas.microsoft.com/office/webextensions/webextension/2010/11" xmlns:comp="http://schemas.openxmlformats.org/drawingml/2006/compatibility" xmlns:lc="http://schemas.openxmlformats.org/drawingml/2006/lockedCanvas">
+          <c:extLst xmlns:lc="http://schemas.openxmlformats.org/drawingml/2006/lockedCanvas" xmlns:comp="http://schemas.openxmlformats.org/drawingml/2006/compatibility" xmlns:we="http://schemas.microsoft.com/office/webextensions/webextension/2010/11" xmlns:wetp="http://schemas.microsoft.com/office/webextensions/taskpanes/2010/11" xmlns:w16cid="http://schemas.microsoft.com/office/word/2016/wordml/cid" xmlns:w16se="http://schemas.microsoft.com/office/word/2015/wordml/symex" xmlns:wps="http://schemas.microsoft.com/office/word/2010/wordprocessingShape" xmlns:b="http://schemas.openxmlformats.org/officeDocument/2006/bibliography" xmlns:odgm="http://opendope.org/SmartArt/DataHierarchy" xmlns:odi="http://opendope.org/components" xmlns:oda="http://opendope.org/answers" xmlns:odq="http://opendope.org/questions" xmlns:odc="http://opendope.org/conditions" xmlns:odx="http://opendope.org/xpaths" xmlns:cppr="http://schemas.microsoft.com/office/2006/coverPageProps" xmlns:pvml="urn:schemas-microsoft-com:office:powerpoint" xmlns:w10="urn:schemas-microsoft-com:office:word" xmlns:v="urn:schemas-microsoft-com:vml" xmlns:o="urn:schemas-microsoft-com:office:office" xmlns:xvml="urn:schemas-microsoft-com:office:excel" xmlns:dsp="http://schemas.microsoft.com/office/drawing/2008/diagram" xmlns:xdr="http://schemas.openxmlformats.org/drawingml/2006/spreadsheetDrawing" xmlns:pic="http://schemas.openxmlformats.org/drawingml/2006/picture" xmlns:dgm="http://schemas.openxmlformats.org/drawingml/2006/diagram" xmlns:c14="http://schemas.microsoft.com/office/drawing/2007/8/2/chart" xmlns:cdr="http://schemas.openxmlformats.org/drawingml/2006/chartDrawing" xmlns:wne="http://schemas.microsoft.com/office/word/2006/wordml" xmlns:sl="http://schemas.openxmlformats.org/schemaLibrary/2006/main" xmlns:mc="http://schemas.openxmlformats.org/markup-compatibility/2006" xmlns:wp14="http://schemas.microsoft.com/office/word/2010/wordprocessingDrawing" xmlns:wp="http://schemas.openxmlformats.org/drawingml/2006/wordprocessingDrawing" xmlns:m="http://schemas.openxmlformats.org/officeDocument/2006/math" xmlns:w14="http://schemas.microsoft.com/office/word/2010/wordml" xmlns:w15="http://schemas.microsoft.com/office/word/2012/wordml" xmlns:w="http://schemas.openxmlformats.org/wordprocessingml/2006/main">
             <c:ext xmlns:c16="http://schemas.microsoft.com/office/drawing/2014/chart" uri="{C3380CC4-5D6E-409C-BE32-E72D297353CC}">
               <c16:uniqueId val="{00000002-6147-E74A-AA7B-5531F0E4EE0C}"/>
             </c:ext>
@@ -2113,7 +2113,7 @@
     </c:plotArea>
     <c:plotVisOnly val="1"/>
     <c:dispBlanksAs val="gap"/>
-    <c:extLst xmlns:w="http://schemas.openxmlformats.org/wordprocessingml/2006/main" xmlns:w15="http://schemas.microsoft.com/office/word/2012/wordml" xmlns:w14="http://schemas.microsoft.com/office/word/2010/wordml" xmlns:m="http://schemas.openxmlformats.org/officeDocument/2006/math" xmlns:wp="http://schemas.openxmlformats.org/drawingml/2006/wordprocessingDrawing" xmlns:wp14="http://schemas.microsoft.com/office/word/2010/wordprocessingDrawing" xmlns:mc="http://schemas.openxmlformats.org/markup-compatibility/2006" xmlns:sl="http://schemas.openxmlformats.org/schemaLibrary/2006/main" xmlns:wne="http://schemas.microsoft.com/office/word/2006/wordml" xmlns:cdr="http://schemas.openxmlformats.org/drawingml/2006/chartDrawing" xmlns:c14="http://schemas.microsoft.com/office/drawing/2007/8/2/chart" xmlns:dgm="http://schemas.openxmlformats.org/drawingml/2006/diagram" xmlns:pic="http://schemas.openxmlformats.org/drawingml/2006/picture" xmlns:xdr="http://schemas.openxmlformats.org/drawingml/2006/spreadsheetDrawing" xmlns:dsp="http://schemas.microsoft.com/office/drawing/2008/diagram" xmlns:xvml="urn:schemas-microsoft-com:office:excel" xmlns:o="urn:schemas-microsoft-com:office:office" xmlns:v="urn:schemas-microsoft-com:vml" xmlns:w10="urn:schemas-microsoft-com:office:word" xmlns:pvml="urn:schemas-microsoft-com:office:powerpoint" xmlns:cppr="http://schemas.microsoft.com/office/2006/coverPageProps" xmlns:odx="http://opendope.org/xpaths" xmlns:odc="http://opendope.org/conditions" xmlns:odq="http://opendope.org/questions" xmlns:oda="http://opendope.org/answers" xmlns:odi="http://opendope.org/components" xmlns:odgm="http://opendope.org/SmartArt/DataHierarchy" xmlns:b="http://schemas.openxmlformats.org/officeDocument/2006/bibliography" xmlns:wps="http://schemas.microsoft.com/office/word/2010/wordprocessingShape" xmlns:w16se="http://schemas.microsoft.com/office/word/2015/wordml/symex" xmlns:w16cid="http://schemas.microsoft.com/office/word/2016/wordml/cid" xmlns:wetp="http://schemas.microsoft.com/office/webextensions/taskpanes/2010/11" xmlns:we="http://schemas.microsoft.com/office/webextensions/webextension/2010/11" xmlns:comp="http://schemas.openxmlformats.org/drawingml/2006/compatibility" xmlns:lc="http://schemas.openxmlformats.org/drawingml/2006/lockedCanvas">
+    <c:extLst xmlns:lc="http://schemas.openxmlformats.org/drawingml/2006/lockedCanvas" xmlns:comp="http://schemas.openxmlformats.org/drawingml/2006/compatibility" xmlns:we="http://schemas.microsoft.com/office/webextensions/webextension/2010/11" xmlns:wetp="http://schemas.microsoft.com/office/webextensions/taskpanes/2010/11" xmlns:w16cid="http://schemas.microsoft.com/office/word/2016/wordml/cid" xmlns:w16se="http://schemas.microsoft.com/office/word/2015/wordml/symex" xmlns:wps="http://schemas.microsoft.com/office/word/2010/wordprocessingShape" xmlns:b="http://schemas.openxmlformats.org/officeDocument/2006/bibliography" xmlns:odgm="http://opendope.org/SmartArt/DataHierarchy" xmlns:odi="http://opendope.org/components" xmlns:oda="http://opendope.org/answers" xmlns:odq="http://opendope.org/questions" xmlns:odc="http://opendope.org/conditions" xmlns:odx="http://opendope.org/xpaths" xmlns:cppr="http://schemas.microsoft.com/office/2006/coverPageProps" xmlns:pvml="urn:schemas-microsoft-com:office:powerpoint" xmlns:w10="urn:schemas-microsoft-com:office:word" xmlns:v="urn:schemas-microsoft-com:vml" xmlns:o="urn:schemas-microsoft-com:office:office" xmlns:xvml="urn:schemas-microsoft-com:office:excel" xmlns:dsp="http://schemas.microsoft.com/office/drawing/2008/diagram" xmlns:xdr="http://schemas.openxmlformats.org/drawingml/2006/spreadsheetDrawing" xmlns:pic="http://schemas.openxmlformats.org/drawingml/2006/picture" xmlns:dgm="http://schemas.openxmlformats.org/drawingml/2006/diagram" xmlns:c14="http://schemas.microsoft.com/office/drawing/2007/8/2/chart" xmlns:cdr="http://schemas.openxmlformats.org/drawingml/2006/chartDrawing" xmlns:wne="http://schemas.microsoft.com/office/word/2006/wordml" xmlns:sl="http://schemas.openxmlformats.org/schemaLibrary/2006/main" xmlns:mc="http://schemas.openxmlformats.org/markup-compatibility/2006" xmlns:wp14="http://schemas.microsoft.com/office/word/2010/wordprocessingDrawing" xmlns:wp="http://schemas.openxmlformats.org/drawingml/2006/wordprocessingDrawing" xmlns:m="http://schemas.openxmlformats.org/officeDocument/2006/math" xmlns:w14="http://schemas.microsoft.com/office/word/2010/wordml" xmlns:w15="http://schemas.microsoft.com/office/word/2012/wordml" xmlns:w="http://schemas.openxmlformats.org/wordprocessingml/2006/main">
       <c:ext xmlns:c16r3="http://schemas.microsoft.com/office/drawing/2017/03/chart" uri="{56B9EC1D-385E-4148-901F-78D8002777C0}">
         <c16r3:dataDisplayOptions16>
           <c16r3:dispNaAsBlank val="1"/>
@@ -2216,7 +2216,7 @@
                 </a:outerShdw>
               </a:effectLst>
             </c:spPr>
-            <c:extLst xmlns:w="http://schemas.openxmlformats.org/wordprocessingml/2006/main" xmlns:w15="http://schemas.microsoft.com/office/word/2012/wordml" xmlns:w14="http://schemas.microsoft.com/office/word/2010/wordml" xmlns:m="http://schemas.openxmlformats.org/officeDocument/2006/math" xmlns:wp="http://schemas.openxmlformats.org/drawingml/2006/wordprocessingDrawing" xmlns:wp14="http://schemas.microsoft.com/office/word/2010/wordprocessingDrawing" xmlns:mc="http://schemas.openxmlformats.org/markup-compatibility/2006" xmlns:sl="http://schemas.openxmlformats.org/schemaLibrary/2006/main" xmlns:wne="http://schemas.microsoft.com/office/word/2006/wordml" xmlns:cdr="http://schemas.openxmlformats.org/drawingml/2006/chartDrawing" xmlns:c14="http://schemas.microsoft.com/office/drawing/2007/8/2/chart" xmlns:dgm="http://schemas.openxmlformats.org/drawingml/2006/diagram" xmlns:pic="http://schemas.openxmlformats.org/drawingml/2006/picture" xmlns:xdr="http://schemas.openxmlformats.org/drawingml/2006/spreadsheetDrawing" xmlns:dsp="http://schemas.microsoft.com/office/drawing/2008/diagram" xmlns:xvml="urn:schemas-microsoft-com:office:excel" xmlns:o="urn:schemas-microsoft-com:office:office" xmlns:v="urn:schemas-microsoft-com:vml" xmlns:w10="urn:schemas-microsoft-com:office:word" xmlns:pvml="urn:schemas-microsoft-com:office:powerpoint" xmlns:cppr="http://schemas.microsoft.com/office/2006/coverPageProps" xmlns:odx="http://opendope.org/xpaths" xmlns:odc="http://opendope.org/conditions" xmlns:odq="http://opendope.org/questions" xmlns:oda="http://opendope.org/answers" xmlns:odi="http://opendope.org/components" xmlns:odgm="http://opendope.org/SmartArt/DataHierarchy" xmlns:b="http://schemas.openxmlformats.org/officeDocument/2006/bibliography" xmlns:wps="http://schemas.microsoft.com/office/word/2010/wordprocessingShape" xmlns:w16se="http://schemas.microsoft.com/office/word/2015/wordml/symex" xmlns:w16cid="http://schemas.microsoft.com/office/word/2016/wordml/cid" xmlns:wetp="http://schemas.microsoft.com/office/webextensions/taskpanes/2010/11" xmlns:we="http://schemas.microsoft.com/office/webextensions/webextension/2010/11" xmlns:comp="http://schemas.openxmlformats.org/drawingml/2006/compatibility" xmlns:lc="http://schemas.openxmlformats.org/drawingml/2006/lockedCanvas">
+            <c:extLst xmlns:lc="http://schemas.openxmlformats.org/drawingml/2006/lockedCanvas" xmlns:comp="http://schemas.openxmlformats.org/drawingml/2006/compatibility" xmlns:we="http://schemas.microsoft.com/office/webextensions/webextension/2010/11" xmlns:wetp="http://schemas.microsoft.com/office/webextensions/taskpanes/2010/11" xmlns:w16cid="http://schemas.microsoft.com/office/word/2016/wordml/cid" xmlns:w16se="http://schemas.microsoft.com/office/word/2015/wordml/symex" xmlns:wps="http://schemas.microsoft.com/office/word/2010/wordprocessingShape" xmlns:b="http://schemas.openxmlformats.org/officeDocument/2006/bibliography" xmlns:odgm="http://opendope.org/SmartArt/DataHierarchy" xmlns:odi="http://opendope.org/components" xmlns:oda="http://opendope.org/answers" xmlns:odq="http://opendope.org/questions" xmlns:odc="http://opendope.org/conditions" xmlns:odx="http://opendope.org/xpaths" xmlns:cppr="http://schemas.microsoft.com/office/2006/coverPageProps" xmlns:pvml="urn:schemas-microsoft-com:office:powerpoint" xmlns:w10="urn:schemas-microsoft-com:office:word" xmlns:v="urn:schemas-microsoft-com:vml" xmlns:o="urn:schemas-microsoft-com:office:office" xmlns:xvml="urn:schemas-microsoft-com:office:excel" xmlns:dsp="http://schemas.microsoft.com/office/drawing/2008/diagram" xmlns:xdr="http://schemas.openxmlformats.org/drawingml/2006/spreadsheetDrawing" xmlns:pic="http://schemas.openxmlformats.org/drawingml/2006/picture" xmlns:dgm="http://schemas.openxmlformats.org/drawingml/2006/diagram" xmlns:c14="http://schemas.microsoft.com/office/drawing/2007/8/2/chart" xmlns:cdr="http://schemas.openxmlformats.org/drawingml/2006/chartDrawing" xmlns:wne="http://schemas.microsoft.com/office/word/2006/wordml" xmlns:sl="http://schemas.openxmlformats.org/schemaLibrary/2006/main" xmlns:mc="http://schemas.openxmlformats.org/markup-compatibility/2006" xmlns:wp14="http://schemas.microsoft.com/office/word/2010/wordprocessingDrawing" xmlns:wp="http://schemas.openxmlformats.org/drawingml/2006/wordprocessingDrawing" xmlns:m="http://schemas.openxmlformats.org/officeDocument/2006/math" xmlns:w14="http://schemas.microsoft.com/office/word/2010/wordml" xmlns:w15="http://schemas.microsoft.com/office/word/2012/wordml" xmlns:w="http://schemas.openxmlformats.org/wordprocessingml/2006/main">
               <c:ext xmlns:c16="http://schemas.microsoft.com/office/drawing/2014/chart" uri="{C3380CC4-5D6E-409C-BE32-E72D297353CC}">
                 <c16:uniqueId val="{00000001-6147-E74A-AA7B-5531F0E4EE0C}"/>
               </c:ext>
@@ -2311,7 +2311,7 @@
               </c:numCache>
             </c:numRef>
           </c:val>
-          <c:extLst xmlns:w="http://schemas.openxmlformats.org/wordprocessingml/2006/main" xmlns:w15="http://schemas.microsoft.com/office/word/2012/wordml" xmlns:w14="http://schemas.microsoft.com/office/word/2010/wordml" xmlns:m="http://schemas.openxmlformats.org/officeDocument/2006/math" xmlns:wp="http://schemas.openxmlformats.org/drawingml/2006/wordprocessingDrawing" xmlns:wp14="http://schemas.microsoft.com/office/word/2010/wordprocessingDrawing" xmlns:mc="http://schemas.openxmlformats.org/markup-compatibility/2006" xmlns:sl="http://schemas.openxmlformats.org/schemaLibrary/2006/main" xmlns:wne="http://schemas.microsoft.com/office/word/2006/wordml" xmlns:cdr="http://schemas.openxmlformats.org/drawingml/2006/chartDrawing" xmlns:c14="http://schemas.microsoft.com/office/drawing/2007/8/2/chart" xmlns:dgm="http://schemas.openxmlformats.org/drawingml/2006/diagram" xmlns:pic="http://schemas.openxmlformats.org/drawingml/2006/picture" xmlns:xdr="http://schemas.openxmlformats.org/drawingml/2006/spreadsheetDrawing" xmlns:dsp="http://schemas.microsoft.com/office/drawing/2008/diagram" xmlns:xvml="urn:schemas-microsoft-com:office:excel" xmlns:o="urn:schemas-microsoft-com:office:office" xmlns:v="urn:schemas-microsoft-com:vml" xmlns:w10="urn:schemas-microsoft-com:office:word" xmlns:pvml="urn:schemas-microsoft-com:office:powerpoint" xmlns:cppr="http://schemas.microsoft.com/office/2006/coverPageProps" xmlns:odx="http://opendope.org/xpaths" xmlns:odc="http://opendope.org/conditions" xmlns:odq="http://opendope.org/questions" xmlns:oda="http://opendope.org/answers" xmlns:odi="http://opendope.org/components" xmlns:odgm="http://opendope.org/SmartArt/DataHierarchy" xmlns:b="http://schemas.openxmlformats.org/officeDocument/2006/bibliography" xmlns:wps="http://schemas.microsoft.com/office/word/2010/wordprocessingShape" xmlns:w16se="http://schemas.microsoft.com/office/word/2015/wordml/symex" xmlns:w16cid="http://schemas.microsoft.com/office/word/2016/wordml/cid" xmlns:wetp="http://schemas.microsoft.com/office/webextensions/taskpanes/2010/11" xmlns:we="http://schemas.microsoft.com/office/webextensions/webextension/2010/11" xmlns:comp="http://schemas.openxmlformats.org/drawingml/2006/compatibility" xmlns:lc="http://schemas.openxmlformats.org/drawingml/2006/lockedCanvas">
+          <c:extLst xmlns:lc="http://schemas.openxmlformats.org/drawingml/2006/lockedCanvas" xmlns:comp="http://schemas.openxmlformats.org/drawingml/2006/compatibility" xmlns:we="http://schemas.microsoft.com/office/webextensions/webextension/2010/11" xmlns:wetp="http://schemas.microsoft.com/office/webextensions/taskpanes/2010/11" xmlns:w16cid="http://schemas.microsoft.com/office/word/2016/wordml/cid" xmlns:w16se="http://schemas.microsoft.com/office/word/2015/wordml/symex" xmlns:wps="http://schemas.microsoft.com/office/word/2010/wordprocessingShape" xmlns:b="http://schemas.openxmlformats.org/officeDocument/2006/bibliography" xmlns:odgm="http://opendope.org/SmartArt/DataHierarchy" xmlns:odi="http://opendope.org/components" xmlns:oda="http://opendope.org/answers" xmlns:odq="http://opendope.org/questions" xmlns:odc="http://opendope.org/conditions" xmlns:odx="http://opendope.org/xpaths" xmlns:cppr="http://schemas.microsoft.com/office/2006/coverPageProps" xmlns:pvml="urn:schemas-microsoft-com:office:powerpoint" xmlns:w10="urn:schemas-microsoft-com:office:word" xmlns:v="urn:schemas-microsoft-com:vml" xmlns:o="urn:schemas-microsoft-com:office:office" xmlns:xvml="urn:schemas-microsoft-com:office:excel" xmlns:dsp="http://schemas.microsoft.com/office/drawing/2008/diagram" xmlns:xdr="http://schemas.openxmlformats.org/drawingml/2006/spreadsheetDrawing" xmlns:pic="http://schemas.openxmlformats.org/drawingml/2006/picture" xmlns:dgm="http://schemas.openxmlformats.org/drawingml/2006/diagram" xmlns:c14="http://schemas.microsoft.com/office/drawing/2007/8/2/chart" xmlns:cdr="http://schemas.openxmlformats.org/drawingml/2006/chartDrawing" xmlns:wne="http://schemas.microsoft.com/office/word/2006/wordml" xmlns:sl="http://schemas.openxmlformats.org/schemaLibrary/2006/main" xmlns:mc="http://schemas.openxmlformats.org/markup-compatibility/2006" xmlns:wp14="http://schemas.microsoft.com/office/word/2010/wordprocessingDrawing" xmlns:wp="http://schemas.openxmlformats.org/drawingml/2006/wordprocessingDrawing" xmlns:m="http://schemas.openxmlformats.org/officeDocument/2006/math" xmlns:w14="http://schemas.microsoft.com/office/word/2010/wordml" xmlns:w15="http://schemas.microsoft.com/office/word/2012/wordml" xmlns:w="http://schemas.openxmlformats.org/wordprocessingml/2006/main">
             <c:ext xmlns:c16="http://schemas.microsoft.com/office/drawing/2014/chart" uri="{C3380CC4-5D6E-409C-BE32-E72D297353CC}">
               <c16:uniqueId val="{00000002-6147-E74A-AA7B-5531F0E4EE0C}"/>
             </c:ext>
@@ -2921,7 +2921,7 @@
     </c:plotArea>
     <c:plotVisOnly val="1"/>
     <c:dispBlanksAs val="gap"/>
-    <c:extLst xmlns:w="http://schemas.openxmlformats.org/wordprocessingml/2006/main" xmlns:w15="http://schemas.microsoft.com/office/word/2012/wordml" xmlns:w14="http://schemas.microsoft.com/office/word/2010/wordml" xmlns:m="http://schemas.openxmlformats.org/officeDocument/2006/math" xmlns:wp="http://schemas.openxmlformats.org/drawingml/2006/wordprocessingDrawing" xmlns:wp14="http://schemas.microsoft.com/office/word/2010/wordprocessingDrawing" xmlns:mc="http://schemas.openxmlformats.org/markup-compatibility/2006" xmlns:sl="http://schemas.openxmlformats.org/schemaLibrary/2006/main" xmlns:wne="http://schemas.microsoft.com/office/word/2006/wordml" xmlns:cdr="http://schemas.openxmlformats.org/drawingml/2006/chartDrawing" xmlns:c14="http://schemas.microsoft.com/office/drawing/2007/8/2/chart" xmlns:dgm="http://schemas.openxmlformats.org/drawingml/2006/diagram" xmlns:pic="http://schemas.openxmlformats.org/drawingml/2006/picture" xmlns:xdr="http://schemas.openxmlformats.org/drawingml/2006/spreadsheetDrawing" xmlns:dsp="http://schemas.microsoft.com/office/drawing/2008/diagram" xmlns:xvml="urn:schemas-microsoft-com:office:excel" xmlns:o="urn:schemas-microsoft-com:office:office" xmlns:v="urn:schemas-microsoft-com:vml" xmlns:w10="urn:schemas-microsoft-com:office:word" xmlns:pvml="urn:schemas-microsoft-com:office:powerpoint" xmlns:cppr="http://schemas.microsoft.com/office/2006/coverPageProps" xmlns:odx="http://opendope.org/xpaths" xmlns:odc="http://opendope.org/conditions" xmlns:odq="http://opendope.org/questions" xmlns:oda="http://opendope.org/answers" xmlns:odi="http://opendope.org/components" xmlns:odgm="http://opendope.org/SmartArt/DataHierarchy" xmlns:b="http://schemas.openxmlformats.org/officeDocument/2006/bibliography" xmlns:wps="http://schemas.microsoft.com/office/word/2010/wordprocessingShape" xmlns:w16se="http://schemas.microsoft.com/office/word/2015/wordml/symex" xmlns:w16cid="http://schemas.microsoft.com/office/word/2016/wordml/cid" xmlns:wetp="http://schemas.microsoft.com/office/webextensions/taskpanes/2010/11" xmlns:we="http://schemas.microsoft.com/office/webextensions/webextension/2010/11" xmlns:comp="http://schemas.openxmlformats.org/drawingml/2006/compatibility" xmlns:lc="http://schemas.openxmlformats.org/drawingml/2006/lockedCanvas">
+    <c:extLst xmlns:lc="http://schemas.openxmlformats.org/drawingml/2006/lockedCanvas" xmlns:comp="http://schemas.openxmlformats.org/drawingml/2006/compatibility" xmlns:we="http://schemas.microsoft.com/office/webextensions/webextension/2010/11" xmlns:wetp="http://schemas.microsoft.com/office/webextensions/taskpanes/2010/11" xmlns:w16cid="http://schemas.microsoft.com/office/word/2016/wordml/cid" xmlns:w16se="http://schemas.microsoft.com/office/word/2015/wordml/symex" xmlns:wps="http://schemas.microsoft.com/office/word/2010/wordprocessingShape" xmlns:b="http://schemas.openxmlformats.org/officeDocument/2006/bibliography" xmlns:odgm="http://opendope.org/SmartArt/DataHierarchy" xmlns:odi="http://opendope.org/components" xmlns:oda="http://opendope.org/answers" xmlns:odq="http://opendope.org/questions" xmlns:odc="http://opendope.org/conditions" xmlns:odx="http://opendope.org/xpaths" xmlns:cppr="http://schemas.microsoft.com/office/2006/coverPageProps" xmlns:pvml="urn:schemas-microsoft-com:office:powerpoint" xmlns:w10="urn:schemas-microsoft-com:office:word" xmlns:v="urn:schemas-microsoft-com:vml" xmlns:o="urn:schemas-microsoft-com:office:office" xmlns:xvml="urn:schemas-microsoft-com:office:excel" xmlns:dsp="http://schemas.microsoft.com/office/drawing/2008/diagram" xmlns:xdr="http://schemas.openxmlformats.org/drawingml/2006/spreadsheetDrawing" xmlns:pic="http://schemas.openxmlformats.org/drawingml/2006/picture" xmlns:dgm="http://schemas.openxmlformats.org/drawingml/2006/diagram" xmlns:c14="http://schemas.microsoft.com/office/drawing/2007/8/2/chart" xmlns:cdr="http://schemas.openxmlformats.org/drawingml/2006/chartDrawing" xmlns:wne="http://schemas.microsoft.com/office/word/2006/wordml" xmlns:sl="http://schemas.openxmlformats.org/schemaLibrary/2006/main" xmlns:mc="http://schemas.openxmlformats.org/markup-compatibility/2006" xmlns:wp14="http://schemas.microsoft.com/office/word/2010/wordprocessingDrawing" xmlns:wp="http://schemas.openxmlformats.org/drawingml/2006/wordprocessingDrawing" xmlns:m="http://schemas.openxmlformats.org/officeDocument/2006/math" xmlns:w14="http://schemas.microsoft.com/office/word/2010/wordml" xmlns:w15="http://schemas.microsoft.com/office/word/2012/wordml" xmlns:w="http://schemas.openxmlformats.org/wordprocessingml/2006/main">
       <c:ext xmlns:c16r3="http://schemas.microsoft.com/office/drawing/2017/03/chart" uri="{56B9EC1D-385E-4148-901F-78D8002777C0}">
         <c16r3:dataDisplayOptions16>
           <c16r3:dispNaAsBlank val="1"/>
@@ -3024,7 +3024,7 @@
                 </a:outerShdw>
               </a:effectLst>
             </c:spPr>
-            <c:extLst xmlns:lc="http://schemas.openxmlformats.org/drawingml/2006/lockedCanvas" xmlns:comp="http://schemas.openxmlformats.org/drawingml/2006/compatibility" xmlns:we="http://schemas.microsoft.com/office/webextensions/webextension/2010/11" xmlns:wetp="http://schemas.microsoft.com/office/webextensions/taskpanes/2010/11" xmlns:w16cid="http://schemas.microsoft.com/office/word/2016/wordml/cid" xmlns:w16se="http://schemas.microsoft.com/office/word/2015/wordml/symex" xmlns:wps="http://schemas.microsoft.com/office/word/2010/wordprocessingShape" xmlns:b="http://schemas.openxmlformats.org/officeDocument/2006/bibliography" xmlns:odgm="http://opendope.org/SmartArt/DataHierarchy" xmlns:odi="http://opendope.org/components" xmlns:oda="http://opendope.org/answers" xmlns:odq="http://opendope.org/questions" xmlns:odc="http://opendope.org/conditions" xmlns:odx="http://opendope.org/xpaths" xmlns:cppr="http://schemas.microsoft.com/office/2006/coverPageProps" xmlns:pvml="urn:schemas-microsoft-com:office:powerpoint" xmlns:w10="urn:schemas-microsoft-com:office:word" xmlns:v="urn:schemas-microsoft-com:vml" xmlns:o="urn:schemas-microsoft-com:office:office" xmlns:xvml="urn:schemas-microsoft-com:office:excel" xmlns:dsp="http://schemas.microsoft.com/office/drawing/2008/diagram" xmlns:xdr="http://schemas.openxmlformats.org/drawingml/2006/spreadsheetDrawing" xmlns:pic="http://schemas.openxmlformats.org/drawingml/2006/picture" xmlns:dgm="http://schemas.openxmlformats.org/drawingml/2006/diagram" xmlns:c14="http://schemas.microsoft.com/office/drawing/2007/8/2/chart" xmlns:cdr="http://schemas.openxmlformats.org/drawingml/2006/chartDrawing" xmlns:wne="http://schemas.microsoft.com/office/word/2006/wordml" xmlns:sl="http://schemas.openxmlformats.org/schemaLibrary/2006/main" xmlns:mc="http://schemas.openxmlformats.org/markup-compatibility/2006" xmlns:wp14="http://schemas.microsoft.com/office/word/2010/wordprocessingDrawing" xmlns:wp="http://schemas.openxmlformats.org/drawingml/2006/wordprocessingDrawing" xmlns:m="http://schemas.openxmlformats.org/officeDocument/2006/math" xmlns:w14="http://schemas.microsoft.com/office/word/2010/wordml" xmlns:w15="http://schemas.microsoft.com/office/word/2012/wordml" xmlns:w="http://schemas.openxmlformats.org/wordprocessingml/2006/main">
+            <c:extLst xmlns:w="http://schemas.openxmlformats.org/wordprocessingml/2006/main" xmlns:w15="http://schemas.microsoft.com/office/word/2012/wordml" xmlns:w14="http://schemas.microsoft.com/office/word/2010/wordml" xmlns:m="http://schemas.openxmlformats.org/officeDocument/2006/math" xmlns:wp="http://schemas.openxmlformats.org/drawingml/2006/wordprocessingDrawing" xmlns:wp14="http://schemas.microsoft.com/office/word/2010/wordprocessingDrawing" xmlns:mc="http://schemas.openxmlformats.org/markup-compatibility/2006" xmlns:sl="http://schemas.openxmlformats.org/schemaLibrary/2006/main" xmlns:wne="http://schemas.microsoft.com/office/word/2006/wordml" xmlns:cdr="http://schemas.openxmlformats.org/drawingml/2006/chartDrawing" xmlns:c14="http://schemas.microsoft.com/office/drawing/2007/8/2/chart" xmlns:dgm="http://schemas.openxmlformats.org/drawingml/2006/diagram" xmlns:pic="http://schemas.openxmlformats.org/drawingml/2006/picture" xmlns:xdr="http://schemas.openxmlformats.org/drawingml/2006/spreadsheetDrawing" xmlns:dsp="http://schemas.microsoft.com/office/drawing/2008/diagram" xmlns:xvml="urn:schemas-microsoft-com:office:excel" xmlns:o="urn:schemas-microsoft-com:office:office" xmlns:v="urn:schemas-microsoft-com:vml" xmlns:w10="urn:schemas-microsoft-com:office:word" xmlns:pvml="urn:schemas-microsoft-com:office:powerpoint" xmlns:cppr="http://schemas.microsoft.com/office/2006/coverPageProps" xmlns:odx="http://opendope.org/xpaths" xmlns:odc="http://opendope.org/conditions" xmlns:odq="http://opendope.org/questions" xmlns:oda="http://opendope.org/answers" xmlns:odi="http://opendope.org/components" xmlns:odgm="http://opendope.org/SmartArt/DataHierarchy" xmlns:b="http://schemas.openxmlformats.org/officeDocument/2006/bibliography" xmlns:wps="http://schemas.microsoft.com/office/word/2010/wordprocessingShape" xmlns:w16se="http://schemas.microsoft.com/office/word/2015/wordml/symex" xmlns:w16cid="http://schemas.microsoft.com/office/word/2016/wordml/cid" xmlns:wetp="http://schemas.microsoft.com/office/webextensions/taskpanes/2010/11" xmlns:we="http://schemas.microsoft.com/office/webextensions/webextension/2010/11" xmlns:comp="http://schemas.openxmlformats.org/drawingml/2006/compatibility" xmlns:lc="http://schemas.openxmlformats.org/drawingml/2006/lockedCanvas">
               <c:ext xmlns:c16="http://schemas.microsoft.com/office/drawing/2014/chart" uri="{C3380CC4-5D6E-409C-BE32-E72D297353CC}">
                 <c16:uniqueId val="{00000001-6147-E74A-AA7B-5531F0E4EE0C}"/>
               </c:ext>
@@ -3119,7 +3119,7 @@
               </c:numCache>
             </c:numRef>
           </c:val>
-          <c:extLst xmlns:lc="http://schemas.openxmlformats.org/drawingml/2006/lockedCanvas" xmlns:comp="http://schemas.openxmlformats.org/drawingml/2006/compatibility" xmlns:we="http://schemas.microsoft.com/office/webextensions/webextension/2010/11" xmlns:wetp="http://schemas.microsoft.com/office/webextensions/taskpanes/2010/11" xmlns:w16cid="http://schemas.microsoft.com/office/word/2016/wordml/cid" xmlns:w16se="http://schemas.microsoft.com/office/word/2015/wordml/symex" xmlns:wps="http://schemas.microsoft.com/office/word/2010/wordprocessingShape" xmlns:b="http://schemas.openxmlformats.org/officeDocument/2006/bibliography" xmlns:odgm="http://opendope.org/SmartArt/DataHierarchy" xmlns:odi="http://opendope.org/components" xmlns:oda="http://opendope.org/answers" xmlns:odq="http://opendope.org/questions" xmlns:odc="http://opendope.org/conditions" xmlns:odx="http://opendope.org/xpaths" xmlns:cppr="http://schemas.microsoft.com/office/2006/coverPageProps" xmlns:pvml="urn:schemas-microsoft-com:office:powerpoint" xmlns:w10="urn:schemas-microsoft-com:office:word" xmlns:v="urn:schemas-microsoft-com:vml" xmlns:o="urn:schemas-microsoft-com:office:office" xmlns:xvml="urn:schemas-microsoft-com:office:excel" xmlns:dsp="http://schemas.microsoft.com/office/drawing/2008/diagram" xmlns:xdr="http://schemas.openxmlformats.org/drawingml/2006/spreadsheetDrawing" xmlns:pic="http://schemas.openxmlformats.org/drawingml/2006/picture" xmlns:dgm="http://schemas.openxmlformats.org/drawingml/2006/diagram" xmlns:c14="http://schemas.microsoft.com/office/drawing/2007/8/2/chart" xmlns:cdr="http://schemas.openxmlformats.org/drawingml/2006/chartDrawing" xmlns:wne="http://schemas.microsoft.com/office/word/2006/wordml" xmlns:sl="http://schemas.openxmlformats.org/schemaLibrary/2006/main" xmlns:mc="http://schemas.openxmlformats.org/markup-compatibility/2006" xmlns:wp14="http://schemas.microsoft.com/office/word/2010/wordprocessingDrawing" xmlns:wp="http://schemas.openxmlformats.org/drawingml/2006/wordprocessingDrawing" xmlns:m="http://schemas.openxmlformats.org/officeDocument/2006/math" xmlns:w14="http://schemas.microsoft.com/office/word/2010/wordml" xmlns:w15="http://schemas.microsoft.com/office/word/2012/wordml" xmlns:w="http://schemas.openxmlformats.org/wordprocessingml/2006/main">
+          <c:extLst xmlns:w="http://schemas.openxmlformats.org/wordprocessingml/2006/main" xmlns:w15="http://schemas.microsoft.com/office/word/2012/wordml" xmlns:w14="http://schemas.microsoft.com/office/word/2010/wordml" xmlns:m="http://schemas.openxmlformats.org/officeDocument/2006/math" xmlns:wp="http://schemas.openxmlformats.org/drawingml/2006/wordprocessingDrawing" xmlns:wp14="http://schemas.microsoft.com/office/word/2010/wordprocessingDrawing" xmlns:mc="http://schemas.openxmlformats.org/markup-compatibility/2006" xmlns:sl="http://schemas.openxmlformats.org/schemaLibrary/2006/main" xmlns:wne="http://schemas.microsoft.com/office/word/2006/wordml" xmlns:cdr="http://schemas.openxmlformats.org/drawingml/2006/chartDrawing" xmlns:c14="http://schemas.microsoft.com/office/drawing/2007/8/2/chart" xmlns:dgm="http://schemas.openxmlformats.org/drawingml/2006/diagram" xmlns:pic="http://schemas.openxmlformats.org/drawingml/2006/picture" xmlns:xdr="http://schemas.openxmlformats.org/drawingml/2006/spreadsheetDrawing" xmlns:dsp="http://schemas.microsoft.com/office/drawing/2008/diagram" xmlns:xvml="urn:schemas-microsoft-com:office:excel" xmlns:o="urn:schemas-microsoft-com:office:office" xmlns:v="urn:schemas-microsoft-com:vml" xmlns:w10="urn:schemas-microsoft-com:office:word" xmlns:pvml="urn:schemas-microsoft-com:office:powerpoint" xmlns:cppr="http://schemas.microsoft.com/office/2006/coverPageProps" xmlns:odx="http://opendope.org/xpaths" xmlns:odc="http://opendope.org/conditions" xmlns:odq="http://opendope.org/questions" xmlns:oda="http://opendope.org/answers" xmlns:odi="http://opendope.org/components" xmlns:odgm="http://opendope.org/SmartArt/DataHierarchy" xmlns:b="http://schemas.openxmlformats.org/officeDocument/2006/bibliography" xmlns:wps="http://schemas.microsoft.com/office/word/2010/wordprocessingShape" xmlns:w16se="http://schemas.microsoft.com/office/word/2015/wordml/symex" xmlns:w16cid="http://schemas.microsoft.com/office/word/2016/wordml/cid" xmlns:wetp="http://schemas.microsoft.com/office/webextensions/taskpanes/2010/11" xmlns:we="http://schemas.microsoft.com/office/webextensions/webextension/2010/11" xmlns:comp="http://schemas.openxmlformats.org/drawingml/2006/compatibility" xmlns:lc="http://schemas.openxmlformats.org/drawingml/2006/lockedCanvas">
             <c:ext xmlns:c16="http://schemas.microsoft.com/office/drawing/2014/chart" uri="{C3380CC4-5D6E-409C-BE32-E72D297353CC}">
               <c16:uniqueId val="{00000002-6147-E74A-AA7B-5531F0E4EE0C}"/>
             </c:ext>
@@ -3729,7 +3729,7 @@
     </c:plotArea>
     <c:plotVisOnly val="1"/>
     <c:dispBlanksAs val="gap"/>
-    <c:extLst xmlns:lc="http://schemas.openxmlformats.org/drawingml/2006/lockedCanvas" xmlns:comp="http://schemas.openxmlformats.org/drawingml/2006/compatibility" xmlns:we="http://schemas.microsoft.com/office/webextensions/webextension/2010/11" xmlns:wetp="http://schemas.microsoft.com/office/webextensions/taskpanes/2010/11" xmlns:w16cid="http://schemas.microsoft.com/office/word/2016/wordml/cid" xmlns:w16se="http://schemas.microsoft.com/office/word/2015/wordml/symex" xmlns:wps="http://schemas.microsoft.com/office/word/2010/wordprocessingShape" xmlns:b="http://schemas.openxmlformats.org/officeDocument/2006/bibliography" xmlns:odgm="http://opendope.org/SmartArt/DataHierarchy" xmlns:odi="http://opendope.org/components" xmlns:oda="http://opendope.org/answers" xmlns:odq="http://opendope.org/questions" xmlns:odc="http://opendope.org/conditions" xmlns:odx="http://opendope.org/xpaths" xmlns:cppr="http://schemas.microsoft.com/office/2006/coverPageProps" xmlns:pvml="urn:schemas-microsoft-com:office:powerpoint" xmlns:w10="urn:schemas-microsoft-com:office:word" xmlns:v="urn:schemas-microsoft-com:vml" xmlns:o="urn:schemas-microsoft-com:office:office" xmlns:xvml="urn:schemas-microsoft-com:office:excel" xmlns:dsp="http://schemas.microsoft.com/office/drawing/2008/diagram" xmlns:xdr="http://schemas.openxmlformats.org/drawingml/2006/spreadsheetDrawing" xmlns:pic="http://schemas.openxmlformats.org/drawingml/2006/picture" xmlns:dgm="http://schemas.openxmlformats.org/drawingml/2006/diagram" xmlns:c14="http://schemas.microsoft.com/office/drawing/2007/8/2/chart" xmlns:cdr="http://schemas.openxmlformats.org/drawingml/2006/chartDrawing" xmlns:wne="http://schemas.microsoft.com/office/word/2006/wordml" xmlns:sl="http://schemas.openxmlformats.org/schemaLibrary/2006/main" xmlns:mc="http://schemas.openxmlformats.org/markup-compatibility/2006" xmlns:wp14="http://schemas.microsoft.com/office/word/2010/wordprocessingDrawing" xmlns:wp="http://schemas.openxmlformats.org/drawingml/2006/wordprocessingDrawing" xmlns:m="http://schemas.openxmlformats.org/officeDocument/2006/math" xmlns:w14="http://schemas.microsoft.com/office/word/2010/wordml" xmlns:w15="http://schemas.microsoft.com/office/word/2012/wordml" xmlns:w="http://schemas.openxmlformats.org/wordprocessingml/2006/main">
+    <c:extLst xmlns:w="http://schemas.openxmlformats.org/wordprocessingml/2006/main" xmlns:w15="http://schemas.microsoft.com/office/word/2012/wordml" xmlns:w14="http://schemas.microsoft.com/office/word/2010/wordml" xmlns:m="http://schemas.openxmlformats.org/officeDocument/2006/math" xmlns:wp="http://schemas.openxmlformats.org/drawingml/2006/wordprocessingDrawing" xmlns:wp14="http://schemas.microsoft.com/office/word/2010/wordprocessingDrawing" xmlns:mc="http://schemas.openxmlformats.org/markup-compatibility/2006" xmlns:sl="http://schemas.openxmlformats.org/schemaLibrary/2006/main" xmlns:wne="http://schemas.microsoft.com/office/word/2006/wordml" xmlns:cdr="http://schemas.openxmlformats.org/drawingml/2006/chartDrawing" xmlns:c14="http://schemas.microsoft.com/office/drawing/2007/8/2/chart" xmlns:dgm="http://schemas.openxmlformats.org/drawingml/2006/diagram" xmlns:pic="http://schemas.openxmlformats.org/drawingml/2006/picture" xmlns:xdr="http://schemas.openxmlformats.org/drawingml/2006/spreadsheetDrawing" xmlns:dsp="http://schemas.microsoft.com/office/drawing/2008/diagram" xmlns:xvml="urn:schemas-microsoft-com:office:excel" xmlns:o="urn:schemas-microsoft-com:office:office" xmlns:v="urn:schemas-microsoft-com:vml" xmlns:w10="urn:schemas-microsoft-com:office:word" xmlns:pvml="urn:schemas-microsoft-com:office:powerpoint" xmlns:cppr="http://schemas.microsoft.com/office/2006/coverPageProps" xmlns:odx="http://opendope.org/xpaths" xmlns:odc="http://opendope.org/conditions" xmlns:odq="http://opendope.org/questions" xmlns:oda="http://opendope.org/answers" xmlns:odi="http://opendope.org/components" xmlns:odgm="http://opendope.org/SmartArt/DataHierarchy" xmlns:b="http://schemas.openxmlformats.org/officeDocument/2006/bibliography" xmlns:wps="http://schemas.microsoft.com/office/word/2010/wordprocessingShape" xmlns:w16se="http://schemas.microsoft.com/office/word/2015/wordml/symex" xmlns:w16cid="http://schemas.microsoft.com/office/word/2016/wordml/cid" xmlns:wetp="http://schemas.microsoft.com/office/webextensions/taskpanes/2010/11" xmlns:we="http://schemas.microsoft.com/office/webextensions/webextension/2010/11" xmlns:comp="http://schemas.openxmlformats.org/drawingml/2006/compatibility" xmlns:lc="http://schemas.openxmlformats.org/drawingml/2006/lockedCanvas">
       <c:ext xmlns:c16r3="http://schemas.microsoft.com/office/drawing/2017/03/chart" uri="{56B9EC1D-385E-4148-901F-78D8002777C0}">
         <c16r3:dataDisplayOptions16>
           <c16r3:dispNaAsBlank val="1"/>
@@ -3832,7 +3832,7 @@
                 </a:outerShdw>
               </a:effectLst>
             </c:spPr>
-            <c:extLst xmlns:lc="http://schemas.openxmlformats.org/drawingml/2006/lockedCanvas" xmlns:comp="http://schemas.openxmlformats.org/drawingml/2006/compatibility" xmlns:we="http://schemas.microsoft.com/office/webextensions/webextension/2010/11" xmlns:wetp="http://schemas.microsoft.com/office/webextensions/taskpanes/2010/11" xmlns:w16cid="http://schemas.microsoft.com/office/word/2016/wordml/cid" xmlns:w16se="http://schemas.microsoft.com/office/word/2015/wordml/symex" xmlns:wps="http://schemas.microsoft.com/office/word/2010/wordprocessingShape" xmlns:b="http://schemas.openxmlformats.org/officeDocument/2006/bibliography" xmlns:odgm="http://opendope.org/SmartArt/DataHierarchy" xmlns:odi="http://opendope.org/components" xmlns:oda="http://opendope.org/answers" xmlns:odq="http://opendope.org/questions" xmlns:odc="http://opendope.org/conditions" xmlns:odx="http://opendope.org/xpaths" xmlns:cppr="http://schemas.microsoft.com/office/2006/coverPageProps" xmlns:pvml="urn:schemas-microsoft-com:office:powerpoint" xmlns:w10="urn:schemas-microsoft-com:office:word" xmlns:v="urn:schemas-microsoft-com:vml" xmlns:o="urn:schemas-microsoft-com:office:office" xmlns:xvml="urn:schemas-microsoft-com:office:excel" xmlns:dsp="http://schemas.microsoft.com/office/drawing/2008/diagram" xmlns:xdr="http://schemas.openxmlformats.org/drawingml/2006/spreadsheetDrawing" xmlns:pic="http://schemas.openxmlformats.org/drawingml/2006/picture" xmlns:dgm="http://schemas.openxmlformats.org/drawingml/2006/diagram" xmlns:c14="http://schemas.microsoft.com/office/drawing/2007/8/2/chart" xmlns:cdr="http://schemas.openxmlformats.org/drawingml/2006/chartDrawing" xmlns:wne="http://schemas.microsoft.com/office/word/2006/wordml" xmlns:sl="http://schemas.openxmlformats.org/schemaLibrary/2006/main" xmlns:mc="http://schemas.openxmlformats.org/markup-compatibility/2006" xmlns:wp14="http://schemas.microsoft.com/office/word/2010/wordprocessingDrawing" xmlns:wp="http://schemas.openxmlformats.org/drawingml/2006/wordprocessingDrawing" xmlns:m="http://schemas.openxmlformats.org/officeDocument/2006/math" xmlns:w14="http://schemas.microsoft.com/office/word/2010/wordml" xmlns:w15="http://schemas.microsoft.com/office/word/2012/wordml" xmlns:w="http://schemas.openxmlformats.org/wordprocessingml/2006/main">
+            <c:extLst xmlns:w="http://schemas.openxmlformats.org/wordprocessingml/2006/main" xmlns:w15="http://schemas.microsoft.com/office/word/2012/wordml" xmlns:w14="http://schemas.microsoft.com/office/word/2010/wordml" xmlns:m="http://schemas.openxmlformats.org/officeDocument/2006/math" xmlns:wp="http://schemas.openxmlformats.org/drawingml/2006/wordprocessingDrawing" xmlns:wp14="http://schemas.microsoft.com/office/word/2010/wordprocessingDrawing" xmlns:mc="http://schemas.openxmlformats.org/markup-compatibility/2006" xmlns:sl="http://schemas.openxmlformats.org/schemaLibrary/2006/main" xmlns:wne="http://schemas.microsoft.com/office/word/2006/wordml" xmlns:cdr="http://schemas.openxmlformats.org/drawingml/2006/chartDrawing" xmlns:c14="http://schemas.microsoft.com/office/drawing/2007/8/2/chart" xmlns:dgm="http://schemas.openxmlformats.org/drawingml/2006/diagram" xmlns:pic="http://schemas.openxmlformats.org/drawingml/2006/picture" xmlns:xdr="http://schemas.openxmlformats.org/drawingml/2006/spreadsheetDrawing" xmlns:dsp="http://schemas.microsoft.com/office/drawing/2008/diagram" xmlns:xvml="urn:schemas-microsoft-com:office:excel" xmlns:o="urn:schemas-microsoft-com:office:office" xmlns:v="urn:schemas-microsoft-com:vml" xmlns:w10="urn:schemas-microsoft-com:office:word" xmlns:pvml="urn:schemas-microsoft-com:office:powerpoint" xmlns:cppr="http://schemas.microsoft.com/office/2006/coverPageProps" xmlns:odx="http://opendope.org/xpaths" xmlns:odc="http://opendope.org/conditions" xmlns:odq="http://opendope.org/questions" xmlns:oda="http://opendope.org/answers" xmlns:odi="http://opendope.org/components" xmlns:odgm="http://opendope.org/SmartArt/DataHierarchy" xmlns:b="http://schemas.openxmlformats.org/officeDocument/2006/bibliography" xmlns:wps="http://schemas.microsoft.com/office/word/2010/wordprocessingShape" xmlns:w16se="http://schemas.microsoft.com/office/word/2015/wordml/symex" xmlns:w16cid="http://schemas.microsoft.com/office/word/2016/wordml/cid" xmlns:wetp="http://schemas.microsoft.com/office/webextensions/taskpanes/2010/11" xmlns:we="http://schemas.microsoft.com/office/webextensions/webextension/2010/11" xmlns:comp="http://schemas.openxmlformats.org/drawingml/2006/compatibility" xmlns:lc="http://schemas.openxmlformats.org/drawingml/2006/lockedCanvas">
               <c:ext xmlns:c16="http://schemas.microsoft.com/office/drawing/2014/chart" uri="{C3380CC4-5D6E-409C-BE32-E72D297353CC}">
                 <c16:uniqueId val="{00000001-6147-E74A-AA7B-5531F0E4EE0C}"/>
               </c:ext>
@@ -3927,7 +3927,7 @@
               </c:numCache>
             </c:numRef>
           </c:val>
-          <c:extLst xmlns:lc="http://schemas.openxmlformats.org/drawingml/2006/lockedCanvas" xmlns:comp="http://schemas.openxmlformats.org/drawingml/2006/compatibility" xmlns:we="http://schemas.microsoft.com/office/webextensions/webextension/2010/11" xmlns:wetp="http://schemas.microsoft.com/office/webextensions/taskpanes/2010/11" xmlns:w16cid="http://schemas.microsoft.com/office/word/2016/wordml/cid" xmlns:w16se="http://schemas.microsoft.com/office/word/2015/wordml/symex" xmlns:wps="http://schemas.microsoft.com/office/word/2010/wordprocessingShape" xmlns:b="http://schemas.openxmlformats.org/officeDocument/2006/bibliography" xmlns:odgm="http://opendope.org/SmartArt/DataHierarchy" xmlns:odi="http://opendope.org/components" xmlns:oda="http://opendope.org/answers" xmlns:odq="http://opendope.org/questions" xmlns:odc="http://opendope.org/conditions" xmlns:odx="http://opendope.org/xpaths" xmlns:cppr="http://schemas.microsoft.com/office/2006/coverPageProps" xmlns:pvml="urn:schemas-microsoft-com:office:powerpoint" xmlns:w10="urn:schemas-microsoft-com:office:word" xmlns:v="urn:schemas-microsoft-com:vml" xmlns:o="urn:schemas-microsoft-com:office:office" xmlns:xvml="urn:schemas-microsoft-com:office:excel" xmlns:dsp="http://schemas.microsoft.com/office/drawing/2008/diagram" xmlns:xdr="http://schemas.openxmlformats.org/drawingml/2006/spreadsheetDrawing" xmlns:pic="http://schemas.openxmlformats.org/drawingml/2006/picture" xmlns:dgm="http://schemas.openxmlformats.org/drawingml/2006/diagram" xmlns:c14="http://schemas.microsoft.com/office/drawing/2007/8/2/chart" xmlns:cdr="http://schemas.openxmlformats.org/drawingml/2006/chartDrawing" xmlns:wne="http://schemas.microsoft.com/office/word/2006/wordml" xmlns:sl="http://schemas.openxmlformats.org/schemaLibrary/2006/main" xmlns:mc="http://schemas.openxmlformats.org/markup-compatibility/2006" xmlns:wp14="http://schemas.microsoft.com/office/word/2010/wordprocessingDrawing" xmlns:wp="http://schemas.openxmlformats.org/drawingml/2006/wordprocessingDrawing" xmlns:m="http://schemas.openxmlformats.org/officeDocument/2006/math" xmlns:w14="http://schemas.microsoft.com/office/word/2010/wordml" xmlns:w15="http://schemas.microsoft.com/office/word/2012/wordml" xmlns:w="http://schemas.openxmlformats.org/wordprocessingml/2006/main">
+          <c:extLst xmlns:w="http://schemas.openxmlformats.org/wordprocessingml/2006/main" xmlns:w15="http://schemas.microsoft.com/office/word/2012/wordml" xmlns:w14="http://schemas.microsoft.com/office/word/2010/wordml" xmlns:m="http://schemas.openxmlformats.org/officeDocument/2006/math" xmlns:wp="http://schemas.openxmlformats.org/drawingml/2006/wordprocessingDrawing" xmlns:wp14="http://schemas.microsoft.com/office/word/2010/wordprocessingDrawing" xmlns:mc="http://schemas.openxmlformats.org/markup-compatibility/2006" xmlns:sl="http://schemas.openxmlformats.org/schemaLibrary/2006/main" xmlns:wne="http://schemas.microsoft.com/office/word/2006/wordml" xmlns:cdr="http://schemas.openxmlformats.org/drawingml/2006/chartDrawing" xmlns:c14="http://schemas.microsoft.com/office/drawing/2007/8/2/chart" xmlns:dgm="http://schemas.openxmlformats.org/drawingml/2006/diagram" xmlns:pic="http://schemas.openxmlformats.org/drawingml/2006/picture" xmlns:xdr="http://schemas.openxmlformats.org/drawingml/2006/spreadsheetDrawing" xmlns:dsp="http://schemas.microsoft.com/office/drawing/2008/diagram" xmlns:xvml="urn:schemas-microsoft-com:office:excel" xmlns:o="urn:schemas-microsoft-com:office:office" xmlns:v="urn:schemas-microsoft-com:vml" xmlns:w10="urn:schemas-microsoft-com:office:word" xmlns:pvml="urn:schemas-microsoft-com:office:powerpoint" xmlns:cppr="http://schemas.microsoft.com/office/2006/coverPageProps" xmlns:odx="http://opendope.org/xpaths" xmlns:odc="http://opendope.org/conditions" xmlns:odq="http://opendope.org/questions" xmlns:oda="http://opendope.org/answers" xmlns:odi="http://opendope.org/components" xmlns:odgm="http://opendope.org/SmartArt/DataHierarchy" xmlns:b="http://schemas.openxmlformats.org/officeDocument/2006/bibliography" xmlns:wps="http://schemas.microsoft.com/office/word/2010/wordprocessingShape" xmlns:w16se="http://schemas.microsoft.com/office/word/2015/wordml/symex" xmlns:w16cid="http://schemas.microsoft.com/office/word/2016/wordml/cid" xmlns:wetp="http://schemas.microsoft.com/office/webextensions/taskpanes/2010/11" xmlns:we="http://schemas.microsoft.com/office/webextensions/webextension/2010/11" xmlns:comp="http://schemas.openxmlformats.org/drawingml/2006/compatibility" xmlns:lc="http://schemas.openxmlformats.org/drawingml/2006/lockedCanvas">
             <c:ext xmlns:c16="http://schemas.microsoft.com/office/drawing/2014/chart" uri="{C3380CC4-5D6E-409C-BE32-E72D297353CC}">
               <c16:uniqueId val="{00000002-6147-E74A-AA7B-5531F0E4EE0C}"/>
             </c:ext>
@@ -4537,7 +4537,7 @@
     </c:plotArea>
     <c:plotVisOnly val="1"/>
     <c:dispBlanksAs val="gap"/>
-    <c:extLst xmlns:lc="http://schemas.openxmlformats.org/drawingml/2006/lockedCanvas" xmlns:comp="http://schemas.openxmlformats.org/drawingml/2006/compatibility" xmlns:we="http://schemas.microsoft.com/office/webextensions/webextension/2010/11" xmlns:wetp="http://schemas.microsoft.com/office/webextensions/taskpanes/2010/11" xmlns:w16cid="http://schemas.microsoft.com/office/word/2016/wordml/cid" xmlns:w16se="http://schemas.microsoft.com/office/word/2015/wordml/symex" xmlns:wps="http://schemas.microsoft.com/office/word/2010/wordprocessingShape" xmlns:b="http://schemas.openxmlformats.org/officeDocument/2006/bibliography" xmlns:odgm="http://opendope.org/SmartArt/DataHierarchy" xmlns:odi="http://opendope.org/components" xmlns:oda="http://opendope.org/answers" xmlns:odq="http://opendope.org/questions" xmlns:odc="http://opendope.org/conditions" xmlns:odx="http://opendope.org/xpaths" xmlns:cppr="http://schemas.microsoft.com/office/2006/coverPageProps" xmlns:pvml="urn:schemas-microsoft-com:office:powerpoint" xmlns:w10="urn:schemas-microsoft-com:office:word" xmlns:v="urn:schemas-microsoft-com:vml" xmlns:o="urn:schemas-microsoft-com:office:office" xmlns:xvml="urn:schemas-microsoft-com:office:excel" xmlns:dsp="http://schemas.microsoft.com/office/drawing/2008/diagram" xmlns:xdr="http://schemas.openxmlformats.org/drawingml/2006/spreadsheetDrawing" xmlns:pic="http://schemas.openxmlformats.org/drawingml/2006/picture" xmlns:dgm="http://schemas.openxmlformats.org/drawingml/2006/diagram" xmlns:c14="http://schemas.microsoft.com/office/drawing/2007/8/2/chart" xmlns:cdr="http://schemas.openxmlformats.org/drawingml/2006/chartDrawing" xmlns:wne="http://schemas.microsoft.com/office/word/2006/wordml" xmlns:sl="http://schemas.openxmlformats.org/schemaLibrary/2006/main" xmlns:mc="http://schemas.openxmlformats.org/markup-compatibility/2006" xmlns:wp14="http://schemas.microsoft.com/office/word/2010/wordprocessingDrawing" xmlns:wp="http://schemas.openxmlformats.org/drawingml/2006/wordprocessingDrawing" xmlns:m="http://schemas.openxmlformats.org/officeDocument/2006/math" xmlns:w14="http://schemas.microsoft.com/office/word/2010/wordml" xmlns:w15="http://schemas.microsoft.com/office/word/2012/wordml" xmlns:w="http://schemas.openxmlformats.org/wordprocessingml/2006/main">
+    <c:extLst xmlns:w="http://schemas.openxmlformats.org/wordprocessingml/2006/main" xmlns:w15="http://schemas.microsoft.com/office/word/2012/wordml" xmlns:w14="http://schemas.microsoft.com/office/word/2010/wordml" xmlns:m="http://schemas.openxmlformats.org/officeDocument/2006/math" xmlns:wp="http://schemas.openxmlformats.org/drawingml/2006/wordprocessingDrawing" xmlns:wp14="http://schemas.microsoft.com/office/word/2010/wordprocessingDrawing" xmlns:mc="http://schemas.openxmlformats.org/markup-compatibility/2006" xmlns:sl="http://schemas.openxmlformats.org/schemaLibrary/2006/main" xmlns:wne="http://schemas.microsoft.com/office/word/2006/wordml" xmlns:cdr="http://schemas.openxmlformats.org/drawingml/2006/chartDrawing" xmlns:c14="http://schemas.microsoft.com/office/drawing/2007/8/2/chart" xmlns:dgm="http://schemas.openxmlformats.org/drawingml/2006/diagram" xmlns:pic="http://schemas.openxmlformats.org/drawingml/2006/picture" xmlns:xdr="http://schemas.openxmlformats.org/drawingml/2006/spreadsheetDrawing" xmlns:dsp="http://schemas.microsoft.com/office/drawing/2008/diagram" xmlns:xvml="urn:schemas-microsoft-com:office:excel" xmlns:o="urn:schemas-microsoft-com:office:office" xmlns:v="urn:schemas-microsoft-com:vml" xmlns:w10="urn:schemas-microsoft-com:office:word" xmlns:pvml="urn:schemas-microsoft-com:office:powerpoint" xmlns:cppr="http://schemas.microsoft.com/office/2006/coverPageProps" xmlns:odx="http://opendope.org/xpaths" xmlns:odc="http://opendope.org/conditions" xmlns:odq="http://opendope.org/questions" xmlns:oda="http://opendope.org/answers" xmlns:odi="http://opendope.org/components" xmlns:odgm="http://opendope.org/SmartArt/DataHierarchy" xmlns:b="http://schemas.openxmlformats.org/officeDocument/2006/bibliography" xmlns:wps="http://schemas.microsoft.com/office/word/2010/wordprocessingShape" xmlns:w16se="http://schemas.microsoft.com/office/word/2015/wordml/symex" xmlns:w16cid="http://schemas.microsoft.com/office/word/2016/wordml/cid" xmlns:wetp="http://schemas.microsoft.com/office/webextensions/taskpanes/2010/11" xmlns:we="http://schemas.microsoft.com/office/webextensions/webextension/2010/11" xmlns:comp="http://schemas.openxmlformats.org/drawingml/2006/compatibility" xmlns:lc="http://schemas.openxmlformats.org/drawingml/2006/lockedCanvas">
       <c:ext xmlns:c16r3="http://schemas.microsoft.com/office/drawing/2017/03/chart" uri="{56B9EC1D-385E-4148-901F-78D8002777C0}">
         <c16r3:dataDisplayOptions16>
           <c16r3:dispNaAsBlank val="1"/>
@@ -4640,7 +4640,7 @@
                 </a:outerShdw>
               </a:effectLst>
             </c:spPr>
-            <c:extLst xmlns:lc="http://schemas.openxmlformats.org/drawingml/2006/lockedCanvas" xmlns:comp="http://schemas.openxmlformats.org/drawingml/2006/compatibility" xmlns:we="http://schemas.microsoft.com/office/webextensions/webextension/2010/11" xmlns:wetp="http://schemas.microsoft.com/office/webextensions/taskpanes/2010/11" xmlns:w16cid="http://schemas.microsoft.com/office/word/2016/wordml/cid" xmlns:w16se="http://schemas.microsoft.com/office/word/2015/wordml/symex" xmlns:wps="http://schemas.microsoft.com/office/word/2010/wordprocessingShape" xmlns:b="http://schemas.openxmlformats.org/officeDocument/2006/bibliography" xmlns:odgm="http://opendope.org/SmartArt/DataHierarchy" xmlns:odi="http://opendope.org/components" xmlns:oda="http://opendope.org/answers" xmlns:odq="http://opendope.org/questions" xmlns:odc="http://opendope.org/conditions" xmlns:odx="http://opendope.org/xpaths" xmlns:cppr="http://schemas.microsoft.com/office/2006/coverPageProps" xmlns:pvml="urn:schemas-microsoft-com:office:powerpoint" xmlns:w10="urn:schemas-microsoft-com:office:word" xmlns:v="urn:schemas-microsoft-com:vml" xmlns:o="urn:schemas-microsoft-com:office:office" xmlns:xvml="urn:schemas-microsoft-com:office:excel" xmlns:dsp="http://schemas.microsoft.com/office/drawing/2008/diagram" xmlns:xdr="http://schemas.openxmlformats.org/drawingml/2006/spreadsheetDrawing" xmlns:pic="http://schemas.openxmlformats.org/drawingml/2006/picture" xmlns:dgm="http://schemas.openxmlformats.org/drawingml/2006/diagram" xmlns:c14="http://schemas.microsoft.com/office/drawing/2007/8/2/chart" xmlns:cdr="http://schemas.openxmlformats.org/drawingml/2006/chartDrawing" xmlns:wne="http://schemas.microsoft.com/office/word/2006/wordml" xmlns:sl="http://schemas.openxmlformats.org/schemaLibrary/2006/main" xmlns:mc="http://schemas.openxmlformats.org/markup-compatibility/2006" xmlns:wp14="http://schemas.microsoft.com/office/word/2010/wordprocessingDrawing" xmlns:wp="http://schemas.openxmlformats.org/drawingml/2006/wordprocessingDrawing" xmlns:m="http://schemas.openxmlformats.org/officeDocument/2006/math" xmlns:w14="http://schemas.microsoft.com/office/word/2010/wordml" xmlns:w15="http://schemas.microsoft.com/office/word/2012/wordml" xmlns:w="http://schemas.openxmlformats.org/wordprocessingml/2006/main">
+            <c:extLst xmlns:w="http://schemas.openxmlformats.org/wordprocessingml/2006/main" xmlns:w15="http://schemas.microsoft.com/office/word/2012/wordml" xmlns:w14="http://schemas.microsoft.com/office/word/2010/wordml" xmlns:m="http://schemas.openxmlformats.org/officeDocument/2006/math" xmlns:wp="http://schemas.openxmlformats.org/drawingml/2006/wordprocessingDrawing" xmlns:wp14="http://schemas.microsoft.com/office/word/2010/wordprocessingDrawing" xmlns:mc="http://schemas.openxmlformats.org/markup-compatibility/2006" xmlns:sl="http://schemas.openxmlformats.org/schemaLibrary/2006/main" xmlns:wne="http://schemas.microsoft.com/office/word/2006/wordml" xmlns:cdr="http://schemas.openxmlformats.org/drawingml/2006/chartDrawing" xmlns:c14="http://schemas.microsoft.com/office/drawing/2007/8/2/chart" xmlns:dgm="http://schemas.openxmlformats.org/drawingml/2006/diagram" xmlns:pic="http://schemas.openxmlformats.org/drawingml/2006/picture" xmlns:xdr="http://schemas.openxmlformats.org/drawingml/2006/spreadsheetDrawing" xmlns:dsp="http://schemas.microsoft.com/office/drawing/2008/diagram" xmlns:xvml="urn:schemas-microsoft-com:office:excel" xmlns:o="urn:schemas-microsoft-com:office:office" xmlns:v="urn:schemas-microsoft-com:vml" xmlns:w10="urn:schemas-microsoft-com:office:word" xmlns:pvml="urn:schemas-microsoft-com:office:powerpoint" xmlns:cppr="http://schemas.microsoft.com/office/2006/coverPageProps" xmlns:odx="http://opendope.org/xpaths" xmlns:odc="http://opendope.org/conditions" xmlns:odq="http://opendope.org/questions" xmlns:oda="http://opendope.org/answers" xmlns:odi="http://opendope.org/components" xmlns:odgm="http://opendope.org/SmartArt/DataHierarchy" xmlns:b="http://schemas.openxmlformats.org/officeDocument/2006/bibliography" xmlns:wps="http://schemas.microsoft.com/office/word/2010/wordprocessingShape" xmlns:w16se="http://schemas.microsoft.com/office/word/2015/wordml/symex" xmlns:w16cid="http://schemas.microsoft.com/office/word/2016/wordml/cid" xmlns:wetp="http://schemas.microsoft.com/office/webextensions/taskpanes/2010/11" xmlns:we="http://schemas.microsoft.com/office/webextensions/webextension/2010/11" xmlns:comp="http://schemas.openxmlformats.org/drawingml/2006/compatibility" xmlns:lc="http://schemas.openxmlformats.org/drawingml/2006/lockedCanvas">
               <c:ext xmlns:c16="http://schemas.microsoft.com/office/drawing/2014/chart" uri="{C3380CC4-5D6E-409C-BE32-E72D297353CC}">
                 <c16:uniqueId val="{00000001-6147-E74A-AA7B-5531F0E4EE0C}"/>
               </c:ext>
@@ -4735,7 +4735,7 @@
               </c:numCache>
             </c:numRef>
           </c:val>
-          <c:extLst xmlns:lc="http://schemas.openxmlformats.org/drawingml/2006/lockedCanvas" xmlns:comp="http://schemas.openxmlformats.org/drawingml/2006/compatibility" xmlns:we="http://schemas.microsoft.com/office/webextensions/webextension/2010/11" xmlns:wetp="http://schemas.microsoft.com/office/webextensions/taskpanes/2010/11" xmlns:w16cid="http://schemas.microsoft.com/office/word/2016/wordml/cid" xmlns:w16se="http://schemas.microsoft.com/office/word/2015/wordml/symex" xmlns:wps="http://schemas.microsoft.com/office/word/2010/wordprocessingShape" xmlns:b="http://schemas.openxmlformats.org/officeDocument/2006/bibliography" xmlns:odgm="http://opendope.org/SmartArt/DataHierarchy" xmlns:odi="http://opendope.org/components" xmlns:oda="http://opendope.org/answers" xmlns:odq="http://opendope.org/questions" xmlns:odc="http://opendope.org/conditions" xmlns:odx="http://opendope.org/xpaths" xmlns:cppr="http://schemas.microsoft.com/office/2006/coverPageProps" xmlns:pvml="urn:schemas-microsoft-com:office:powerpoint" xmlns:w10="urn:schemas-microsoft-com:office:word" xmlns:v="urn:schemas-microsoft-com:vml" xmlns:o="urn:schemas-microsoft-com:office:office" xmlns:xvml="urn:schemas-microsoft-com:office:excel" xmlns:dsp="http://schemas.microsoft.com/office/drawing/2008/diagram" xmlns:xdr="http://schemas.openxmlformats.org/drawingml/2006/spreadsheetDrawing" xmlns:pic="http://schemas.openxmlformats.org/drawingml/2006/picture" xmlns:dgm="http://schemas.openxmlformats.org/drawingml/2006/diagram" xmlns:c14="http://schemas.microsoft.com/office/drawing/2007/8/2/chart" xmlns:cdr="http://schemas.openxmlformats.org/drawingml/2006/chartDrawing" xmlns:wne="http://schemas.microsoft.com/office/word/2006/wordml" xmlns:sl="http://schemas.openxmlformats.org/schemaLibrary/2006/main" xmlns:mc="http://schemas.openxmlformats.org/markup-compatibility/2006" xmlns:wp14="http://schemas.microsoft.com/office/word/2010/wordprocessingDrawing" xmlns:wp="http://schemas.openxmlformats.org/drawingml/2006/wordprocessingDrawing" xmlns:m="http://schemas.openxmlformats.org/officeDocument/2006/math" xmlns:w14="http://schemas.microsoft.com/office/word/2010/wordml" xmlns:w15="http://schemas.microsoft.com/office/word/2012/wordml" xmlns:w="http://schemas.openxmlformats.org/wordprocessingml/2006/main">
+          <c:extLst xmlns:w="http://schemas.openxmlformats.org/wordprocessingml/2006/main" xmlns:w15="http://schemas.microsoft.com/office/word/2012/wordml" xmlns:w14="http://schemas.microsoft.com/office/word/2010/wordml" xmlns:m="http://schemas.openxmlformats.org/officeDocument/2006/math" xmlns:wp="http://schemas.openxmlformats.org/drawingml/2006/wordprocessingDrawing" xmlns:wp14="http://schemas.microsoft.com/office/word/2010/wordprocessingDrawing" xmlns:mc="http://schemas.openxmlformats.org/markup-compatibility/2006" xmlns:sl="http://schemas.openxmlformats.org/schemaLibrary/2006/main" xmlns:wne="http://schemas.microsoft.com/office/word/2006/wordml" xmlns:cdr="http://schemas.openxmlformats.org/drawingml/2006/chartDrawing" xmlns:c14="http://schemas.microsoft.com/office/drawing/2007/8/2/chart" xmlns:dgm="http://schemas.openxmlformats.org/drawingml/2006/diagram" xmlns:pic="http://schemas.openxmlformats.org/drawingml/2006/picture" xmlns:xdr="http://schemas.openxmlformats.org/drawingml/2006/spreadsheetDrawing" xmlns:dsp="http://schemas.microsoft.com/office/drawing/2008/diagram" xmlns:xvml="urn:schemas-microsoft-com:office:excel" xmlns:o="urn:schemas-microsoft-com:office:office" xmlns:v="urn:schemas-microsoft-com:vml" xmlns:w10="urn:schemas-microsoft-com:office:word" xmlns:pvml="urn:schemas-microsoft-com:office:powerpoint" xmlns:cppr="http://schemas.microsoft.com/office/2006/coverPageProps" xmlns:odx="http://opendope.org/xpaths" xmlns:odc="http://opendope.org/conditions" xmlns:odq="http://opendope.org/questions" xmlns:oda="http://opendope.org/answers" xmlns:odi="http://opendope.org/components" xmlns:odgm="http://opendope.org/SmartArt/DataHierarchy" xmlns:b="http://schemas.openxmlformats.org/officeDocument/2006/bibliography" xmlns:wps="http://schemas.microsoft.com/office/word/2010/wordprocessingShape" xmlns:w16se="http://schemas.microsoft.com/office/word/2015/wordml/symex" xmlns:w16cid="http://schemas.microsoft.com/office/word/2016/wordml/cid" xmlns:wetp="http://schemas.microsoft.com/office/webextensions/taskpanes/2010/11" xmlns:we="http://schemas.microsoft.com/office/webextensions/webextension/2010/11" xmlns:comp="http://schemas.openxmlformats.org/drawingml/2006/compatibility" xmlns:lc="http://schemas.openxmlformats.org/drawingml/2006/lockedCanvas">
             <c:ext xmlns:c16="http://schemas.microsoft.com/office/drawing/2014/chart" uri="{C3380CC4-5D6E-409C-BE32-E72D297353CC}">
               <c16:uniqueId val="{00000002-6147-E74A-AA7B-5531F0E4EE0C}"/>
             </c:ext>
@@ -5345,7 +5345,7 @@
     </c:plotArea>
     <c:plotVisOnly val="1"/>
     <c:dispBlanksAs val="gap"/>
-    <c:extLst xmlns:lc="http://schemas.openxmlformats.org/drawingml/2006/lockedCanvas" xmlns:comp="http://schemas.openxmlformats.org/drawingml/2006/compatibility" xmlns:we="http://schemas.microsoft.com/office/webextensions/webextension/2010/11" xmlns:wetp="http://schemas.microsoft.com/office/webextensions/taskpanes/2010/11" xmlns:w16cid="http://schemas.microsoft.com/office/word/2016/wordml/cid" xmlns:w16se="http://schemas.microsoft.com/office/word/2015/wordml/symex" xmlns:wps="http://schemas.microsoft.com/office/word/2010/wordprocessingShape" xmlns:b="http://schemas.openxmlformats.org/officeDocument/2006/bibliography" xmlns:odgm="http://opendope.org/SmartArt/DataHierarchy" xmlns:odi="http://opendope.org/components" xmlns:oda="http://opendope.org/answers" xmlns:odq="http://opendope.org/questions" xmlns:odc="http://opendope.org/conditions" xmlns:odx="http://opendope.org/xpaths" xmlns:cppr="http://schemas.microsoft.com/office/2006/coverPageProps" xmlns:pvml="urn:schemas-microsoft-com:office:powerpoint" xmlns:w10="urn:schemas-microsoft-com:office:word" xmlns:v="urn:schemas-microsoft-com:vml" xmlns:o="urn:schemas-microsoft-com:office:office" xmlns:xvml="urn:schemas-microsoft-com:office:excel" xmlns:dsp="http://schemas.microsoft.com/office/drawing/2008/diagram" xmlns:xdr="http://schemas.openxmlformats.org/drawingml/2006/spreadsheetDrawing" xmlns:pic="http://schemas.openxmlformats.org/drawingml/2006/picture" xmlns:dgm="http://schemas.openxmlformats.org/drawingml/2006/diagram" xmlns:c14="http://schemas.microsoft.com/office/drawing/2007/8/2/chart" xmlns:cdr="http://schemas.openxmlformats.org/drawingml/2006/chartDrawing" xmlns:wne="http://schemas.microsoft.com/office/word/2006/wordml" xmlns:sl="http://schemas.openxmlformats.org/schemaLibrary/2006/main" xmlns:mc="http://schemas.openxmlformats.org/markup-compatibility/2006" xmlns:wp14="http://schemas.microsoft.com/office/word/2010/wordprocessingDrawing" xmlns:wp="http://schemas.openxmlformats.org/drawingml/2006/wordprocessingDrawing" xmlns:m="http://schemas.openxmlformats.org/officeDocument/2006/math" xmlns:w14="http://schemas.microsoft.com/office/word/2010/wordml" xmlns:w15="http://schemas.microsoft.com/office/word/2012/wordml" xmlns:w="http://schemas.openxmlformats.org/wordprocessingml/2006/main">
+    <c:extLst xmlns:w="http://schemas.openxmlformats.org/wordprocessingml/2006/main" xmlns:w15="http://schemas.microsoft.com/office/word/2012/wordml" xmlns:w14="http://schemas.microsoft.com/office/word/2010/wordml" xmlns:m="http://schemas.openxmlformats.org/officeDocument/2006/math" xmlns:wp="http://schemas.openxmlformats.org/drawingml/2006/wordprocessingDrawing" xmlns:wp14="http://schemas.microsoft.com/office/word/2010/wordprocessingDrawing" xmlns:mc="http://schemas.openxmlformats.org/markup-compatibility/2006" xmlns:sl="http://schemas.openxmlformats.org/schemaLibrary/2006/main" xmlns:wne="http://schemas.microsoft.com/office/word/2006/wordml" xmlns:cdr="http://schemas.openxmlformats.org/drawingml/2006/chartDrawing" xmlns:c14="http://schemas.microsoft.com/office/drawing/2007/8/2/chart" xmlns:dgm="http://schemas.openxmlformats.org/drawingml/2006/diagram" xmlns:pic="http://schemas.openxmlformats.org/drawingml/2006/picture" xmlns:xdr="http://schemas.openxmlformats.org/drawingml/2006/spreadsheetDrawing" xmlns:dsp="http://schemas.microsoft.com/office/drawing/2008/diagram" xmlns:xvml="urn:schemas-microsoft-com:office:excel" xmlns:o="urn:schemas-microsoft-com:office:office" xmlns:v="urn:schemas-microsoft-com:vml" xmlns:w10="urn:schemas-microsoft-com:office:word" xmlns:pvml="urn:schemas-microsoft-com:office:powerpoint" xmlns:cppr="http://schemas.microsoft.com/office/2006/coverPageProps" xmlns:odx="http://opendope.org/xpaths" xmlns:odc="http://opendope.org/conditions" xmlns:odq="http://opendope.org/questions" xmlns:oda="http://opendope.org/answers" xmlns:odi="http://opendope.org/components" xmlns:odgm="http://opendope.org/SmartArt/DataHierarchy" xmlns:b="http://schemas.openxmlformats.org/officeDocument/2006/bibliography" xmlns:wps="http://schemas.microsoft.com/office/word/2010/wordprocessingShape" xmlns:w16se="http://schemas.microsoft.com/office/word/2015/wordml/symex" xmlns:w16cid="http://schemas.microsoft.com/office/word/2016/wordml/cid" xmlns:wetp="http://schemas.microsoft.com/office/webextensions/taskpanes/2010/11" xmlns:we="http://schemas.microsoft.com/office/webextensions/webextension/2010/11" xmlns:comp="http://schemas.openxmlformats.org/drawingml/2006/compatibility" xmlns:lc="http://schemas.openxmlformats.org/drawingml/2006/lockedCanvas">
       <c:ext xmlns:c16r3="http://schemas.microsoft.com/office/drawing/2017/03/chart" uri="{56B9EC1D-385E-4148-901F-78D8002777C0}">
         <c16r3:dataDisplayOptions16>
           <c16r3:dispNaAsBlank val="1"/>
@@ -9146,7 +9146,7 @@
           <a:p>
             <a:fld id="{C1255C68-584F-174D-BB81-51BF91708794}" type="datetimeFigureOut">
               <a:rPr lang="en-US" smtClean="0"/>
-              <a:t>8/6/25</a:t>
+              <a:t>8/8/25</a:t>
             </a:fld>
             <a:endParaRPr lang="en-US"/>
           </a:p>
@@ -9323,7 +9323,7 @@
           <a:p>
             <a:fld id="{A1EDAAC4-819D-C544-9EA1-C73624CFD70B}" type="datetimeFigureOut">
               <a:rPr lang="en-US" smtClean="0"/>
-              <a:t>8/6/25</a:t>
+              <a:t>8/8/25</a:t>
             </a:fld>
             <a:endParaRPr lang="en-US"/>
           </a:p>
@@ -30692,11 +30692,11 @@
           <a:p>
             <a:r>
               <a:rPr lang="en-US"/>
-              <a:t>Progress towards objectives since </a:t>
+              <a:t>Progress towards objectives between </a:t>
             </a:r>
             <a:r>
               <a:rPr lang="en-US" dirty="0"/>
-              <a:t>OBJECTIVES_PERIOD_START</a:t>
+              <a:t>OBJECTIVES_PERIOD_START and OBJECTIVES_PERIOD_END</a:t>
             </a:r>
             <a:endParaRPr lang="en-US"/>
           </a:p>
@@ -31043,11 +31043,11 @@
           <a:p>
             <a:r>
               <a:rPr lang="en-US"/>
-              <a:t>Progress towards objectives per team since </a:t>
+              <a:t>Progress towards objectives per team between </a:t>
             </a:r>
             <a:r>
               <a:rPr lang="en-US" dirty="0"/>
-              <a:t>OBJECTIVES_PERIOD_START</a:t>
+              <a:t>OBJECTIVES_PERIOD_START and OBJECTIVES_PERIOD_END</a:t>
             </a:r>
             <a:endParaRPr lang="en-US"/>
           </a:p>
@@ -34106,14 +34106,12 @@
 </file>
 
 <file path=customXml/item1.xml><?xml version="1.0" encoding="utf-8"?>
-<p:properties xmlns:p="http://schemas.microsoft.com/office/2006/metadata/properties" xmlns:xsi="http://www.w3.org/2001/XMLSchema-instance" xmlns:pc="http://schemas.microsoft.com/office/infopath/2007/PartnerControls">
-  <documentManagement>
-    <lcf76f155ced4ddcb4097134ff3c332f xmlns="fa937df2-abe2-4d38-b5f4-c228acba3827">
-      <Terms xmlns="http://schemas.microsoft.com/office/infopath/2007/PartnerControls"/>
-    </lcf76f155ced4ddcb4097134ff3c332f>
-    <TaxCatchAll xmlns="bc8ba18a-4a58-4ad2-bfc0-6516af8e7dc2" xsi:nil="true"/>
-  </documentManagement>
-</p:properties>
+<?mso-contentType ?>
+<FormTemplates xmlns="http://schemas.microsoft.com/sharepoint/v3/contenttype/forms">
+  <Display>DocumentLibraryForm</Display>
+  <Edit>DocumentLibraryForm</Edit>
+  <New>DocumentLibraryForm</New>
+</FormTemplates>
 </file>
 
 <file path=customXml/item2.xml><?xml version="1.0" encoding="utf-8"?>
@@ -34340,27 +34338,20 @@
 </file>
 
 <file path=customXml/item3.xml><?xml version="1.0" encoding="utf-8"?>
-<?mso-contentType ?>
-<FormTemplates xmlns="http://schemas.microsoft.com/sharepoint/v3/contenttype/forms">
-  <Display>DocumentLibraryForm</Display>
-  <Edit>DocumentLibraryForm</Edit>
-  <New>DocumentLibraryForm</New>
-</FormTemplates>
+<p:properties xmlns:p="http://schemas.microsoft.com/office/2006/metadata/properties" xmlns:xsi="http://www.w3.org/2001/XMLSchema-instance" xmlns:pc="http://schemas.microsoft.com/office/infopath/2007/PartnerControls">
+  <documentManagement>
+    <lcf76f155ced4ddcb4097134ff3c332f xmlns="fa937df2-abe2-4d38-b5f4-c228acba3827">
+      <Terms xmlns="http://schemas.microsoft.com/office/infopath/2007/PartnerControls"/>
+    </lcf76f155ced4ddcb4097134ff3c332f>
+    <TaxCatchAll xmlns="bc8ba18a-4a58-4ad2-bfc0-6516af8e7dc2" xsi:nil="true"/>
+  </documentManagement>
+</p:properties>
 </file>
 
 <file path=customXml/itemProps1.xml><?xml version="1.0" encoding="utf-8"?>
-<ds:datastoreItem xmlns:ds="http://schemas.openxmlformats.org/officeDocument/2006/customXml" ds:itemID="{4B629362-CF15-4610-8FAC-A8E699942233}">
+<ds:datastoreItem xmlns:ds="http://schemas.openxmlformats.org/officeDocument/2006/customXml" ds:itemID="{570928F0-D7CA-4732-B7F3-1F945720D0AA}">
   <ds:schemaRefs>
-    <ds:schemaRef ds:uri="http://schemas.microsoft.com/office/2006/documentManagement/types"/>
-    <ds:schemaRef ds:uri="http://purl.org/dc/elements/1.1/"/>
-    <ds:schemaRef ds:uri="bc8ba18a-4a58-4ad2-bfc0-6516af8e7dc2"/>
-    <ds:schemaRef ds:uri="http://purl.org/dc/terms/"/>
-    <ds:schemaRef ds:uri="http://www.w3.org/XML/1998/namespace"/>
-    <ds:schemaRef ds:uri="http://schemas.microsoft.com/office/2006/metadata/properties"/>
-    <ds:schemaRef ds:uri="http://schemas.microsoft.com/office/infopath/2007/PartnerControls"/>
-    <ds:schemaRef ds:uri="http://schemas.openxmlformats.org/package/2006/metadata/core-properties"/>
-    <ds:schemaRef ds:uri="fa937df2-abe2-4d38-b5f4-c228acba3827"/>
-    <ds:schemaRef ds:uri="http://purl.org/dc/dcmitype/"/>
+    <ds:schemaRef ds:uri="http://schemas.microsoft.com/sharepoint/v3/contenttype/forms"/>
   </ds:schemaRefs>
 </ds:datastoreItem>
 </file>
@@ -34385,9 +34376,18 @@
 </file>
 
 <file path=customXml/itemProps3.xml><?xml version="1.0" encoding="utf-8"?>
-<ds:datastoreItem xmlns:ds="http://schemas.openxmlformats.org/officeDocument/2006/customXml" ds:itemID="{570928F0-D7CA-4732-B7F3-1F945720D0AA}">
+<ds:datastoreItem xmlns:ds="http://schemas.openxmlformats.org/officeDocument/2006/customXml" ds:itemID="{4B629362-CF15-4610-8FAC-A8E699942233}">
   <ds:schemaRefs>
-    <ds:schemaRef ds:uri="http://schemas.microsoft.com/sharepoint/v3/contenttype/forms"/>
+    <ds:schemaRef ds:uri="http://schemas.microsoft.com/office/2006/documentManagement/types"/>
+    <ds:schemaRef ds:uri="http://purl.org/dc/elements/1.1/"/>
+    <ds:schemaRef ds:uri="bc8ba18a-4a58-4ad2-bfc0-6516af8e7dc2"/>
+    <ds:schemaRef ds:uri="http://purl.org/dc/terms/"/>
+    <ds:schemaRef ds:uri="http://www.w3.org/XML/1998/namespace"/>
+    <ds:schemaRef ds:uri="http://schemas.microsoft.com/office/2006/metadata/properties"/>
+    <ds:schemaRef ds:uri="http://schemas.microsoft.com/office/infopath/2007/PartnerControls"/>
+    <ds:schemaRef ds:uri="http://schemas.openxmlformats.org/package/2006/metadata/core-properties"/>
+    <ds:schemaRef ds:uri="fa937df2-abe2-4d38-b5f4-c228acba3827"/>
+    <ds:schemaRef ds:uri="http://purl.org/dc/dcmitype/"/>
   </ds:schemaRefs>
 </ds:datastoreItem>
 </file>
</xml_diff>

<commit_message>
Add one more breakdown.
</commit_message>
<xml_diff>
--- a/report-generator/src/report_generator/presets/templates/objectives.pptx
+++ b/report-generator/src/report_generator/presets/templates/objectives.pptx
@@ -5,22 +5,23 @@
     <p:sldMasterId id="2147483648" r:id="rId4"/>
   </p:sldMasterIdLst>
   <p:notesMasterIdLst>
-    <p:notesMasterId r:id="rId15"/>
+    <p:notesMasterId r:id="rId16"/>
   </p:notesMasterIdLst>
   <p:handoutMasterIdLst>
-    <p:handoutMasterId r:id="rId16"/>
+    <p:handoutMasterId r:id="rId17"/>
   </p:handoutMasterIdLst>
   <p:sldIdLst>
     <p:sldId id="561" r:id="rId5"/>
     <p:sldId id="598" r:id="rId6"/>
     <p:sldId id="605" r:id="rId7"/>
-    <p:sldId id="604" r:id="rId8"/>
-    <p:sldId id="599" r:id="rId9"/>
-    <p:sldId id="600" r:id="rId10"/>
-    <p:sldId id="603" r:id="rId11"/>
-    <p:sldId id="602" r:id="rId12"/>
-    <p:sldId id="601" r:id="rId13"/>
-    <p:sldId id="597" r:id="rId14"/>
+    <p:sldId id="606" r:id="rId8"/>
+    <p:sldId id="604" r:id="rId9"/>
+    <p:sldId id="599" r:id="rId10"/>
+    <p:sldId id="600" r:id="rId11"/>
+    <p:sldId id="603" r:id="rId12"/>
+    <p:sldId id="602" r:id="rId13"/>
+    <p:sldId id="601" r:id="rId14"/>
+    <p:sldId id="597" r:id="rId15"/>
   </p:sldIdLst>
   <p:sldSz cx="12192000" cy="6858000"/>
   <p:notesSz cx="6858000" cy="9144000"/>
@@ -1355,7 +1356,7 @@
     <c:plotArea>
       <c:layout/>
       <c:barChart>
-        <c:barDir val="col"/>
+        <c:barDir val="bar"/>
         <c:grouping val="percentStacked"/>
         <c:varyColors val="0"/>
         <c:ser>
@@ -1408,7 +1409,7 @@
                 </a:outerShdw>
               </a:effectLst>
             </c:spPr>
-            <c:extLst xmlns:lc="http://schemas.openxmlformats.org/drawingml/2006/lockedCanvas" xmlns:comp="http://schemas.openxmlformats.org/drawingml/2006/compatibility" xmlns:we="http://schemas.microsoft.com/office/webextensions/webextension/2010/11" xmlns:wetp="http://schemas.microsoft.com/office/webextensions/taskpanes/2010/11" xmlns:w16cid="http://schemas.microsoft.com/office/word/2016/wordml/cid" xmlns:w16se="http://schemas.microsoft.com/office/word/2015/wordml/symex" xmlns:wps="http://schemas.microsoft.com/office/word/2010/wordprocessingShape" xmlns:b="http://schemas.openxmlformats.org/officeDocument/2006/bibliography" xmlns:odgm="http://opendope.org/SmartArt/DataHierarchy" xmlns:odi="http://opendope.org/components" xmlns:oda="http://opendope.org/answers" xmlns:odq="http://opendope.org/questions" xmlns:odc="http://opendope.org/conditions" xmlns:odx="http://opendope.org/xpaths" xmlns:cppr="http://schemas.microsoft.com/office/2006/coverPageProps" xmlns:pvml="urn:schemas-microsoft-com:office:powerpoint" xmlns:w10="urn:schemas-microsoft-com:office:word" xmlns:v="urn:schemas-microsoft-com:vml" xmlns:o="urn:schemas-microsoft-com:office:office" xmlns:xvml="urn:schemas-microsoft-com:office:excel" xmlns:dsp="http://schemas.microsoft.com/office/drawing/2008/diagram" xmlns:xdr="http://schemas.openxmlformats.org/drawingml/2006/spreadsheetDrawing" xmlns:pic="http://schemas.openxmlformats.org/drawingml/2006/picture" xmlns:dgm="http://schemas.openxmlformats.org/drawingml/2006/diagram" xmlns:c14="http://schemas.microsoft.com/office/drawing/2007/8/2/chart" xmlns:cdr="http://schemas.openxmlformats.org/drawingml/2006/chartDrawing" xmlns:wne="http://schemas.microsoft.com/office/word/2006/wordml" xmlns:sl="http://schemas.openxmlformats.org/schemaLibrary/2006/main" xmlns:mc="http://schemas.openxmlformats.org/markup-compatibility/2006" xmlns:wp14="http://schemas.microsoft.com/office/word/2010/wordprocessingDrawing" xmlns:wp="http://schemas.openxmlformats.org/drawingml/2006/wordprocessingDrawing" xmlns:m="http://schemas.openxmlformats.org/officeDocument/2006/math" xmlns:w14="http://schemas.microsoft.com/office/word/2010/wordml" xmlns:w15="http://schemas.microsoft.com/office/word/2012/wordml" xmlns:w="http://schemas.openxmlformats.org/wordprocessingml/2006/main">
+            <c:extLst xmlns:w="http://schemas.openxmlformats.org/wordprocessingml/2006/main" xmlns:w15="http://schemas.microsoft.com/office/word/2012/wordml" xmlns:w14="http://schemas.microsoft.com/office/word/2010/wordml" xmlns:m="http://schemas.openxmlformats.org/officeDocument/2006/math" xmlns:wp="http://schemas.openxmlformats.org/drawingml/2006/wordprocessingDrawing" xmlns:wp14="http://schemas.microsoft.com/office/word/2010/wordprocessingDrawing" xmlns:mc="http://schemas.openxmlformats.org/markup-compatibility/2006" xmlns:sl="http://schemas.openxmlformats.org/schemaLibrary/2006/main" xmlns:wne="http://schemas.microsoft.com/office/word/2006/wordml" xmlns:cdr="http://schemas.openxmlformats.org/drawingml/2006/chartDrawing" xmlns:c14="http://schemas.microsoft.com/office/drawing/2007/8/2/chart" xmlns:dgm="http://schemas.openxmlformats.org/drawingml/2006/diagram" xmlns:pic="http://schemas.openxmlformats.org/drawingml/2006/picture" xmlns:xdr="http://schemas.openxmlformats.org/drawingml/2006/spreadsheetDrawing" xmlns:dsp="http://schemas.microsoft.com/office/drawing/2008/diagram" xmlns:xvml="urn:schemas-microsoft-com:office:excel" xmlns:o="urn:schemas-microsoft-com:office:office" xmlns:v="urn:schemas-microsoft-com:vml" xmlns:w10="urn:schemas-microsoft-com:office:word" xmlns:pvml="urn:schemas-microsoft-com:office:powerpoint" xmlns:cppr="http://schemas.microsoft.com/office/2006/coverPageProps" xmlns:odx="http://opendope.org/xpaths" xmlns:odc="http://opendope.org/conditions" xmlns:odq="http://opendope.org/questions" xmlns:oda="http://opendope.org/answers" xmlns:odi="http://opendope.org/components" xmlns:odgm="http://opendope.org/SmartArt/DataHierarchy" xmlns:b="http://schemas.openxmlformats.org/officeDocument/2006/bibliography" xmlns:wps="http://schemas.microsoft.com/office/word/2010/wordprocessingShape" xmlns:w16se="http://schemas.microsoft.com/office/word/2015/wordml/symex" xmlns:w16cid="http://schemas.microsoft.com/office/word/2016/wordml/cid" xmlns:wetp="http://schemas.microsoft.com/office/webextensions/taskpanes/2010/11" xmlns:we="http://schemas.microsoft.com/office/webextensions/webextension/2010/11" xmlns:comp="http://schemas.openxmlformats.org/drawingml/2006/compatibility" xmlns:lc="http://schemas.openxmlformats.org/drawingml/2006/lockedCanvas">
               <c:ext xmlns:c16="http://schemas.microsoft.com/office/drawing/2014/chart" uri="{C3380CC4-5D6E-409C-BE32-E72D297353CC}">
                 <c16:uniqueId val="{00000001-6147-E74A-AA7B-5531F0E4EE0C}"/>
               </c:ext>
@@ -1416,54 +1417,48 @@
           </c:dPt>
           <c:cat>
             <c:strRef>
-              <c:f>Sheet1!$A$2:$A$13</c:f>
+              <c:f>Sheet1!$A$2:$A$11</c:f>
               <c:strCache>
-                <c:ptCount val="12"/>
+                <c:ptCount val="10"/>
                 <c:pt idx="0">
-                  <c:v>Month 1</c:v>
+                  <c:v>Capability 1</c:v>
                 </c:pt>
                 <c:pt idx="1">
-                  <c:v>Month 2</c:v>
+                  <c:v>Capability 2</c:v>
                 </c:pt>
                 <c:pt idx="2">
-                  <c:v>Month 3</c:v>
+                  <c:v>Capability 3</c:v>
                 </c:pt>
                 <c:pt idx="3">
-                  <c:v>Month 4</c:v>
+                  <c:v>Capability 4</c:v>
                 </c:pt>
                 <c:pt idx="4">
-                  <c:v>Month 5</c:v>
+                  <c:v>Capability 5</c:v>
                 </c:pt>
                 <c:pt idx="5">
-                  <c:v>Month 6</c:v>
+                  <c:v>Capability 6</c:v>
                 </c:pt>
                 <c:pt idx="6">
-                  <c:v>Month 7</c:v>
+                  <c:v>Capability 7</c:v>
                 </c:pt>
                 <c:pt idx="7">
-                  <c:v>Month 8</c:v>
+                  <c:v>Capability 8</c:v>
                 </c:pt>
                 <c:pt idx="8">
-                  <c:v>Month 9</c:v>
+                  <c:v>Capability 9</c:v>
                 </c:pt>
                 <c:pt idx="9">
-                  <c:v>Month 10</c:v>
-                </c:pt>
-                <c:pt idx="10">
-                  <c:v>Month 11</c:v>
-                </c:pt>
-                <c:pt idx="11">
-                  <c:v>Month 12</c:v>
+                  <c:v>Capability 10</c:v>
                 </c:pt>
               </c:strCache>
             </c:strRef>
           </c:cat>
           <c:val>
             <c:numRef>
-              <c:f>Sheet1!$B$2:$B$13</c:f>
+              <c:f>Sheet1!$B$2:$B$11</c:f>
               <c:numCache>
                 <c:formatCode>0.0</c:formatCode>
-                <c:ptCount val="12"/>
+                <c:ptCount val="10"/>
                 <c:pt idx="0">
                   <c:v>0.5</c:v>
                 </c:pt>
@@ -1492,18 +1487,12 @@
                   <c:v>0.5</c:v>
                 </c:pt>
                 <c:pt idx="9">
-                  <c:v>0.5</c:v>
-                </c:pt>
-                <c:pt idx="10">
-                  <c:v>0.5</c:v>
-                </c:pt>
-                <c:pt idx="11">
                   <c:v>0.5</c:v>
                 </c:pt>
               </c:numCache>
             </c:numRef>
           </c:val>
-          <c:extLst xmlns:lc="http://schemas.openxmlformats.org/drawingml/2006/lockedCanvas" xmlns:comp="http://schemas.openxmlformats.org/drawingml/2006/compatibility" xmlns:we="http://schemas.microsoft.com/office/webextensions/webextension/2010/11" xmlns:wetp="http://schemas.microsoft.com/office/webextensions/taskpanes/2010/11" xmlns:w16cid="http://schemas.microsoft.com/office/word/2016/wordml/cid" xmlns:w16se="http://schemas.microsoft.com/office/word/2015/wordml/symex" xmlns:wps="http://schemas.microsoft.com/office/word/2010/wordprocessingShape" xmlns:b="http://schemas.openxmlformats.org/officeDocument/2006/bibliography" xmlns:odgm="http://opendope.org/SmartArt/DataHierarchy" xmlns:odi="http://opendope.org/components" xmlns:oda="http://opendope.org/answers" xmlns:odq="http://opendope.org/questions" xmlns:odc="http://opendope.org/conditions" xmlns:odx="http://opendope.org/xpaths" xmlns:cppr="http://schemas.microsoft.com/office/2006/coverPageProps" xmlns:pvml="urn:schemas-microsoft-com:office:powerpoint" xmlns:w10="urn:schemas-microsoft-com:office:word" xmlns:v="urn:schemas-microsoft-com:vml" xmlns:o="urn:schemas-microsoft-com:office:office" xmlns:xvml="urn:schemas-microsoft-com:office:excel" xmlns:dsp="http://schemas.microsoft.com/office/drawing/2008/diagram" xmlns:xdr="http://schemas.openxmlformats.org/drawingml/2006/spreadsheetDrawing" xmlns:pic="http://schemas.openxmlformats.org/drawingml/2006/picture" xmlns:dgm="http://schemas.openxmlformats.org/drawingml/2006/diagram" xmlns:c14="http://schemas.microsoft.com/office/drawing/2007/8/2/chart" xmlns:cdr="http://schemas.openxmlformats.org/drawingml/2006/chartDrawing" xmlns:wne="http://schemas.microsoft.com/office/word/2006/wordml" xmlns:sl="http://schemas.openxmlformats.org/schemaLibrary/2006/main" xmlns:mc="http://schemas.openxmlformats.org/markup-compatibility/2006" xmlns:wp14="http://schemas.microsoft.com/office/word/2010/wordprocessingDrawing" xmlns:wp="http://schemas.openxmlformats.org/drawingml/2006/wordprocessingDrawing" xmlns:m="http://schemas.openxmlformats.org/officeDocument/2006/math" xmlns:w14="http://schemas.microsoft.com/office/word/2010/wordml" xmlns:w15="http://schemas.microsoft.com/office/word/2012/wordml" xmlns:w="http://schemas.openxmlformats.org/wordprocessingml/2006/main">
+          <c:extLst xmlns:w="http://schemas.openxmlformats.org/wordprocessingml/2006/main" xmlns:w15="http://schemas.microsoft.com/office/word/2012/wordml" xmlns:w14="http://schemas.microsoft.com/office/word/2010/wordml" xmlns:m="http://schemas.openxmlformats.org/officeDocument/2006/math" xmlns:wp="http://schemas.openxmlformats.org/drawingml/2006/wordprocessingDrawing" xmlns:wp14="http://schemas.microsoft.com/office/word/2010/wordprocessingDrawing" xmlns:mc="http://schemas.openxmlformats.org/markup-compatibility/2006" xmlns:sl="http://schemas.openxmlformats.org/schemaLibrary/2006/main" xmlns:wne="http://schemas.microsoft.com/office/word/2006/wordml" xmlns:cdr="http://schemas.openxmlformats.org/drawingml/2006/chartDrawing" xmlns:c14="http://schemas.microsoft.com/office/drawing/2007/8/2/chart" xmlns:dgm="http://schemas.openxmlformats.org/drawingml/2006/diagram" xmlns:pic="http://schemas.openxmlformats.org/drawingml/2006/picture" xmlns:xdr="http://schemas.openxmlformats.org/drawingml/2006/spreadsheetDrawing" xmlns:dsp="http://schemas.microsoft.com/office/drawing/2008/diagram" xmlns:xvml="urn:schemas-microsoft-com:office:excel" xmlns:o="urn:schemas-microsoft-com:office:office" xmlns:v="urn:schemas-microsoft-com:vml" xmlns:w10="urn:schemas-microsoft-com:office:word" xmlns:pvml="urn:schemas-microsoft-com:office:powerpoint" xmlns:cppr="http://schemas.microsoft.com/office/2006/coverPageProps" xmlns:odx="http://opendope.org/xpaths" xmlns:odc="http://opendope.org/conditions" xmlns:odq="http://opendope.org/questions" xmlns:oda="http://opendope.org/answers" xmlns:odi="http://opendope.org/components" xmlns:odgm="http://opendope.org/SmartArt/DataHierarchy" xmlns:b="http://schemas.openxmlformats.org/officeDocument/2006/bibliography" xmlns:wps="http://schemas.microsoft.com/office/word/2010/wordprocessingShape" xmlns:w16se="http://schemas.microsoft.com/office/word/2015/wordml/symex" xmlns:w16cid="http://schemas.microsoft.com/office/word/2016/wordml/cid" xmlns:wetp="http://schemas.microsoft.com/office/webextensions/taskpanes/2010/11" xmlns:we="http://schemas.microsoft.com/office/webextensions/webextension/2010/11" xmlns:comp="http://schemas.openxmlformats.org/drawingml/2006/compatibility" xmlns:lc="http://schemas.openxmlformats.org/drawingml/2006/lockedCanvas">
             <c:ext xmlns:c16="http://schemas.microsoft.com/office/drawing/2014/chart" uri="{C3380CC4-5D6E-409C-BE32-E72D297353CC}">
               <c16:uniqueId val="{00000002-6147-E74A-AA7B-5531F0E4EE0C}"/>
             </c:ext>
@@ -1535,54 +1524,48 @@
           <c:invertIfNegative val="0"/>
           <c:cat>
             <c:strRef>
-              <c:f>Sheet1!$A$2:$A$13</c:f>
+              <c:f>Sheet1!$A$2:$A$11</c:f>
               <c:strCache>
-                <c:ptCount val="12"/>
+                <c:ptCount val="10"/>
                 <c:pt idx="0">
-                  <c:v>Month 1</c:v>
+                  <c:v>Capability 1</c:v>
                 </c:pt>
                 <c:pt idx="1">
-                  <c:v>Month 2</c:v>
+                  <c:v>Capability 2</c:v>
                 </c:pt>
                 <c:pt idx="2">
-                  <c:v>Month 3</c:v>
+                  <c:v>Capability 3</c:v>
                 </c:pt>
                 <c:pt idx="3">
-                  <c:v>Month 4</c:v>
+                  <c:v>Capability 4</c:v>
                 </c:pt>
                 <c:pt idx="4">
-                  <c:v>Month 5</c:v>
+                  <c:v>Capability 5</c:v>
                 </c:pt>
                 <c:pt idx="5">
-                  <c:v>Month 6</c:v>
+                  <c:v>Capability 6</c:v>
                 </c:pt>
                 <c:pt idx="6">
-                  <c:v>Month 7</c:v>
+                  <c:v>Capability 7</c:v>
                 </c:pt>
                 <c:pt idx="7">
-                  <c:v>Month 8</c:v>
+                  <c:v>Capability 8</c:v>
                 </c:pt>
                 <c:pt idx="8">
-                  <c:v>Month 9</c:v>
+                  <c:v>Capability 9</c:v>
                 </c:pt>
                 <c:pt idx="9">
-                  <c:v>Month 10</c:v>
-                </c:pt>
-                <c:pt idx="10">
-                  <c:v>Month 11</c:v>
-                </c:pt>
-                <c:pt idx="11">
-                  <c:v>Month 12</c:v>
+                  <c:v>Capability 10</c:v>
                 </c:pt>
               </c:strCache>
             </c:strRef>
           </c:cat>
           <c:val>
             <c:numRef>
-              <c:f>Sheet1!$C$2:$C$13</c:f>
+              <c:f>Sheet1!$C$2:$C$11</c:f>
               <c:numCache>
                 <c:formatCode>0.0</c:formatCode>
-                <c:ptCount val="12"/>
+                <c:ptCount val="10"/>
                 <c:pt idx="0">
                   <c:v>0.5</c:v>
                 </c:pt>
@@ -1611,12 +1594,6 @@
                   <c:v>0.5</c:v>
                 </c:pt>
                 <c:pt idx="9">
-                  <c:v>0.5</c:v>
-                </c:pt>
-                <c:pt idx="10">
-                  <c:v>0.5</c:v>
-                </c:pt>
-                <c:pt idx="11">
                   <c:v>0.5</c:v>
                 </c:pt>
               </c:numCache>
@@ -1654,54 +1631,48 @@
           <c:invertIfNegative val="0"/>
           <c:cat>
             <c:strRef>
-              <c:f>Sheet1!$A$2:$A$13</c:f>
+              <c:f>Sheet1!$A$2:$A$11</c:f>
               <c:strCache>
-                <c:ptCount val="12"/>
+                <c:ptCount val="10"/>
                 <c:pt idx="0">
-                  <c:v>Month 1</c:v>
+                  <c:v>Capability 1</c:v>
                 </c:pt>
                 <c:pt idx="1">
-                  <c:v>Month 2</c:v>
+                  <c:v>Capability 2</c:v>
                 </c:pt>
                 <c:pt idx="2">
-                  <c:v>Month 3</c:v>
+                  <c:v>Capability 3</c:v>
                 </c:pt>
                 <c:pt idx="3">
-                  <c:v>Month 4</c:v>
+                  <c:v>Capability 4</c:v>
                 </c:pt>
                 <c:pt idx="4">
-                  <c:v>Month 5</c:v>
+                  <c:v>Capability 5</c:v>
                 </c:pt>
                 <c:pt idx="5">
-                  <c:v>Month 6</c:v>
+                  <c:v>Capability 6</c:v>
                 </c:pt>
                 <c:pt idx="6">
-                  <c:v>Month 7</c:v>
+                  <c:v>Capability 7</c:v>
                 </c:pt>
                 <c:pt idx="7">
-                  <c:v>Month 8</c:v>
+                  <c:v>Capability 8</c:v>
                 </c:pt>
                 <c:pt idx="8">
-                  <c:v>Month 9</c:v>
+                  <c:v>Capability 9</c:v>
                 </c:pt>
                 <c:pt idx="9">
-                  <c:v>Month 10</c:v>
-                </c:pt>
-                <c:pt idx="10">
-                  <c:v>Month 11</c:v>
-                </c:pt>
-                <c:pt idx="11">
-                  <c:v>Month 12</c:v>
+                  <c:v>Capability 10</c:v>
                 </c:pt>
               </c:strCache>
             </c:strRef>
           </c:cat>
           <c:val>
             <c:numRef>
-              <c:f>Sheet1!$D$2:$D$13</c:f>
+              <c:f>Sheet1!$D$2:$D$11</c:f>
               <c:numCache>
                 <c:formatCode>General</c:formatCode>
-                <c:ptCount val="12"/>
+                <c:ptCount val="10"/>
                 <c:pt idx="0">
                   <c:v>0.5</c:v>
                 </c:pt>
@@ -1730,12 +1701,6 @@
                   <c:v>0.5</c:v>
                 </c:pt>
                 <c:pt idx="9">
-                  <c:v>0.5</c:v>
-                </c:pt>
-                <c:pt idx="10">
-                  <c:v>0.5</c:v>
-                </c:pt>
-                <c:pt idx="11">
                   <c:v>0.5</c:v>
                 </c:pt>
               </c:numCache>
@@ -1773,54 +1738,48 @@
           <c:invertIfNegative val="0"/>
           <c:cat>
             <c:strRef>
-              <c:f>Sheet1!$A$2:$A$13</c:f>
+              <c:f>Sheet1!$A$2:$A$11</c:f>
               <c:strCache>
-                <c:ptCount val="12"/>
+                <c:ptCount val="10"/>
                 <c:pt idx="0">
-                  <c:v>Month 1</c:v>
+                  <c:v>Capability 1</c:v>
                 </c:pt>
                 <c:pt idx="1">
-                  <c:v>Month 2</c:v>
+                  <c:v>Capability 2</c:v>
                 </c:pt>
                 <c:pt idx="2">
-                  <c:v>Month 3</c:v>
+                  <c:v>Capability 3</c:v>
                 </c:pt>
                 <c:pt idx="3">
-                  <c:v>Month 4</c:v>
+                  <c:v>Capability 4</c:v>
                 </c:pt>
                 <c:pt idx="4">
-                  <c:v>Month 5</c:v>
+                  <c:v>Capability 5</c:v>
                 </c:pt>
                 <c:pt idx="5">
-                  <c:v>Month 6</c:v>
+                  <c:v>Capability 6</c:v>
                 </c:pt>
                 <c:pt idx="6">
-                  <c:v>Month 7</c:v>
+                  <c:v>Capability 7</c:v>
                 </c:pt>
                 <c:pt idx="7">
-                  <c:v>Month 8</c:v>
+                  <c:v>Capability 8</c:v>
                 </c:pt>
                 <c:pt idx="8">
-                  <c:v>Month 9</c:v>
+                  <c:v>Capability 9</c:v>
                 </c:pt>
                 <c:pt idx="9">
-                  <c:v>Month 10</c:v>
-                </c:pt>
-                <c:pt idx="10">
-                  <c:v>Month 11</c:v>
-                </c:pt>
-                <c:pt idx="11">
-                  <c:v>Month 12</c:v>
+                  <c:v>Capability 10</c:v>
                 </c:pt>
               </c:strCache>
             </c:strRef>
           </c:cat>
           <c:val>
             <c:numRef>
-              <c:f>Sheet1!$E$2:$E$13</c:f>
+              <c:f>Sheet1!$E$2:$E$11</c:f>
               <c:numCache>
                 <c:formatCode>General</c:formatCode>
-                <c:ptCount val="12"/>
+                <c:ptCount val="10"/>
                 <c:pt idx="0">
                   <c:v>0.5</c:v>
                 </c:pt>
@@ -1849,12 +1808,6 @@
                   <c:v>0.5</c:v>
                 </c:pt>
                 <c:pt idx="9">
-                  <c:v>0.5</c:v>
-                </c:pt>
-                <c:pt idx="10">
-                  <c:v>0.5</c:v>
-                </c:pt>
-                <c:pt idx="11">
                   <c:v>0.5</c:v>
                 </c:pt>
               </c:numCache>
@@ -1894,54 +1847,48 @@
           <c:invertIfNegative val="0"/>
           <c:cat>
             <c:strRef>
-              <c:f>Sheet1!$A$2:$A$13</c:f>
+              <c:f>Sheet1!$A$2:$A$11</c:f>
               <c:strCache>
-                <c:ptCount val="12"/>
+                <c:ptCount val="10"/>
                 <c:pt idx="0">
-                  <c:v>Month 1</c:v>
+                  <c:v>Capability 1</c:v>
                 </c:pt>
                 <c:pt idx="1">
-                  <c:v>Month 2</c:v>
+                  <c:v>Capability 2</c:v>
                 </c:pt>
                 <c:pt idx="2">
-                  <c:v>Month 3</c:v>
+                  <c:v>Capability 3</c:v>
                 </c:pt>
                 <c:pt idx="3">
-                  <c:v>Month 4</c:v>
+                  <c:v>Capability 4</c:v>
                 </c:pt>
                 <c:pt idx="4">
-                  <c:v>Month 5</c:v>
+                  <c:v>Capability 5</c:v>
                 </c:pt>
                 <c:pt idx="5">
-                  <c:v>Month 6</c:v>
+                  <c:v>Capability 6</c:v>
                 </c:pt>
                 <c:pt idx="6">
-                  <c:v>Month 7</c:v>
+                  <c:v>Capability 7</c:v>
                 </c:pt>
                 <c:pt idx="7">
-                  <c:v>Month 8</c:v>
+                  <c:v>Capability 8</c:v>
                 </c:pt>
                 <c:pt idx="8">
-                  <c:v>Month 9</c:v>
+                  <c:v>Capability 9</c:v>
                 </c:pt>
                 <c:pt idx="9">
-                  <c:v>Month 10</c:v>
-                </c:pt>
-                <c:pt idx="10">
-                  <c:v>Month 11</c:v>
-                </c:pt>
-                <c:pt idx="11">
-                  <c:v>Month 12</c:v>
+                  <c:v>Capability 10</c:v>
                 </c:pt>
               </c:strCache>
             </c:strRef>
           </c:cat>
           <c:val>
             <c:numRef>
-              <c:f>Sheet1!$F$2:$F$13</c:f>
+              <c:f>Sheet1!$F$2:$F$11</c:f>
               <c:numCache>
                 <c:formatCode>General</c:formatCode>
-                <c:ptCount val="12"/>
+                <c:ptCount val="10"/>
                 <c:pt idx="0">
                   <c:v>0.5</c:v>
                 </c:pt>
@@ -1970,12 +1917,6 @@
                   <c:v>0.5</c:v>
                 </c:pt>
                 <c:pt idx="9">
-                  <c:v>0.5</c:v>
-                </c:pt>
-                <c:pt idx="10">
-                  <c:v>0.5</c:v>
-                </c:pt>
-                <c:pt idx="11">
                   <c:v>0.5</c:v>
                 </c:pt>
               </c:numCache>
@@ -2006,7 +1947,7 @@
           <c:orientation val="minMax"/>
         </c:scaling>
         <c:delete val="0"/>
-        <c:axPos val="b"/>
+        <c:axPos val="l"/>
         <c:numFmt formatCode="General" sourceLinked="1"/>
         <c:majorTickMark val="out"/>
         <c:minorTickMark val="none"/>
@@ -2029,16 +1970,16 @@
           <a:lstStyle/>
           <a:p>
             <a:pPr>
-              <a:defRPr sz="1400" b="0" i="0" u="none" strike="noStrike" kern="1200" baseline="0">
-                <a:solidFill>
-                  <a:schemeClr val="tx2"/>
+              <a:defRPr sz="1197" b="0" i="0" u="none" strike="noStrike" kern="1200" baseline="0">
+                <a:solidFill>
+                  <a:schemeClr val="accent1"/>
                 </a:solidFill>
                 <a:latin typeface="+mn-lt"/>
                 <a:ea typeface="+mn-ea"/>
                 <a:cs typeface="+mn-cs"/>
               </a:defRPr>
             </a:pPr>
-            <a:endParaRPr lang="en-NL"/>
+            <a:endParaRPr lang="en-US"/>
           </a:p>
         </c:txPr>
         <c:crossAx val="477616192"/>
@@ -2054,7 +1995,7 @@
           <c:orientation val="minMax"/>
         </c:scaling>
         <c:delete val="0"/>
-        <c:axPos val="l"/>
+        <c:axPos val="b"/>
         <c:majorGridlines>
           <c:spPr>
             <a:ln w="9525" cap="flat" cmpd="sng" algn="ctr">
@@ -2113,7 +2054,7 @@
     </c:plotArea>
     <c:plotVisOnly val="1"/>
     <c:dispBlanksAs val="gap"/>
-    <c:extLst xmlns:lc="http://schemas.openxmlformats.org/drawingml/2006/lockedCanvas" xmlns:comp="http://schemas.openxmlformats.org/drawingml/2006/compatibility" xmlns:we="http://schemas.microsoft.com/office/webextensions/webextension/2010/11" xmlns:wetp="http://schemas.microsoft.com/office/webextensions/taskpanes/2010/11" xmlns:w16cid="http://schemas.microsoft.com/office/word/2016/wordml/cid" xmlns:w16se="http://schemas.microsoft.com/office/word/2015/wordml/symex" xmlns:wps="http://schemas.microsoft.com/office/word/2010/wordprocessingShape" xmlns:b="http://schemas.openxmlformats.org/officeDocument/2006/bibliography" xmlns:odgm="http://opendope.org/SmartArt/DataHierarchy" xmlns:odi="http://opendope.org/components" xmlns:oda="http://opendope.org/answers" xmlns:odq="http://opendope.org/questions" xmlns:odc="http://opendope.org/conditions" xmlns:odx="http://opendope.org/xpaths" xmlns:cppr="http://schemas.microsoft.com/office/2006/coverPageProps" xmlns:pvml="urn:schemas-microsoft-com:office:powerpoint" xmlns:w10="urn:schemas-microsoft-com:office:word" xmlns:v="urn:schemas-microsoft-com:vml" xmlns:o="urn:schemas-microsoft-com:office:office" xmlns:xvml="urn:schemas-microsoft-com:office:excel" xmlns:dsp="http://schemas.microsoft.com/office/drawing/2008/diagram" xmlns:xdr="http://schemas.openxmlformats.org/drawingml/2006/spreadsheetDrawing" xmlns:pic="http://schemas.openxmlformats.org/drawingml/2006/picture" xmlns:dgm="http://schemas.openxmlformats.org/drawingml/2006/diagram" xmlns:c14="http://schemas.microsoft.com/office/drawing/2007/8/2/chart" xmlns:cdr="http://schemas.openxmlformats.org/drawingml/2006/chartDrawing" xmlns:wne="http://schemas.microsoft.com/office/word/2006/wordml" xmlns:sl="http://schemas.openxmlformats.org/schemaLibrary/2006/main" xmlns:mc="http://schemas.openxmlformats.org/markup-compatibility/2006" xmlns:wp14="http://schemas.microsoft.com/office/word/2010/wordprocessingDrawing" xmlns:wp="http://schemas.openxmlformats.org/drawingml/2006/wordprocessingDrawing" xmlns:m="http://schemas.openxmlformats.org/officeDocument/2006/math" xmlns:w14="http://schemas.microsoft.com/office/word/2010/wordml" xmlns:w15="http://schemas.microsoft.com/office/word/2012/wordml" xmlns:w="http://schemas.openxmlformats.org/wordprocessingml/2006/main">
+    <c:extLst xmlns:w="http://schemas.openxmlformats.org/wordprocessingml/2006/main" xmlns:w15="http://schemas.microsoft.com/office/word/2012/wordml" xmlns:w14="http://schemas.microsoft.com/office/word/2010/wordml" xmlns:m="http://schemas.openxmlformats.org/officeDocument/2006/math" xmlns:wp="http://schemas.openxmlformats.org/drawingml/2006/wordprocessingDrawing" xmlns:wp14="http://schemas.microsoft.com/office/word/2010/wordprocessingDrawing" xmlns:mc="http://schemas.openxmlformats.org/markup-compatibility/2006" xmlns:sl="http://schemas.openxmlformats.org/schemaLibrary/2006/main" xmlns:wne="http://schemas.microsoft.com/office/word/2006/wordml" xmlns:cdr="http://schemas.openxmlformats.org/drawingml/2006/chartDrawing" xmlns:c14="http://schemas.microsoft.com/office/drawing/2007/8/2/chart" xmlns:dgm="http://schemas.openxmlformats.org/drawingml/2006/diagram" xmlns:pic="http://schemas.openxmlformats.org/drawingml/2006/picture" xmlns:xdr="http://schemas.openxmlformats.org/drawingml/2006/spreadsheetDrawing" xmlns:dsp="http://schemas.microsoft.com/office/drawing/2008/diagram" xmlns:xvml="urn:schemas-microsoft-com:office:excel" xmlns:o="urn:schemas-microsoft-com:office:office" xmlns:v="urn:schemas-microsoft-com:vml" xmlns:w10="urn:schemas-microsoft-com:office:word" xmlns:pvml="urn:schemas-microsoft-com:office:powerpoint" xmlns:cppr="http://schemas.microsoft.com/office/2006/coverPageProps" xmlns:odx="http://opendope.org/xpaths" xmlns:odc="http://opendope.org/conditions" xmlns:odq="http://opendope.org/questions" xmlns:oda="http://opendope.org/answers" xmlns:odi="http://opendope.org/components" xmlns:odgm="http://opendope.org/SmartArt/DataHierarchy" xmlns:b="http://schemas.openxmlformats.org/officeDocument/2006/bibliography" xmlns:wps="http://schemas.microsoft.com/office/word/2010/wordprocessingShape" xmlns:w16se="http://schemas.microsoft.com/office/word/2015/wordml/symex" xmlns:w16cid="http://schemas.microsoft.com/office/word/2016/wordml/cid" xmlns:wetp="http://schemas.microsoft.com/office/webextensions/taskpanes/2010/11" xmlns:we="http://schemas.microsoft.com/office/webextensions/webextension/2010/11" xmlns:comp="http://schemas.openxmlformats.org/drawingml/2006/compatibility" xmlns:lc="http://schemas.openxmlformats.org/drawingml/2006/lockedCanvas">
       <c:ext xmlns:c16r3="http://schemas.microsoft.com/office/drawing/2017/03/chart" uri="{56B9EC1D-385E-4148-901F-78D8002777C0}">
         <c16r3:dataDisplayOptions16>
           <c16r3:dispNaAsBlank val="1"/>
@@ -3024,7 +2965,7 @@
                 </a:outerShdw>
               </a:effectLst>
             </c:spPr>
-            <c:extLst xmlns:w="http://schemas.openxmlformats.org/wordprocessingml/2006/main" xmlns:w15="http://schemas.microsoft.com/office/word/2012/wordml" xmlns:w14="http://schemas.microsoft.com/office/word/2010/wordml" xmlns:m="http://schemas.openxmlformats.org/officeDocument/2006/math" xmlns:wp="http://schemas.openxmlformats.org/drawingml/2006/wordprocessingDrawing" xmlns:wp14="http://schemas.microsoft.com/office/word/2010/wordprocessingDrawing" xmlns:mc="http://schemas.openxmlformats.org/markup-compatibility/2006" xmlns:sl="http://schemas.openxmlformats.org/schemaLibrary/2006/main" xmlns:wne="http://schemas.microsoft.com/office/word/2006/wordml" xmlns:cdr="http://schemas.openxmlformats.org/drawingml/2006/chartDrawing" xmlns:c14="http://schemas.microsoft.com/office/drawing/2007/8/2/chart" xmlns:dgm="http://schemas.openxmlformats.org/drawingml/2006/diagram" xmlns:pic="http://schemas.openxmlformats.org/drawingml/2006/picture" xmlns:xdr="http://schemas.openxmlformats.org/drawingml/2006/spreadsheetDrawing" xmlns:dsp="http://schemas.microsoft.com/office/drawing/2008/diagram" xmlns:xvml="urn:schemas-microsoft-com:office:excel" xmlns:o="urn:schemas-microsoft-com:office:office" xmlns:v="urn:schemas-microsoft-com:vml" xmlns:w10="urn:schemas-microsoft-com:office:word" xmlns:pvml="urn:schemas-microsoft-com:office:powerpoint" xmlns:cppr="http://schemas.microsoft.com/office/2006/coverPageProps" xmlns:odx="http://opendope.org/xpaths" xmlns:odc="http://opendope.org/conditions" xmlns:odq="http://opendope.org/questions" xmlns:oda="http://opendope.org/answers" xmlns:odi="http://opendope.org/components" xmlns:odgm="http://opendope.org/SmartArt/DataHierarchy" xmlns:b="http://schemas.openxmlformats.org/officeDocument/2006/bibliography" xmlns:wps="http://schemas.microsoft.com/office/word/2010/wordprocessingShape" xmlns:w16se="http://schemas.microsoft.com/office/word/2015/wordml/symex" xmlns:w16cid="http://schemas.microsoft.com/office/word/2016/wordml/cid" xmlns:wetp="http://schemas.microsoft.com/office/webextensions/taskpanes/2010/11" xmlns:we="http://schemas.microsoft.com/office/webextensions/webextension/2010/11" xmlns:comp="http://schemas.openxmlformats.org/drawingml/2006/compatibility" xmlns:lc="http://schemas.openxmlformats.org/drawingml/2006/lockedCanvas">
+            <c:extLst xmlns:lc="http://schemas.openxmlformats.org/drawingml/2006/lockedCanvas" xmlns:comp="http://schemas.openxmlformats.org/drawingml/2006/compatibility" xmlns:we="http://schemas.microsoft.com/office/webextensions/webextension/2010/11" xmlns:wetp="http://schemas.microsoft.com/office/webextensions/taskpanes/2010/11" xmlns:w16cid="http://schemas.microsoft.com/office/word/2016/wordml/cid" xmlns:w16se="http://schemas.microsoft.com/office/word/2015/wordml/symex" xmlns:wps="http://schemas.microsoft.com/office/word/2010/wordprocessingShape" xmlns:b="http://schemas.openxmlformats.org/officeDocument/2006/bibliography" xmlns:odgm="http://opendope.org/SmartArt/DataHierarchy" xmlns:odi="http://opendope.org/components" xmlns:oda="http://opendope.org/answers" xmlns:odq="http://opendope.org/questions" xmlns:odc="http://opendope.org/conditions" xmlns:odx="http://opendope.org/xpaths" xmlns:cppr="http://schemas.microsoft.com/office/2006/coverPageProps" xmlns:pvml="urn:schemas-microsoft-com:office:powerpoint" xmlns:w10="urn:schemas-microsoft-com:office:word" xmlns:v="urn:schemas-microsoft-com:vml" xmlns:o="urn:schemas-microsoft-com:office:office" xmlns:xvml="urn:schemas-microsoft-com:office:excel" xmlns:dsp="http://schemas.microsoft.com/office/drawing/2008/diagram" xmlns:xdr="http://schemas.openxmlformats.org/drawingml/2006/spreadsheetDrawing" xmlns:pic="http://schemas.openxmlformats.org/drawingml/2006/picture" xmlns:dgm="http://schemas.openxmlformats.org/drawingml/2006/diagram" xmlns:c14="http://schemas.microsoft.com/office/drawing/2007/8/2/chart" xmlns:cdr="http://schemas.openxmlformats.org/drawingml/2006/chartDrawing" xmlns:wne="http://schemas.microsoft.com/office/word/2006/wordml" xmlns:sl="http://schemas.openxmlformats.org/schemaLibrary/2006/main" xmlns:mc="http://schemas.openxmlformats.org/markup-compatibility/2006" xmlns:wp14="http://schemas.microsoft.com/office/word/2010/wordprocessingDrawing" xmlns:wp="http://schemas.openxmlformats.org/drawingml/2006/wordprocessingDrawing" xmlns:m="http://schemas.openxmlformats.org/officeDocument/2006/math" xmlns:w14="http://schemas.microsoft.com/office/word/2010/wordml" xmlns:w15="http://schemas.microsoft.com/office/word/2012/wordml" xmlns:w="http://schemas.openxmlformats.org/wordprocessingml/2006/main">
               <c:ext xmlns:c16="http://schemas.microsoft.com/office/drawing/2014/chart" uri="{C3380CC4-5D6E-409C-BE32-E72D297353CC}">
                 <c16:uniqueId val="{00000001-6147-E74A-AA7B-5531F0E4EE0C}"/>
               </c:ext>
@@ -3119,7 +3060,7 @@
               </c:numCache>
             </c:numRef>
           </c:val>
-          <c:extLst xmlns:w="http://schemas.openxmlformats.org/wordprocessingml/2006/main" xmlns:w15="http://schemas.microsoft.com/office/word/2012/wordml" xmlns:w14="http://schemas.microsoft.com/office/word/2010/wordml" xmlns:m="http://schemas.openxmlformats.org/officeDocument/2006/math" xmlns:wp="http://schemas.openxmlformats.org/drawingml/2006/wordprocessingDrawing" xmlns:wp14="http://schemas.microsoft.com/office/word/2010/wordprocessingDrawing" xmlns:mc="http://schemas.openxmlformats.org/markup-compatibility/2006" xmlns:sl="http://schemas.openxmlformats.org/schemaLibrary/2006/main" xmlns:wne="http://schemas.microsoft.com/office/word/2006/wordml" xmlns:cdr="http://schemas.openxmlformats.org/drawingml/2006/chartDrawing" xmlns:c14="http://schemas.microsoft.com/office/drawing/2007/8/2/chart" xmlns:dgm="http://schemas.openxmlformats.org/drawingml/2006/diagram" xmlns:pic="http://schemas.openxmlformats.org/drawingml/2006/picture" xmlns:xdr="http://schemas.openxmlformats.org/drawingml/2006/spreadsheetDrawing" xmlns:dsp="http://schemas.microsoft.com/office/drawing/2008/diagram" xmlns:xvml="urn:schemas-microsoft-com:office:excel" xmlns:o="urn:schemas-microsoft-com:office:office" xmlns:v="urn:schemas-microsoft-com:vml" xmlns:w10="urn:schemas-microsoft-com:office:word" xmlns:pvml="urn:schemas-microsoft-com:office:powerpoint" xmlns:cppr="http://schemas.microsoft.com/office/2006/coverPageProps" xmlns:odx="http://opendope.org/xpaths" xmlns:odc="http://opendope.org/conditions" xmlns:odq="http://opendope.org/questions" xmlns:oda="http://opendope.org/answers" xmlns:odi="http://opendope.org/components" xmlns:odgm="http://opendope.org/SmartArt/DataHierarchy" xmlns:b="http://schemas.openxmlformats.org/officeDocument/2006/bibliography" xmlns:wps="http://schemas.microsoft.com/office/word/2010/wordprocessingShape" xmlns:w16se="http://schemas.microsoft.com/office/word/2015/wordml/symex" xmlns:w16cid="http://schemas.microsoft.com/office/word/2016/wordml/cid" xmlns:wetp="http://schemas.microsoft.com/office/webextensions/taskpanes/2010/11" xmlns:we="http://schemas.microsoft.com/office/webextensions/webextension/2010/11" xmlns:comp="http://schemas.openxmlformats.org/drawingml/2006/compatibility" xmlns:lc="http://schemas.openxmlformats.org/drawingml/2006/lockedCanvas">
+          <c:extLst xmlns:lc="http://schemas.openxmlformats.org/drawingml/2006/lockedCanvas" xmlns:comp="http://schemas.openxmlformats.org/drawingml/2006/compatibility" xmlns:we="http://schemas.microsoft.com/office/webextensions/webextension/2010/11" xmlns:wetp="http://schemas.microsoft.com/office/webextensions/taskpanes/2010/11" xmlns:w16cid="http://schemas.microsoft.com/office/word/2016/wordml/cid" xmlns:w16se="http://schemas.microsoft.com/office/word/2015/wordml/symex" xmlns:wps="http://schemas.microsoft.com/office/word/2010/wordprocessingShape" xmlns:b="http://schemas.openxmlformats.org/officeDocument/2006/bibliography" xmlns:odgm="http://opendope.org/SmartArt/DataHierarchy" xmlns:odi="http://opendope.org/components" xmlns:oda="http://opendope.org/answers" xmlns:odq="http://opendope.org/questions" xmlns:odc="http://opendope.org/conditions" xmlns:odx="http://opendope.org/xpaths" xmlns:cppr="http://schemas.microsoft.com/office/2006/coverPageProps" xmlns:pvml="urn:schemas-microsoft-com:office:powerpoint" xmlns:w10="urn:schemas-microsoft-com:office:word" xmlns:v="urn:schemas-microsoft-com:vml" xmlns:o="urn:schemas-microsoft-com:office:office" xmlns:xvml="urn:schemas-microsoft-com:office:excel" xmlns:dsp="http://schemas.microsoft.com/office/drawing/2008/diagram" xmlns:xdr="http://schemas.openxmlformats.org/drawingml/2006/spreadsheetDrawing" xmlns:pic="http://schemas.openxmlformats.org/drawingml/2006/picture" xmlns:dgm="http://schemas.openxmlformats.org/drawingml/2006/diagram" xmlns:c14="http://schemas.microsoft.com/office/drawing/2007/8/2/chart" xmlns:cdr="http://schemas.openxmlformats.org/drawingml/2006/chartDrawing" xmlns:wne="http://schemas.microsoft.com/office/word/2006/wordml" xmlns:sl="http://schemas.openxmlformats.org/schemaLibrary/2006/main" xmlns:mc="http://schemas.openxmlformats.org/markup-compatibility/2006" xmlns:wp14="http://schemas.microsoft.com/office/word/2010/wordprocessingDrawing" xmlns:wp="http://schemas.openxmlformats.org/drawingml/2006/wordprocessingDrawing" xmlns:m="http://schemas.openxmlformats.org/officeDocument/2006/math" xmlns:w14="http://schemas.microsoft.com/office/word/2010/wordml" xmlns:w15="http://schemas.microsoft.com/office/word/2012/wordml" xmlns:w="http://schemas.openxmlformats.org/wordprocessingml/2006/main">
             <c:ext xmlns:c16="http://schemas.microsoft.com/office/drawing/2014/chart" uri="{C3380CC4-5D6E-409C-BE32-E72D297353CC}">
               <c16:uniqueId val="{00000002-6147-E74A-AA7B-5531F0E4EE0C}"/>
             </c:ext>
@@ -3729,7 +3670,7 @@
     </c:plotArea>
     <c:plotVisOnly val="1"/>
     <c:dispBlanksAs val="gap"/>
-    <c:extLst xmlns:w="http://schemas.openxmlformats.org/wordprocessingml/2006/main" xmlns:w15="http://schemas.microsoft.com/office/word/2012/wordml" xmlns:w14="http://schemas.microsoft.com/office/word/2010/wordml" xmlns:m="http://schemas.openxmlformats.org/officeDocument/2006/math" xmlns:wp="http://schemas.openxmlformats.org/drawingml/2006/wordprocessingDrawing" xmlns:wp14="http://schemas.microsoft.com/office/word/2010/wordprocessingDrawing" xmlns:mc="http://schemas.openxmlformats.org/markup-compatibility/2006" xmlns:sl="http://schemas.openxmlformats.org/schemaLibrary/2006/main" xmlns:wne="http://schemas.microsoft.com/office/word/2006/wordml" xmlns:cdr="http://schemas.openxmlformats.org/drawingml/2006/chartDrawing" xmlns:c14="http://schemas.microsoft.com/office/drawing/2007/8/2/chart" xmlns:dgm="http://schemas.openxmlformats.org/drawingml/2006/diagram" xmlns:pic="http://schemas.openxmlformats.org/drawingml/2006/picture" xmlns:xdr="http://schemas.openxmlformats.org/drawingml/2006/spreadsheetDrawing" xmlns:dsp="http://schemas.microsoft.com/office/drawing/2008/diagram" xmlns:xvml="urn:schemas-microsoft-com:office:excel" xmlns:o="urn:schemas-microsoft-com:office:office" xmlns:v="urn:schemas-microsoft-com:vml" xmlns:w10="urn:schemas-microsoft-com:office:word" xmlns:pvml="urn:schemas-microsoft-com:office:powerpoint" xmlns:cppr="http://schemas.microsoft.com/office/2006/coverPageProps" xmlns:odx="http://opendope.org/xpaths" xmlns:odc="http://opendope.org/conditions" xmlns:odq="http://opendope.org/questions" xmlns:oda="http://opendope.org/answers" xmlns:odi="http://opendope.org/components" xmlns:odgm="http://opendope.org/SmartArt/DataHierarchy" xmlns:b="http://schemas.openxmlformats.org/officeDocument/2006/bibliography" xmlns:wps="http://schemas.microsoft.com/office/word/2010/wordprocessingShape" xmlns:w16se="http://schemas.microsoft.com/office/word/2015/wordml/symex" xmlns:w16cid="http://schemas.microsoft.com/office/word/2016/wordml/cid" xmlns:wetp="http://schemas.microsoft.com/office/webextensions/taskpanes/2010/11" xmlns:we="http://schemas.microsoft.com/office/webextensions/webextension/2010/11" xmlns:comp="http://schemas.openxmlformats.org/drawingml/2006/compatibility" xmlns:lc="http://schemas.openxmlformats.org/drawingml/2006/lockedCanvas">
+    <c:extLst xmlns:lc="http://schemas.openxmlformats.org/drawingml/2006/lockedCanvas" xmlns:comp="http://schemas.openxmlformats.org/drawingml/2006/compatibility" xmlns:we="http://schemas.microsoft.com/office/webextensions/webextension/2010/11" xmlns:wetp="http://schemas.microsoft.com/office/webextensions/taskpanes/2010/11" xmlns:w16cid="http://schemas.microsoft.com/office/word/2016/wordml/cid" xmlns:w16se="http://schemas.microsoft.com/office/word/2015/wordml/symex" xmlns:wps="http://schemas.microsoft.com/office/word/2010/wordprocessingShape" xmlns:b="http://schemas.openxmlformats.org/officeDocument/2006/bibliography" xmlns:odgm="http://opendope.org/SmartArt/DataHierarchy" xmlns:odi="http://opendope.org/components" xmlns:oda="http://opendope.org/answers" xmlns:odq="http://opendope.org/questions" xmlns:odc="http://opendope.org/conditions" xmlns:odx="http://opendope.org/xpaths" xmlns:cppr="http://schemas.microsoft.com/office/2006/coverPageProps" xmlns:pvml="urn:schemas-microsoft-com:office:powerpoint" xmlns:w10="urn:schemas-microsoft-com:office:word" xmlns:v="urn:schemas-microsoft-com:vml" xmlns:o="urn:schemas-microsoft-com:office:office" xmlns:xvml="urn:schemas-microsoft-com:office:excel" xmlns:dsp="http://schemas.microsoft.com/office/drawing/2008/diagram" xmlns:xdr="http://schemas.openxmlformats.org/drawingml/2006/spreadsheetDrawing" xmlns:pic="http://schemas.openxmlformats.org/drawingml/2006/picture" xmlns:dgm="http://schemas.openxmlformats.org/drawingml/2006/diagram" xmlns:c14="http://schemas.microsoft.com/office/drawing/2007/8/2/chart" xmlns:cdr="http://schemas.openxmlformats.org/drawingml/2006/chartDrawing" xmlns:wne="http://schemas.microsoft.com/office/word/2006/wordml" xmlns:sl="http://schemas.openxmlformats.org/schemaLibrary/2006/main" xmlns:mc="http://schemas.openxmlformats.org/markup-compatibility/2006" xmlns:wp14="http://schemas.microsoft.com/office/word/2010/wordprocessingDrawing" xmlns:wp="http://schemas.openxmlformats.org/drawingml/2006/wordprocessingDrawing" xmlns:m="http://schemas.openxmlformats.org/officeDocument/2006/math" xmlns:w14="http://schemas.microsoft.com/office/word/2010/wordml" xmlns:w15="http://schemas.microsoft.com/office/word/2012/wordml" xmlns:w="http://schemas.openxmlformats.org/wordprocessingml/2006/main">
       <c:ext xmlns:c16r3="http://schemas.microsoft.com/office/drawing/2017/03/chart" uri="{56B9EC1D-385E-4148-901F-78D8002777C0}">
         <c16r3:dataDisplayOptions16>
           <c16r3:dispNaAsBlank val="1"/>
@@ -4570,6 +4511,814 @@
 </file>
 
 <file path=ppt/charts/chart7.xml><?xml version="1.0" encoding="utf-8"?>
+<c:chartSpace xmlns:c="http://schemas.openxmlformats.org/drawingml/2006/chart" xmlns:a="http://schemas.openxmlformats.org/drawingml/2006/main" xmlns:r="http://schemas.openxmlformats.org/officeDocument/2006/relationships" xmlns:c16r2="http://schemas.microsoft.com/office/drawing/2015/06/chart">
+  <c:date1904 val="0"/>
+  <c:lang val="en-US"/>
+  <c:roundedCorners val="0"/>
+  <mc:AlternateContent xmlns:mc="http://schemas.openxmlformats.org/markup-compatibility/2006">
+    <mc:Choice xmlns:c14="http://schemas.microsoft.com/office/drawing/2007/8/2/chart" Requires="c14">
+      <c14:style val="104"/>
+    </mc:Choice>
+    <mc:Fallback>
+      <c:style val="4"/>
+    </mc:Fallback>
+  </mc:AlternateContent>
+  <c:chart>
+    <c:autoTitleDeleted val="1"/>
+    <c:plotArea>
+      <c:layout/>
+      <c:barChart>
+        <c:barDir val="col"/>
+        <c:grouping val="percentStacked"/>
+        <c:varyColors val="0"/>
+        <c:ser>
+          <c:idx val="0"/>
+          <c:order val="0"/>
+          <c:tx>
+            <c:strRef>
+              <c:f>Sheet1!$B$1</c:f>
+              <c:strCache>
+                <c:ptCount val="1"/>
+                <c:pt idx="0">
+                  <c:v>Objective met</c:v>
+                </c:pt>
+              </c:strCache>
+            </c:strRef>
+          </c:tx>
+          <c:spPr>
+            <a:solidFill>
+              <a:srgbClr val="0066FF"/>
+            </a:solidFill>
+            <a:ln w="19050">
+              <a:noFill/>
+            </a:ln>
+            <a:effectLst>
+              <a:outerShdw blurRad="241300" dist="38100" dir="2700000" algn="tl" rotWithShape="0">
+                <a:prstClr val="black">
+                  <a:alpha val="15000"/>
+                </a:prstClr>
+              </a:outerShdw>
+            </a:effectLst>
+          </c:spPr>
+          <c:invertIfNegative val="0"/>
+          <c:dPt>
+            <c:idx val="0"/>
+            <c:invertIfNegative val="0"/>
+            <c:bubble3D val="0"/>
+            <c:explosion val="6"/>
+            <c:spPr>
+              <a:solidFill>
+                <a:srgbClr val="0066FF"/>
+              </a:solidFill>
+              <a:ln w="19050">
+                <a:noFill/>
+              </a:ln>
+              <a:effectLst>
+                <a:outerShdw blurRad="241300" dist="38100" dir="2700000" algn="tl" rotWithShape="0">
+                  <a:prstClr val="black">
+                    <a:alpha val="15000"/>
+                  </a:prstClr>
+                </a:outerShdw>
+              </a:effectLst>
+            </c:spPr>
+            <c:extLst xmlns:w="http://schemas.openxmlformats.org/wordprocessingml/2006/main" xmlns:w15="http://schemas.microsoft.com/office/word/2012/wordml" xmlns:w14="http://schemas.microsoft.com/office/word/2010/wordml" xmlns:m="http://schemas.openxmlformats.org/officeDocument/2006/math" xmlns:wp="http://schemas.openxmlformats.org/drawingml/2006/wordprocessingDrawing" xmlns:wp14="http://schemas.microsoft.com/office/word/2010/wordprocessingDrawing" xmlns:mc="http://schemas.openxmlformats.org/markup-compatibility/2006" xmlns:sl="http://schemas.openxmlformats.org/schemaLibrary/2006/main" xmlns:wne="http://schemas.microsoft.com/office/word/2006/wordml" xmlns:cdr="http://schemas.openxmlformats.org/drawingml/2006/chartDrawing" xmlns:c14="http://schemas.microsoft.com/office/drawing/2007/8/2/chart" xmlns:dgm="http://schemas.openxmlformats.org/drawingml/2006/diagram" xmlns:pic="http://schemas.openxmlformats.org/drawingml/2006/picture" xmlns:xdr="http://schemas.openxmlformats.org/drawingml/2006/spreadsheetDrawing" xmlns:dsp="http://schemas.microsoft.com/office/drawing/2008/diagram" xmlns:xvml="urn:schemas-microsoft-com:office:excel" xmlns:o="urn:schemas-microsoft-com:office:office" xmlns:v="urn:schemas-microsoft-com:vml" xmlns:w10="urn:schemas-microsoft-com:office:word" xmlns:pvml="urn:schemas-microsoft-com:office:powerpoint" xmlns:cppr="http://schemas.microsoft.com/office/2006/coverPageProps" xmlns:odx="http://opendope.org/xpaths" xmlns:odc="http://opendope.org/conditions" xmlns:odq="http://opendope.org/questions" xmlns:oda="http://opendope.org/answers" xmlns:odi="http://opendope.org/components" xmlns:odgm="http://opendope.org/SmartArt/DataHierarchy" xmlns:b="http://schemas.openxmlformats.org/officeDocument/2006/bibliography" xmlns:wps="http://schemas.microsoft.com/office/word/2010/wordprocessingShape" xmlns:w16se="http://schemas.microsoft.com/office/word/2015/wordml/symex" xmlns:w16cid="http://schemas.microsoft.com/office/word/2016/wordml/cid" xmlns:wetp="http://schemas.microsoft.com/office/webextensions/taskpanes/2010/11" xmlns:we="http://schemas.microsoft.com/office/webextensions/webextension/2010/11" xmlns:comp="http://schemas.openxmlformats.org/drawingml/2006/compatibility" xmlns:lc="http://schemas.openxmlformats.org/drawingml/2006/lockedCanvas">
+              <c:ext xmlns:c16="http://schemas.microsoft.com/office/drawing/2014/chart" uri="{C3380CC4-5D6E-409C-BE32-E72D297353CC}">
+                <c16:uniqueId val="{00000001-6147-E74A-AA7B-5531F0E4EE0C}"/>
+              </c:ext>
+            </c:extLst>
+          </c:dPt>
+          <c:cat>
+            <c:strRef>
+              <c:f>Sheet1!$A$2:$A$13</c:f>
+              <c:strCache>
+                <c:ptCount val="12"/>
+                <c:pt idx="0">
+                  <c:v>Month 1</c:v>
+                </c:pt>
+                <c:pt idx="1">
+                  <c:v>Month 2</c:v>
+                </c:pt>
+                <c:pt idx="2">
+                  <c:v>Month 3</c:v>
+                </c:pt>
+                <c:pt idx="3">
+                  <c:v>Month 4</c:v>
+                </c:pt>
+                <c:pt idx="4">
+                  <c:v>Month 5</c:v>
+                </c:pt>
+                <c:pt idx="5">
+                  <c:v>Month 6</c:v>
+                </c:pt>
+                <c:pt idx="6">
+                  <c:v>Month 7</c:v>
+                </c:pt>
+                <c:pt idx="7">
+                  <c:v>Month 8</c:v>
+                </c:pt>
+                <c:pt idx="8">
+                  <c:v>Month 9</c:v>
+                </c:pt>
+                <c:pt idx="9">
+                  <c:v>Month 10</c:v>
+                </c:pt>
+                <c:pt idx="10">
+                  <c:v>Month 11</c:v>
+                </c:pt>
+                <c:pt idx="11">
+                  <c:v>Month 12</c:v>
+                </c:pt>
+              </c:strCache>
+            </c:strRef>
+          </c:cat>
+          <c:val>
+            <c:numRef>
+              <c:f>Sheet1!$B$2:$B$13</c:f>
+              <c:numCache>
+                <c:formatCode>0.0</c:formatCode>
+                <c:ptCount val="12"/>
+                <c:pt idx="0">
+                  <c:v>0.5</c:v>
+                </c:pt>
+                <c:pt idx="1">
+                  <c:v>0.5</c:v>
+                </c:pt>
+                <c:pt idx="2">
+                  <c:v>0.5</c:v>
+                </c:pt>
+                <c:pt idx="3">
+                  <c:v>0.5</c:v>
+                </c:pt>
+                <c:pt idx="4">
+                  <c:v>0.5</c:v>
+                </c:pt>
+                <c:pt idx="5">
+                  <c:v>0.5</c:v>
+                </c:pt>
+                <c:pt idx="6">
+                  <c:v>0.5</c:v>
+                </c:pt>
+                <c:pt idx="7">
+                  <c:v>0.5</c:v>
+                </c:pt>
+                <c:pt idx="8">
+                  <c:v>0.5</c:v>
+                </c:pt>
+                <c:pt idx="9">
+                  <c:v>0.5</c:v>
+                </c:pt>
+                <c:pt idx="10">
+                  <c:v>0.5</c:v>
+                </c:pt>
+                <c:pt idx="11">
+                  <c:v>0.5</c:v>
+                </c:pt>
+              </c:numCache>
+            </c:numRef>
+          </c:val>
+          <c:extLst xmlns:w="http://schemas.openxmlformats.org/wordprocessingml/2006/main" xmlns:w15="http://schemas.microsoft.com/office/word/2012/wordml" xmlns:w14="http://schemas.microsoft.com/office/word/2010/wordml" xmlns:m="http://schemas.openxmlformats.org/officeDocument/2006/math" xmlns:wp="http://schemas.openxmlformats.org/drawingml/2006/wordprocessingDrawing" xmlns:wp14="http://schemas.microsoft.com/office/word/2010/wordprocessingDrawing" xmlns:mc="http://schemas.openxmlformats.org/markup-compatibility/2006" xmlns:sl="http://schemas.openxmlformats.org/schemaLibrary/2006/main" xmlns:wne="http://schemas.microsoft.com/office/word/2006/wordml" xmlns:cdr="http://schemas.openxmlformats.org/drawingml/2006/chartDrawing" xmlns:c14="http://schemas.microsoft.com/office/drawing/2007/8/2/chart" xmlns:dgm="http://schemas.openxmlformats.org/drawingml/2006/diagram" xmlns:pic="http://schemas.openxmlformats.org/drawingml/2006/picture" xmlns:xdr="http://schemas.openxmlformats.org/drawingml/2006/spreadsheetDrawing" xmlns:dsp="http://schemas.microsoft.com/office/drawing/2008/diagram" xmlns:xvml="urn:schemas-microsoft-com:office:excel" xmlns:o="urn:schemas-microsoft-com:office:office" xmlns:v="urn:schemas-microsoft-com:vml" xmlns:w10="urn:schemas-microsoft-com:office:word" xmlns:pvml="urn:schemas-microsoft-com:office:powerpoint" xmlns:cppr="http://schemas.microsoft.com/office/2006/coverPageProps" xmlns:odx="http://opendope.org/xpaths" xmlns:odc="http://opendope.org/conditions" xmlns:odq="http://opendope.org/questions" xmlns:oda="http://opendope.org/answers" xmlns:odi="http://opendope.org/components" xmlns:odgm="http://opendope.org/SmartArt/DataHierarchy" xmlns:b="http://schemas.openxmlformats.org/officeDocument/2006/bibliography" xmlns:wps="http://schemas.microsoft.com/office/word/2010/wordprocessingShape" xmlns:w16se="http://schemas.microsoft.com/office/word/2015/wordml/symex" xmlns:w16cid="http://schemas.microsoft.com/office/word/2016/wordml/cid" xmlns:wetp="http://schemas.microsoft.com/office/webextensions/taskpanes/2010/11" xmlns:we="http://schemas.microsoft.com/office/webextensions/webextension/2010/11" xmlns:comp="http://schemas.openxmlformats.org/drawingml/2006/compatibility" xmlns:lc="http://schemas.openxmlformats.org/drawingml/2006/lockedCanvas">
+            <c:ext xmlns:c16="http://schemas.microsoft.com/office/drawing/2014/chart" uri="{C3380CC4-5D6E-409C-BE32-E72D297353CC}">
+              <c16:uniqueId val="{00000002-6147-E74A-AA7B-5531F0E4EE0C}"/>
+            </c:ext>
+          </c:extLst>
+        </c:ser>
+        <c:ser>
+          <c:idx val="1"/>
+          <c:order val="1"/>
+          <c:tx>
+            <c:strRef>
+              <c:f>Sheet1!$C$1</c:f>
+              <c:strCache>
+                <c:ptCount val="1"/>
+                <c:pt idx="0">
+                  <c:v>Improved</c:v>
+                </c:pt>
+              </c:strCache>
+            </c:strRef>
+          </c:tx>
+          <c:spPr>
+            <a:solidFill>
+              <a:srgbClr val="67E77F"/>
+            </a:solidFill>
+            <a:ln w="19050">
+              <a:noFill/>
+            </a:ln>
+            <a:effectLst/>
+          </c:spPr>
+          <c:invertIfNegative val="0"/>
+          <c:cat>
+            <c:strRef>
+              <c:f>Sheet1!$A$2:$A$13</c:f>
+              <c:strCache>
+                <c:ptCount val="12"/>
+                <c:pt idx="0">
+                  <c:v>Month 1</c:v>
+                </c:pt>
+                <c:pt idx="1">
+                  <c:v>Month 2</c:v>
+                </c:pt>
+                <c:pt idx="2">
+                  <c:v>Month 3</c:v>
+                </c:pt>
+                <c:pt idx="3">
+                  <c:v>Month 4</c:v>
+                </c:pt>
+                <c:pt idx="4">
+                  <c:v>Month 5</c:v>
+                </c:pt>
+                <c:pt idx="5">
+                  <c:v>Month 6</c:v>
+                </c:pt>
+                <c:pt idx="6">
+                  <c:v>Month 7</c:v>
+                </c:pt>
+                <c:pt idx="7">
+                  <c:v>Month 8</c:v>
+                </c:pt>
+                <c:pt idx="8">
+                  <c:v>Month 9</c:v>
+                </c:pt>
+                <c:pt idx="9">
+                  <c:v>Month 10</c:v>
+                </c:pt>
+                <c:pt idx="10">
+                  <c:v>Month 11</c:v>
+                </c:pt>
+                <c:pt idx="11">
+                  <c:v>Month 12</c:v>
+                </c:pt>
+              </c:strCache>
+            </c:strRef>
+          </c:cat>
+          <c:val>
+            <c:numRef>
+              <c:f>Sheet1!$C$2:$C$13</c:f>
+              <c:numCache>
+                <c:formatCode>0.0</c:formatCode>
+                <c:ptCount val="12"/>
+                <c:pt idx="0">
+                  <c:v>0.5</c:v>
+                </c:pt>
+                <c:pt idx="1">
+                  <c:v>0.5</c:v>
+                </c:pt>
+                <c:pt idx="2">
+                  <c:v>0.5</c:v>
+                </c:pt>
+                <c:pt idx="3">
+                  <c:v>0.5</c:v>
+                </c:pt>
+                <c:pt idx="4">
+                  <c:v>0.5</c:v>
+                </c:pt>
+                <c:pt idx="5">
+                  <c:v>0.5</c:v>
+                </c:pt>
+                <c:pt idx="6">
+                  <c:v>0.5</c:v>
+                </c:pt>
+                <c:pt idx="7">
+                  <c:v>0.5</c:v>
+                </c:pt>
+                <c:pt idx="8">
+                  <c:v>0.5</c:v>
+                </c:pt>
+                <c:pt idx="9">
+                  <c:v>0.5</c:v>
+                </c:pt>
+                <c:pt idx="10">
+                  <c:v>0.5</c:v>
+                </c:pt>
+                <c:pt idx="11">
+                  <c:v>0.5</c:v>
+                </c:pt>
+              </c:numCache>
+            </c:numRef>
+          </c:val>
+          <c:extLst>
+            <c:ext xmlns:c16="http://schemas.microsoft.com/office/drawing/2014/chart" uri="{C3380CC4-5D6E-409C-BE32-E72D297353CC}">
+              <c16:uniqueId val="{00000003-6147-E74A-AA7B-5531F0E4EE0C}"/>
+            </c:ext>
+          </c:extLst>
+        </c:ser>
+        <c:ser>
+          <c:idx val="2"/>
+          <c:order val="2"/>
+          <c:tx>
+            <c:strRef>
+              <c:f>Sheet1!$D$1</c:f>
+              <c:strCache>
+                <c:ptCount val="1"/>
+                <c:pt idx="0">
+                  <c:v>Unchanged</c:v>
+                </c:pt>
+              </c:strCache>
+            </c:strRef>
+          </c:tx>
+          <c:spPr>
+            <a:solidFill>
+              <a:srgbClr val="BFC4CF"/>
+            </a:solidFill>
+            <a:ln w="19050">
+              <a:noFill/>
+            </a:ln>
+            <a:effectLst/>
+          </c:spPr>
+          <c:invertIfNegative val="0"/>
+          <c:cat>
+            <c:strRef>
+              <c:f>Sheet1!$A$2:$A$13</c:f>
+              <c:strCache>
+                <c:ptCount val="12"/>
+                <c:pt idx="0">
+                  <c:v>Month 1</c:v>
+                </c:pt>
+                <c:pt idx="1">
+                  <c:v>Month 2</c:v>
+                </c:pt>
+                <c:pt idx="2">
+                  <c:v>Month 3</c:v>
+                </c:pt>
+                <c:pt idx="3">
+                  <c:v>Month 4</c:v>
+                </c:pt>
+                <c:pt idx="4">
+                  <c:v>Month 5</c:v>
+                </c:pt>
+                <c:pt idx="5">
+                  <c:v>Month 6</c:v>
+                </c:pt>
+                <c:pt idx="6">
+                  <c:v>Month 7</c:v>
+                </c:pt>
+                <c:pt idx="7">
+                  <c:v>Month 8</c:v>
+                </c:pt>
+                <c:pt idx="8">
+                  <c:v>Month 9</c:v>
+                </c:pt>
+                <c:pt idx="9">
+                  <c:v>Month 10</c:v>
+                </c:pt>
+                <c:pt idx="10">
+                  <c:v>Month 11</c:v>
+                </c:pt>
+                <c:pt idx="11">
+                  <c:v>Month 12</c:v>
+                </c:pt>
+              </c:strCache>
+            </c:strRef>
+          </c:cat>
+          <c:val>
+            <c:numRef>
+              <c:f>Sheet1!$D$2:$D$13</c:f>
+              <c:numCache>
+                <c:formatCode>General</c:formatCode>
+                <c:ptCount val="12"/>
+                <c:pt idx="0">
+                  <c:v>0.5</c:v>
+                </c:pt>
+                <c:pt idx="1">
+                  <c:v>0.5</c:v>
+                </c:pt>
+                <c:pt idx="2">
+                  <c:v>0.5</c:v>
+                </c:pt>
+                <c:pt idx="3">
+                  <c:v>0.5</c:v>
+                </c:pt>
+                <c:pt idx="4">
+                  <c:v>0.5</c:v>
+                </c:pt>
+                <c:pt idx="5">
+                  <c:v>0.5</c:v>
+                </c:pt>
+                <c:pt idx="6">
+                  <c:v>0.5</c:v>
+                </c:pt>
+                <c:pt idx="7">
+                  <c:v>0.5</c:v>
+                </c:pt>
+                <c:pt idx="8">
+                  <c:v>0.5</c:v>
+                </c:pt>
+                <c:pt idx="9">
+                  <c:v>0.5</c:v>
+                </c:pt>
+                <c:pt idx="10">
+                  <c:v>0.5</c:v>
+                </c:pt>
+                <c:pt idx="11">
+                  <c:v>0.5</c:v>
+                </c:pt>
+              </c:numCache>
+            </c:numRef>
+          </c:val>
+          <c:extLst>
+            <c:ext xmlns:c16="http://schemas.microsoft.com/office/drawing/2014/chart" uri="{C3380CC4-5D6E-409C-BE32-E72D297353CC}">
+              <c16:uniqueId val="{00000004-6147-E74A-AA7B-5531F0E4EE0C}"/>
+            </c:ext>
+          </c:extLst>
+        </c:ser>
+        <c:ser>
+          <c:idx val="3"/>
+          <c:order val="3"/>
+          <c:tx>
+            <c:strRef>
+              <c:f>Sheet1!$E$1</c:f>
+              <c:strCache>
+                <c:ptCount val="1"/>
+                <c:pt idx="0">
+                  <c:v>Worsened</c:v>
+                </c:pt>
+              </c:strCache>
+            </c:strRef>
+          </c:tx>
+          <c:spPr>
+            <a:solidFill>
+              <a:srgbClr val="F06241"/>
+            </a:solidFill>
+            <a:ln w="19050">
+              <a:noFill/>
+            </a:ln>
+            <a:effectLst/>
+          </c:spPr>
+          <c:invertIfNegative val="0"/>
+          <c:cat>
+            <c:strRef>
+              <c:f>Sheet1!$A$2:$A$13</c:f>
+              <c:strCache>
+                <c:ptCount val="12"/>
+                <c:pt idx="0">
+                  <c:v>Month 1</c:v>
+                </c:pt>
+                <c:pt idx="1">
+                  <c:v>Month 2</c:v>
+                </c:pt>
+                <c:pt idx="2">
+                  <c:v>Month 3</c:v>
+                </c:pt>
+                <c:pt idx="3">
+                  <c:v>Month 4</c:v>
+                </c:pt>
+                <c:pt idx="4">
+                  <c:v>Month 5</c:v>
+                </c:pt>
+                <c:pt idx="5">
+                  <c:v>Month 6</c:v>
+                </c:pt>
+                <c:pt idx="6">
+                  <c:v>Month 7</c:v>
+                </c:pt>
+                <c:pt idx="7">
+                  <c:v>Month 8</c:v>
+                </c:pt>
+                <c:pt idx="8">
+                  <c:v>Month 9</c:v>
+                </c:pt>
+                <c:pt idx="9">
+                  <c:v>Month 10</c:v>
+                </c:pt>
+                <c:pt idx="10">
+                  <c:v>Month 11</c:v>
+                </c:pt>
+                <c:pt idx="11">
+                  <c:v>Month 12</c:v>
+                </c:pt>
+              </c:strCache>
+            </c:strRef>
+          </c:cat>
+          <c:val>
+            <c:numRef>
+              <c:f>Sheet1!$E$2:$E$13</c:f>
+              <c:numCache>
+                <c:formatCode>General</c:formatCode>
+                <c:ptCount val="12"/>
+                <c:pt idx="0">
+                  <c:v>0.5</c:v>
+                </c:pt>
+                <c:pt idx="1">
+                  <c:v>0.5</c:v>
+                </c:pt>
+                <c:pt idx="2">
+                  <c:v>0.5</c:v>
+                </c:pt>
+                <c:pt idx="3">
+                  <c:v>0.5</c:v>
+                </c:pt>
+                <c:pt idx="4">
+                  <c:v>0.5</c:v>
+                </c:pt>
+                <c:pt idx="5">
+                  <c:v>0.5</c:v>
+                </c:pt>
+                <c:pt idx="6">
+                  <c:v>0.5</c:v>
+                </c:pt>
+                <c:pt idx="7">
+                  <c:v>0.5</c:v>
+                </c:pt>
+                <c:pt idx="8">
+                  <c:v>0.5</c:v>
+                </c:pt>
+                <c:pt idx="9">
+                  <c:v>0.5</c:v>
+                </c:pt>
+                <c:pt idx="10">
+                  <c:v>0.5</c:v>
+                </c:pt>
+                <c:pt idx="11">
+                  <c:v>0.5</c:v>
+                </c:pt>
+              </c:numCache>
+            </c:numRef>
+          </c:val>
+          <c:extLst>
+            <c:ext xmlns:c16="http://schemas.microsoft.com/office/drawing/2014/chart" uri="{C3380CC4-5D6E-409C-BE32-E72D297353CC}">
+              <c16:uniqueId val="{00000005-6147-E74A-AA7B-5531F0E4EE0C}"/>
+            </c:ext>
+          </c:extLst>
+        </c:ser>
+        <c:ser>
+          <c:idx val="4"/>
+          <c:order val="4"/>
+          <c:tx>
+            <c:strRef>
+              <c:f>Sheet1!$F$1</c:f>
+              <c:strCache>
+                <c:ptCount val="1"/>
+                <c:pt idx="0">
+                  <c:v>Unknown</c:v>
+                </c:pt>
+              </c:strCache>
+            </c:strRef>
+          </c:tx>
+          <c:spPr>
+            <a:solidFill>
+              <a:schemeClr val="bg1"/>
+            </a:solidFill>
+            <a:ln w="19050">
+              <a:solidFill>
+                <a:schemeClr val="lt1"/>
+              </a:solidFill>
+            </a:ln>
+            <a:effectLst/>
+          </c:spPr>
+          <c:invertIfNegative val="0"/>
+          <c:cat>
+            <c:strRef>
+              <c:f>Sheet1!$A$2:$A$13</c:f>
+              <c:strCache>
+                <c:ptCount val="12"/>
+                <c:pt idx="0">
+                  <c:v>Month 1</c:v>
+                </c:pt>
+                <c:pt idx="1">
+                  <c:v>Month 2</c:v>
+                </c:pt>
+                <c:pt idx="2">
+                  <c:v>Month 3</c:v>
+                </c:pt>
+                <c:pt idx="3">
+                  <c:v>Month 4</c:v>
+                </c:pt>
+                <c:pt idx="4">
+                  <c:v>Month 5</c:v>
+                </c:pt>
+                <c:pt idx="5">
+                  <c:v>Month 6</c:v>
+                </c:pt>
+                <c:pt idx="6">
+                  <c:v>Month 7</c:v>
+                </c:pt>
+                <c:pt idx="7">
+                  <c:v>Month 8</c:v>
+                </c:pt>
+                <c:pt idx="8">
+                  <c:v>Month 9</c:v>
+                </c:pt>
+                <c:pt idx="9">
+                  <c:v>Month 10</c:v>
+                </c:pt>
+                <c:pt idx="10">
+                  <c:v>Month 11</c:v>
+                </c:pt>
+                <c:pt idx="11">
+                  <c:v>Month 12</c:v>
+                </c:pt>
+              </c:strCache>
+            </c:strRef>
+          </c:cat>
+          <c:val>
+            <c:numRef>
+              <c:f>Sheet1!$F$2:$F$13</c:f>
+              <c:numCache>
+                <c:formatCode>General</c:formatCode>
+                <c:ptCount val="12"/>
+                <c:pt idx="0">
+                  <c:v>0.5</c:v>
+                </c:pt>
+                <c:pt idx="1">
+                  <c:v>0.5</c:v>
+                </c:pt>
+                <c:pt idx="2">
+                  <c:v>0.5</c:v>
+                </c:pt>
+                <c:pt idx="3">
+                  <c:v>0.5</c:v>
+                </c:pt>
+                <c:pt idx="4">
+                  <c:v>0.5</c:v>
+                </c:pt>
+                <c:pt idx="5">
+                  <c:v>0.5</c:v>
+                </c:pt>
+                <c:pt idx="6">
+                  <c:v>0.5</c:v>
+                </c:pt>
+                <c:pt idx="7">
+                  <c:v>0.5</c:v>
+                </c:pt>
+                <c:pt idx="8">
+                  <c:v>0.5</c:v>
+                </c:pt>
+                <c:pt idx="9">
+                  <c:v>0.5</c:v>
+                </c:pt>
+                <c:pt idx="10">
+                  <c:v>0.5</c:v>
+                </c:pt>
+                <c:pt idx="11">
+                  <c:v>0.5</c:v>
+                </c:pt>
+              </c:numCache>
+            </c:numRef>
+          </c:val>
+          <c:extLst>
+            <c:ext xmlns:c16="http://schemas.microsoft.com/office/drawing/2014/chart" uri="{C3380CC4-5D6E-409C-BE32-E72D297353CC}">
+              <c16:uniqueId val="{00000006-6147-E74A-AA7B-5531F0E4EE0C}"/>
+            </c:ext>
+          </c:extLst>
+        </c:ser>
+        <c:dLbls>
+          <c:showLegendKey val="0"/>
+          <c:showVal val="0"/>
+          <c:showCatName val="0"/>
+          <c:showSerName val="0"/>
+          <c:showPercent val="0"/>
+          <c:showBubbleSize val="0"/>
+        </c:dLbls>
+        <c:gapWidth val="20"/>
+        <c:overlap val="100"/>
+        <c:axId val="476387520"/>
+        <c:axId val="477616192"/>
+      </c:barChart>
+      <c:catAx>
+        <c:axId val="476387520"/>
+        <c:scaling>
+          <c:orientation val="minMax"/>
+        </c:scaling>
+        <c:delete val="0"/>
+        <c:axPos val="b"/>
+        <c:numFmt formatCode="General" sourceLinked="1"/>
+        <c:majorTickMark val="out"/>
+        <c:minorTickMark val="none"/>
+        <c:tickLblPos val="nextTo"/>
+        <c:spPr>
+          <a:noFill/>
+          <a:ln w="9525" cap="flat" cmpd="sng" algn="ctr">
+            <a:solidFill>
+              <a:schemeClr val="tx1">
+                <a:lumMod val="15000"/>
+                <a:lumOff val="85000"/>
+              </a:schemeClr>
+            </a:solidFill>
+            <a:round/>
+          </a:ln>
+          <a:effectLst/>
+        </c:spPr>
+        <c:txPr>
+          <a:bodyPr rot="-60000000" spcFirstLastPara="1" vertOverflow="ellipsis" vert="horz" wrap="square" anchor="ctr" anchorCtr="1"/>
+          <a:lstStyle/>
+          <a:p>
+            <a:pPr>
+              <a:defRPr sz="1400" b="0" i="0" u="none" strike="noStrike" kern="1200" baseline="0">
+                <a:solidFill>
+                  <a:schemeClr val="tx2"/>
+                </a:solidFill>
+                <a:latin typeface="+mn-lt"/>
+                <a:ea typeface="+mn-ea"/>
+                <a:cs typeface="+mn-cs"/>
+              </a:defRPr>
+            </a:pPr>
+            <a:endParaRPr lang="en-NL"/>
+          </a:p>
+        </c:txPr>
+        <c:crossAx val="477616192"/>
+        <c:crosses val="autoZero"/>
+        <c:auto val="1"/>
+        <c:lblAlgn val="ctr"/>
+        <c:lblOffset val="100"/>
+        <c:noMultiLvlLbl val="0"/>
+      </c:catAx>
+      <c:valAx>
+        <c:axId val="477616192"/>
+        <c:scaling>
+          <c:orientation val="minMax"/>
+        </c:scaling>
+        <c:delete val="0"/>
+        <c:axPos val="l"/>
+        <c:majorGridlines>
+          <c:spPr>
+            <a:ln w="9525" cap="flat" cmpd="sng" algn="ctr">
+              <a:solidFill>
+                <a:schemeClr val="tx1">
+                  <a:lumMod val="15000"/>
+                  <a:lumOff val="85000"/>
+                </a:schemeClr>
+              </a:solidFill>
+              <a:round/>
+            </a:ln>
+            <a:effectLst/>
+          </c:spPr>
+        </c:majorGridlines>
+        <c:numFmt formatCode="0%" sourceLinked="0"/>
+        <c:majorTickMark val="out"/>
+        <c:minorTickMark val="none"/>
+        <c:tickLblPos val="nextTo"/>
+        <c:spPr>
+          <a:noFill/>
+          <a:ln>
+            <a:noFill/>
+          </a:ln>
+          <a:effectLst/>
+        </c:spPr>
+        <c:txPr>
+          <a:bodyPr rot="-60000000" spcFirstLastPara="1" vertOverflow="ellipsis" vert="horz" wrap="square" anchor="ctr" anchorCtr="1"/>
+          <a:lstStyle/>
+          <a:p>
+            <a:pPr>
+              <a:defRPr sz="1197" b="0" i="0" u="none" strike="noStrike" kern="1200" baseline="0">
+                <a:solidFill>
+                  <a:schemeClr val="tx2"/>
+                </a:solidFill>
+                <a:latin typeface="+mn-lt"/>
+                <a:ea typeface="+mn-ea"/>
+                <a:cs typeface="+mn-cs"/>
+              </a:defRPr>
+            </a:pPr>
+            <a:endParaRPr lang="en-US"/>
+          </a:p>
+        </c:txPr>
+        <c:crossAx val="476387520"/>
+        <c:crosses val="autoZero"/>
+        <c:crossBetween val="between"/>
+      </c:valAx>
+      <c:spPr>
+        <a:solidFill>
+          <a:srgbClr val="F0F4F8"/>
+        </a:solidFill>
+        <a:ln>
+          <a:noFill/>
+        </a:ln>
+        <a:effectLst/>
+      </c:spPr>
+    </c:plotArea>
+    <c:plotVisOnly val="1"/>
+    <c:dispBlanksAs val="gap"/>
+    <c:extLst xmlns:w="http://schemas.openxmlformats.org/wordprocessingml/2006/main" xmlns:w15="http://schemas.microsoft.com/office/word/2012/wordml" xmlns:w14="http://schemas.microsoft.com/office/word/2010/wordml" xmlns:m="http://schemas.openxmlformats.org/officeDocument/2006/math" xmlns:wp="http://schemas.openxmlformats.org/drawingml/2006/wordprocessingDrawing" xmlns:wp14="http://schemas.microsoft.com/office/word/2010/wordprocessingDrawing" xmlns:mc="http://schemas.openxmlformats.org/markup-compatibility/2006" xmlns:sl="http://schemas.openxmlformats.org/schemaLibrary/2006/main" xmlns:wne="http://schemas.microsoft.com/office/word/2006/wordml" xmlns:cdr="http://schemas.openxmlformats.org/drawingml/2006/chartDrawing" xmlns:c14="http://schemas.microsoft.com/office/drawing/2007/8/2/chart" xmlns:dgm="http://schemas.openxmlformats.org/drawingml/2006/diagram" xmlns:pic="http://schemas.openxmlformats.org/drawingml/2006/picture" xmlns:xdr="http://schemas.openxmlformats.org/drawingml/2006/spreadsheetDrawing" xmlns:dsp="http://schemas.microsoft.com/office/drawing/2008/diagram" xmlns:xvml="urn:schemas-microsoft-com:office:excel" xmlns:o="urn:schemas-microsoft-com:office:office" xmlns:v="urn:schemas-microsoft-com:vml" xmlns:w10="urn:schemas-microsoft-com:office:word" xmlns:pvml="urn:schemas-microsoft-com:office:powerpoint" xmlns:cppr="http://schemas.microsoft.com/office/2006/coverPageProps" xmlns:odx="http://opendope.org/xpaths" xmlns:odc="http://opendope.org/conditions" xmlns:odq="http://opendope.org/questions" xmlns:oda="http://opendope.org/answers" xmlns:odi="http://opendope.org/components" xmlns:odgm="http://opendope.org/SmartArt/DataHierarchy" xmlns:b="http://schemas.openxmlformats.org/officeDocument/2006/bibliography" xmlns:wps="http://schemas.microsoft.com/office/word/2010/wordprocessingShape" xmlns:w16se="http://schemas.microsoft.com/office/word/2015/wordml/symex" xmlns:w16cid="http://schemas.microsoft.com/office/word/2016/wordml/cid" xmlns:wetp="http://schemas.microsoft.com/office/webextensions/taskpanes/2010/11" xmlns:we="http://schemas.microsoft.com/office/webextensions/webextension/2010/11" xmlns:comp="http://schemas.openxmlformats.org/drawingml/2006/compatibility" xmlns:lc="http://schemas.openxmlformats.org/drawingml/2006/lockedCanvas">
+      <c:ext xmlns:c16r3="http://schemas.microsoft.com/office/drawing/2017/03/chart" uri="{56B9EC1D-385E-4148-901F-78D8002777C0}">
+        <c16r3:dataDisplayOptions16>
+          <c16r3:dispNaAsBlank val="1"/>
+        </c16r3:dataDisplayOptions16>
+      </c:ext>
+    </c:extLst>
+    <c:showDLblsOverMax val="0"/>
+  </c:chart>
+  <c:spPr>
+    <a:noFill/>
+    <a:ln>
+      <a:noFill/>
+    </a:ln>
+    <a:effectLst/>
+  </c:spPr>
+  <c:txPr>
+    <a:bodyPr/>
+    <a:lstStyle/>
+    <a:p>
+      <a:pPr>
+        <a:defRPr/>
+      </a:pPr>
+      <a:endParaRPr lang="en-NL"/>
+    </a:p>
+  </c:txPr>
+  <c:externalData r:id="rId3">
+    <c:autoUpdate val="0"/>
+  </c:externalData>
+</c:chartSpace>
+</file>
+
+<file path=ppt/charts/chart8.xml><?xml version="1.0" encoding="utf-8"?>
 <c:chartSpace xmlns:c="http://schemas.openxmlformats.org/drawingml/2006/chart" xmlns:a="http://schemas.openxmlformats.org/drawingml/2006/main" xmlns:r="http://schemas.openxmlformats.org/officeDocument/2006/relationships" xmlns:c16r2="http://schemas.microsoft.com/office/drawing/2015/06/chart">
   <c:date1904 val="0"/>
   <c:lang val="en-US"/>
@@ -5414,6 +6163,12 @@
 </file>
 
 <file path=ppt/charts/colors7.xml><?xml version="1.0" encoding="utf-8"?>
+<cs:colorStyle xmlns:cs="http://schemas.microsoft.com/office/drawing/2012/chartStyle" xmlns:a="http://schemas.openxmlformats.org/drawingml/2006/main" meth="withinLinear" id="15">
+  <a:schemeClr val="accent2"/>
+</cs:colorStyle>
+</file>
+
+<file path=ppt/charts/colors8.xml><?xml version="1.0" encoding="utf-8"?>
 <cs:colorStyle xmlns:cs="http://schemas.microsoft.com/office/drawing/2012/chartStyle" xmlns:a="http://schemas.openxmlformats.org/drawingml/2006/main" meth="withinLinear" id="15">
   <a:schemeClr val="accent2"/>
 </cs:colorStyle>
@@ -9052,6 +9807,525 @@
 </cs:chartStyle>
 </file>
 
+<file path=ppt/charts/style8.xml><?xml version="1.0" encoding="utf-8"?>
+<cs:chartStyle xmlns:cs="http://schemas.microsoft.com/office/drawing/2012/chartStyle" xmlns:a="http://schemas.openxmlformats.org/drawingml/2006/main" id="251">
+  <cs:axisTitle>
+    <cs:lnRef idx="0"/>
+    <cs:fillRef idx="0"/>
+    <cs:effectRef idx="0"/>
+    <cs:fontRef idx="minor">
+      <a:schemeClr val="tx1">
+        <a:lumMod val="65000"/>
+        <a:lumOff val="35000"/>
+      </a:schemeClr>
+    </cs:fontRef>
+    <cs:defRPr sz="1330" kern="1200"/>
+  </cs:axisTitle>
+  <cs:categoryAxis>
+    <cs:lnRef idx="0"/>
+    <cs:fillRef idx="0"/>
+    <cs:effectRef idx="0"/>
+    <cs:fontRef idx="minor">
+      <a:schemeClr val="tx1">
+        <a:lumMod val="65000"/>
+        <a:lumOff val="35000"/>
+      </a:schemeClr>
+    </cs:fontRef>
+    <cs:spPr>
+      <a:ln w="9525" cap="flat" cmpd="sng" algn="ctr">
+        <a:solidFill>
+          <a:schemeClr val="tx1">
+            <a:lumMod val="15000"/>
+            <a:lumOff val="85000"/>
+          </a:schemeClr>
+        </a:solidFill>
+        <a:round/>
+      </a:ln>
+    </cs:spPr>
+    <cs:defRPr sz="1197" kern="1200"/>
+  </cs:categoryAxis>
+  <cs:chartArea mods="allowNoFillOverride allowNoLineOverride">
+    <cs:lnRef idx="0"/>
+    <cs:fillRef idx="0"/>
+    <cs:effectRef idx="0"/>
+    <cs:fontRef idx="minor">
+      <a:schemeClr val="tx1"/>
+    </cs:fontRef>
+    <cs:spPr>
+      <a:solidFill>
+        <a:schemeClr val="bg1"/>
+      </a:solidFill>
+      <a:ln w="9525" cap="flat" cmpd="sng" algn="ctr">
+        <a:solidFill>
+          <a:schemeClr val="tx1">
+            <a:lumMod val="15000"/>
+            <a:lumOff val="85000"/>
+          </a:schemeClr>
+        </a:solidFill>
+        <a:round/>
+      </a:ln>
+    </cs:spPr>
+    <cs:defRPr sz="1197" kern="1200"/>
+  </cs:chartArea>
+  <cs:dataLabel>
+    <cs:lnRef idx="0"/>
+    <cs:fillRef idx="0"/>
+    <cs:effectRef idx="0"/>
+    <cs:fontRef idx="minor">
+      <a:schemeClr val="tx1">
+        <a:lumMod val="75000"/>
+        <a:lumOff val="25000"/>
+      </a:schemeClr>
+    </cs:fontRef>
+    <cs:defRPr sz="1197" kern="1200"/>
+  </cs:dataLabel>
+  <cs:dataLabelCallout>
+    <cs:lnRef idx="0"/>
+    <cs:fillRef idx="0"/>
+    <cs:effectRef idx="0"/>
+    <cs:fontRef idx="minor">
+      <a:schemeClr val="dk1">
+        <a:lumMod val="65000"/>
+        <a:lumOff val="35000"/>
+      </a:schemeClr>
+    </cs:fontRef>
+    <cs:spPr>
+      <a:solidFill>
+        <a:schemeClr val="lt1"/>
+      </a:solidFill>
+      <a:ln>
+        <a:solidFill>
+          <a:schemeClr val="dk1">
+            <a:lumMod val="25000"/>
+            <a:lumOff val="75000"/>
+          </a:schemeClr>
+        </a:solidFill>
+      </a:ln>
+    </cs:spPr>
+    <cs:defRPr sz="1197" kern="1200"/>
+    <cs:bodyPr rot="0" spcFirstLastPara="1" vertOverflow="clip" horzOverflow="clip" vert="horz" wrap="square" lIns="36576" tIns="18288" rIns="36576" bIns="18288" anchor="ctr" anchorCtr="1">
+      <a:spAutoFit/>
+    </cs:bodyPr>
+  </cs:dataLabelCallout>
+  <cs:dataPoint>
+    <cs:lnRef idx="0"/>
+    <cs:fillRef idx="1">
+      <cs:styleClr val="auto"/>
+    </cs:fillRef>
+    <cs:effectRef idx="0"/>
+    <cs:fontRef idx="minor">
+      <a:schemeClr val="tx1"/>
+    </cs:fontRef>
+    <cs:spPr>
+      <a:ln w="19050">
+        <a:solidFill>
+          <a:schemeClr val="lt1"/>
+        </a:solidFill>
+      </a:ln>
+    </cs:spPr>
+  </cs:dataPoint>
+  <cs:dataPoint3D>
+    <cs:lnRef idx="0"/>
+    <cs:fillRef idx="1">
+      <cs:styleClr val="auto"/>
+    </cs:fillRef>
+    <cs:effectRef idx="0"/>
+    <cs:fontRef idx="minor">
+      <a:schemeClr val="tx1"/>
+    </cs:fontRef>
+    <cs:spPr>
+      <a:ln w="25400">
+        <a:solidFill>
+          <a:schemeClr val="lt1"/>
+        </a:solidFill>
+      </a:ln>
+    </cs:spPr>
+  </cs:dataPoint3D>
+  <cs:dataPointLine>
+    <cs:lnRef idx="0">
+      <cs:styleClr val="auto"/>
+    </cs:lnRef>
+    <cs:fillRef idx="0"/>
+    <cs:effectRef idx="0"/>
+    <cs:fontRef idx="minor">
+      <a:schemeClr val="tx1"/>
+    </cs:fontRef>
+    <cs:spPr>
+      <a:ln w="28575" cap="rnd">
+        <a:solidFill>
+          <a:schemeClr val="phClr"/>
+        </a:solidFill>
+        <a:round/>
+      </a:ln>
+    </cs:spPr>
+  </cs:dataPointLine>
+  <cs:dataPointMarker>
+    <cs:lnRef idx="0">
+      <cs:styleClr val="auto"/>
+    </cs:lnRef>
+    <cs:fillRef idx="1">
+      <cs:styleClr val="auto"/>
+    </cs:fillRef>
+    <cs:effectRef idx="0"/>
+    <cs:fontRef idx="minor">
+      <a:schemeClr val="tx1"/>
+    </cs:fontRef>
+    <cs:spPr>
+      <a:ln w="9525">
+        <a:solidFill>
+          <a:schemeClr val="phClr"/>
+        </a:solidFill>
+      </a:ln>
+    </cs:spPr>
+  </cs:dataPointMarker>
+  <cs:dataPointMarkerLayout symbol="circle" size="5"/>
+  <cs:dataPointWireframe>
+    <cs:lnRef idx="0">
+      <cs:styleClr val="auto"/>
+    </cs:lnRef>
+    <cs:fillRef idx="0"/>
+    <cs:effectRef idx="0"/>
+    <cs:fontRef idx="minor">
+      <a:schemeClr val="tx1"/>
+    </cs:fontRef>
+    <cs:spPr>
+      <a:ln w="9525" cap="rnd">
+        <a:solidFill>
+          <a:schemeClr val="phClr"/>
+        </a:solidFill>
+        <a:round/>
+      </a:ln>
+    </cs:spPr>
+  </cs:dataPointWireframe>
+  <cs:dataTable>
+    <cs:lnRef idx="0"/>
+    <cs:fillRef idx="0"/>
+    <cs:effectRef idx="0"/>
+    <cs:fontRef idx="minor">
+      <a:schemeClr val="tx1">
+        <a:lumMod val="65000"/>
+        <a:lumOff val="35000"/>
+      </a:schemeClr>
+    </cs:fontRef>
+    <cs:spPr>
+      <a:noFill/>
+      <a:ln w="9525" cap="flat" cmpd="sng" algn="ctr">
+        <a:solidFill>
+          <a:schemeClr val="tx1">
+            <a:lumMod val="15000"/>
+            <a:lumOff val="85000"/>
+          </a:schemeClr>
+        </a:solidFill>
+        <a:round/>
+      </a:ln>
+    </cs:spPr>
+    <cs:defRPr sz="1197" kern="1200"/>
+  </cs:dataTable>
+  <cs:downBar>
+    <cs:lnRef idx="0"/>
+    <cs:fillRef idx="0"/>
+    <cs:effectRef idx="0"/>
+    <cs:fontRef idx="minor">
+      <a:schemeClr val="tx1"/>
+    </cs:fontRef>
+    <cs:spPr>
+      <a:solidFill>
+        <a:schemeClr val="dk1">
+          <a:lumMod val="75000"/>
+          <a:lumOff val="25000"/>
+        </a:schemeClr>
+      </a:solidFill>
+      <a:ln w="9525" cap="flat" cmpd="sng" algn="ctr">
+        <a:solidFill>
+          <a:schemeClr val="tx1">
+            <a:lumMod val="65000"/>
+            <a:lumOff val="35000"/>
+          </a:schemeClr>
+        </a:solidFill>
+        <a:round/>
+      </a:ln>
+    </cs:spPr>
+  </cs:downBar>
+  <cs:dropLine>
+    <cs:lnRef idx="0"/>
+    <cs:fillRef idx="0"/>
+    <cs:effectRef idx="0"/>
+    <cs:fontRef idx="minor">
+      <a:schemeClr val="tx1"/>
+    </cs:fontRef>
+    <cs:spPr>
+      <a:ln w="9525" cap="flat" cmpd="sng" algn="ctr">
+        <a:solidFill>
+          <a:schemeClr val="tx1">
+            <a:lumMod val="35000"/>
+            <a:lumOff val="65000"/>
+          </a:schemeClr>
+        </a:solidFill>
+        <a:round/>
+      </a:ln>
+    </cs:spPr>
+  </cs:dropLine>
+  <cs:errorBar>
+    <cs:lnRef idx="0"/>
+    <cs:fillRef idx="0"/>
+    <cs:effectRef idx="0"/>
+    <cs:fontRef idx="minor">
+      <a:schemeClr val="tx1"/>
+    </cs:fontRef>
+    <cs:spPr>
+      <a:ln w="9525" cap="flat" cmpd="sng" algn="ctr">
+        <a:solidFill>
+          <a:schemeClr val="tx1">
+            <a:lumMod val="65000"/>
+            <a:lumOff val="35000"/>
+          </a:schemeClr>
+        </a:solidFill>
+        <a:round/>
+      </a:ln>
+    </cs:spPr>
+  </cs:errorBar>
+  <cs:floor>
+    <cs:lnRef idx="0"/>
+    <cs:fillRef idx="0"/>
+    <cs:effectRef idx="0"/>
+    <cs:fontRef idx="minor">
+      <a:schemeClr val="tx1"/>
+    </cs:fontRef>
+    <cs:spPr>
+      <a:noFill/>
+      <a:ln>
+        <a:noFill/>
+      </a:ln>
+    </cs:spPr>
+  </cs:floor>
+  <cs:gridlineMajor>
+    <cs:lnRef idx="0"/>
+    <cs:fillRef idx="0"/>
+    <cs:effectRef idx="0"/>
+    <cs:fontRef idx="minor">
+      <a:schemeClr val="tx1"/>
+    </cs:fontRef>
+    <cs:spPr>
+      <a:ln w="9525" cap="flat" cmpd="sng" algn="ctr">
+        <a:solidFill>
+          <a:schemeClr val="tx1">
+            <a:lumMod val="15000"/>
+            <a:lumOff val="85000"/>
+          </a:schemeClr>
+        </a:solidFill>
+        <a:round/>
+      </a:ln>
+    </cs:spPr>
+  </cs:gridlineMajor>
+  <cs:gridlineMinor>
+    <cs:lnRef idx="0"/>
+    <cs:fillRef idx="0"/>
+    <cs:effectRef idx="0"/>
+    <cs:fontRef idx="minor">
+      <a:schemeClr val="tx1"/>
+    </cs:fontRef>
+    <cs:spPr>
+      <a:ln w="9525" cap="flat" cmpd="sng" algn="ctr">
+        <a:solidFill>
+          <a:schemeClr val="tx1">
+            <a:lumMod val="5000"/>
+            <a:lumOff val="95000"/>
+          </a:schemeClr>
+        </a:solidFill>
+        <a:round/>
+      </a:ln>
+    </cs:spPr>
+  </cs:gridlineMinor>
+  <cs:hiLoLine>
+    <cs:lnRef idx="0"/>
+    <cs:fillRef idx="0"/>
+    <cs:effectRef idx="0"/>
+    <cs:fontRef idx="minor">
+      <a:schemeClr val="tx1"/>
+    </cs:fontRef>
+    <cs:spPr>
+      <a:ln w="9525" cap="flat" cmpd="sng" algn="ctr">
+        <a:solidFill>
+          <a:schemeClr val="tx1">
+            <a:lumMod val="50000"/>
+            <a:lumOff val="50000"/>
+          </a:schemeClr>
+        </a:solidFill>
+        <a:round/>
+      </a:ln>
+    </cs:spPr>
+  </cs:hiLoLine>
+  <cs:leaderLine>
+    <cs:lnRef idx="0"/>
+    <cs:fillRef idx="0"/>
+    <cs:effectRef idx="0"/>
+    <cs:fontRef idx="minor">
+      <a:schemeClr val="tx1"/>
+    </cs:fontRef>
+    <cs:spPr>
+      <a:ln w="9525" cap="flat" cmpd="sng" algn="ctr">
+        <a:solidFill>
+          <a:schemeClr val="tx1">
+            <a:lumMod val="35000"/>
+            <a:lumOff val="65000"/>
+          </a:schemeClr>
+        </a:solidFill>
+        <a:round/>
+      </a:ln>
+    </cs:spPr>
+  </cs:leaderLine>
+  <cs:legend>
+    <cs:lnRef idx="0"/>
+    <cs:fillRef idx="0"/>
+    <cs:effectRef idx="0"/>
+    <cs:fontRef idx="minor">
+      <a:schemeClr val="tx1">
+        <a:lumMod val="65000"/>
+        <a:lumOff val="35000"/>
+      </a:schemeClr>
+    </cs:fontRef>
+    <cs:defRPr sz="1197" kern="1200"/>
+  </cs:legend>
+  <cs:plotArea mods="allowNoFillOverride allowNoLineOverride">
+    <cs:lnRef idx="0"/>
+    <cs:fillRef idx="0"/>
+    <cs:effectRef idx="0"/>
+    <cs:fontRef idx="minor">
+      <a:schemeClr val="tx1"/>
+    </cs:fontRef>
+  </cs:plotArea>
+  <cs:plotArea3D mods="allowNoFillOverride allowNoLineOverride">
+    <cs:lnRef idx="0"/>
+    <cs:fillRef idx="0"/>
+    <cs:effectRef idx="0"/>
+    <cs:fontRef idx="minor">
+      <a:schemeClr val="tx1"/>
+    </cs:fontRef>
+  </cs:plotArea3D>
+  <cs:seriesAxis>
+    <cs:lnRef idx="0"/>
+    <cs:fillRef idx="0"/>
+    <cs:effectRef idx="0"/>
+    <cs:fontRef idx="minor">
+      <a:schemeClr val="tx1">
+        <a:lumMod val="65000"/>
+        <a:lumOff val="35000"/>
+      </a:schemeClr>
+    </cs:fontRef>
+    <cs:defRPr sz="1197" kern="1200"/>
+  </cs:seriesAxis>
+  <cs:seriesLine>
+    <cs:lnRef idx="0"/>
+    <cs:fillRef idx="0"/>
+    <cs:effectRef idx="0"/>
+    <cs:fontRef idx="minor">
+      <a:schemeClr val="tx1"/>
+    </cs:fontRef>
+    <cs:spPr>
+      <a:ln w="9525" cap="flat" cmpd="sng" algn="ctr">
+        <a:solidFill>
+          <a:schemeClr val="tx1">
+            <a:lumMod val="35000"/>
+            <a:lumOff val="65000"/>
+          </a:schemeClr>
+        </a:solidFill>
+        <a:round/>
+      </a:ln>
+    </cs:spPr>
+  </cs:seriesLine>
+  <cs:title>
+    <cs:lnRef idx="0"/>
+    <cs:fillRef idx="0"/>
+    <cs:effectRef idx="0"/>
+    <cs:fontRef idx="minor">
+      <a:schemeClr val="tx1">
+        <a:lumMod val="65000"/>
+        <a:lumOff val="35000"/>
+      </a:schemeClr>
+    </cs:fontRef>
+    <cs:defRPr sz="1862" b="0" kern="1200" spc="0" baseline="0"/>
+  </cs:title>
+  <cs:trendline>
+    <cs:lnRef idx="0">
+      <cs:styleClr val="auto"/>
+    </cs:lnRef>
+    <cs:fillRef idx="0"/>
+    <cs:effectRef idx="0"/>
+    <cs:fontRef idx="minor">
+      <a:schemeClr val="tx1"/>
+    </cs:fontRef>
+    <cs:spPr>
+      <a:ln w="19050" cap="rnd">
+        <a:solidFill>
+          <a:schemeClr val="phClr"/>
+        </a:solidFill>
+        <a:prstDash val="sysDot"/>
+      </a:ln>
+    </cs:spPr>
+  </cs:trendline>
+  <cs:trendlineLabel>
+    <cs:lnRef idx="0"/>
+    <cs:fillRef idx="0"/>
+    <cs:effectRef idx="0"/>
+    <cs:fontRef idx="minor">
+      <a:schemeClr val="tx1">
+        <a:lumMod val="65000"/>
+        <a:lumOff val="35000"/>
+      </a:schemeClr>
+    </cs:fontRef>
+    <cs:defRPr sz="1197" kern="1200"/>
+  </cs:trendlineLabel>
+  <cs:upBar>
+    <cs:lnRef idx="0"/>
+    <cs:fillRef idx="0"/>
+    <cs:effectRef idx="0"/>
+    <cs:fontRef idx="minor">
+      <a:schemeClr val="tx1"/>
+    </cs:fontRef>
+    <cs:spPr>
+      <a:solidFill>
+        <a:schemeClr val="lt1"/>
+      </a:solidFill>
+      <a:ln w="9525" cap="flat" cmpd="sng" algn="ctr">
+        <a:solidFill>
+          <a:schemeClr val="tx1">
+            <a:lumMod val="65000"/>
+            <a:lumOff val="35000"/>
+          </a:schemeClr>
+        </a:solidFill>
+        <a:round/>
+      </a:ln>
+    </cs:spPr>
+  </cs:upBar>
+  <cs:valueAxis>
+    <cs:lnRef idx="0"/>
+    <cs:fillRef idx="0"/>
+    <cs:effectRef idx="0"/>
+    <cs:fontRef idx="minor">
+      <a:schemeClr val="tx1">
+        <a:lumMod val="65000"/>
+        <a:lumOff val="35000"/>
+      </a:schemeClr>
+    </cs:fontRef>
+    <cs:defRPr sz="1197" kern="1200"/>
+  </cs:valueAxis>
+  <cs:wall>
+    <cs:lnRef idx="0"/>
+    <cs:fillRef idx="0"/>
+    <cs:effectRef idx="0"/>
+    <cs:fontRef idx="minor">
+      <a:schemeClr val="tx1"/>
+    </cs:fontRef>
+    <cs:spPr>
+      <a:noFill/>
+      <a:ln>
+        <a:noFill/>
+      </a:ln>
+    </cs:spPr>
+  </cs:wall>
+</cs:chartStyle>
+</file>
+
 <file path=ppt/handoutMasters/handoutMaster1.xml><?xml version="1.0" encoding="utf-8"?>
 <p:handoutMaster xmlns:a="http://schemas.openxmlformats.org/drawingml/2006/main" xmlns:r="http://schemas.openxmlformats.org/officeDocument/2006/relationships" xmlns:p="http://schemas.openxmlformats.org/presentationml/2006/main">
   <p:cSld>
@@ -9790,6 +11064,114 @@
         <p:cNvPr id="1" name="">
           <a:extLst>
             <a:ext uri="{FF2B5EF4-FFF2-40B4-BE49-F238E27FC236}">
+              <a16:creationId xmlns:a16="http://schemas.microsoft.com/office/drawing/2014/main" id="{9082D2F1-F27E-F008-D28F-A80C65A79180}"/>
+            </a:ext>
+          </a:extLst>
+        </p:cNvPr>
+        <p:cNvGrpSpPr/>
+        <p:nvPr/>
+      </p:nvGrpSpPr>
+      <p:grpSpPr>
+        <a:xfrm>
+          <a:off x="0" y="0"/>
+          <a:ext cx="0" cy="0"/>
+          <a:chOff x="0" y="0"/>
+          <a:chExt cx="0" cy="0"/>
+        </a:xfrm>
+      </p:grpSpPr>
+      <p:sp>
+        <p:nvSpPr>
+          <p:cNvPr id="2" name="Slide Image Placeholder 1">
+            <a:extLst>
+              <a:ext uri="{FF2B5EF4-FFF2-40B4-BE49-F238E27FC236}">
+                <a16:creationId xmlns:a16="http://schemas.microsoft.com/office/drawing/2014/main" id="{B2CFE20B-AC68-A715-1904-A8997A740763}"/>
+              </a:ext>
+            </a:extLst>
+          </p:cNvPr>
+          <p:cNvSpPr>
+            <a:spLocks noGrp="1" noRot="1" noChangeAspect="1"/>
+          </p:cNvSpPr>
+          <p:nvPr>
+            <p:ph type="sldImg"/>
+          </p:nvPr>
+        </p:nvSpPr>
+        <p:spPr/>
+      </p:sp>
+      <p:sp>
+        <p:nvSpPr>
+          <p:cNvPr id="3" name="Notes Placeholder 2">
+            <a:extLst>
+              <a:ext uri="{FF2B5EF4-FFF2-40B4-BE49-F238E27FC236}">
+                <a16:creationId xmlns:a16="http://schemas.microsoft.com/office/drawing/2014/main" id="{60C90C4E-EA51-177C-42BA-46AF20D0BD42}"/>
+              </a:ext>
+            </a:extLst>
+          </p:cNvPr>
+          <p:cNvSpPr>
+            <a:spLocks noGrp="1"/>
+          </p:cNvSpPr>
+          <p:nvPr>
+            <p:ph type="body" idx="1"/>
+          </p:nvPr>
+        </p:nvSpPr>
+        <p:spPr/>
+        <p:txBody>
+          <a:bodyPr/>
+          <a:lstStyle/>
+          <a:p>
+            <a:endParaRPr lang="en-US"/>
+          </a:p>
+        </p:txBody>
+      </p:sp>
+      <p:sp>
+        <p:nvSpPr>
+          <p:cNvPr id="4" name="Slide Number Placeholder 3">
+            <a:extLst>
+              <a:ext uri="{FF2B5EF4-FFF2-40B4-BE49-F238E27FC236}">
+                <a16:creationId xmlns:a16="http://schemas.microsoft.com/office/drawing/2014/main" id="{A69E6F7B-6012-765E-DCF5-2558BB00D944}"/>
+              </a:ext>
+            </a:extLst>
+          </p:cNvPr>
+          <p:cNvSpPr>
+            <a:spLocks noGrp="1"/>
+          </p:cNvSpPr>
+          <p:nvPr>
+            <p:ph type="sldNum" sz="quarter" idx="5"/>
+          </p:nvPr>
+        </p:nvSpPr>
+        <p:spPr/>
+        <p:txBody>
+          <a:bodyPr/>
+          <a:lstStyle/>
+          <a:p>
+            <a:fld id="{4408DED6-61EF-5240-95D8-926F20A98C89}" type="slidenum">
+              <a:rPr lang="en-US" smtClean="0"/>
+              <a:t>4</a:t>
+            </a:fld>
+            <a:endParaRPr lang="en-US"/>
+          </a:p>
+        </p:txBody>
+      </p:sp>
+    </p:spTree>
+    <p:extLst>
+      <p:ext uri="{BB962C8B-B14F-4D97-AF65-F5344CB8AC3E}">
+        <p14:creationId xmlns:p14="http://schemas.microsoft.com/office/powerpoint/2010/main" val="186323826"/>
+      </p:ext>
+    </p:extLst>
+  </p:cSld>
+  <p:clrMapOvr>
+    <a:masterClrMapping/>
+  </p:clrMapOvr>
+</p:notes>
+</file>
+
+<file path=ppt/notesSlides/notesSlide4.xml><?xml version="1.0" encoding="utf-8"?>
+<p:notes xmlns:a="http://schemas.openxmlformats.org/drawingml/2006/main" xmlns:r="http://schemas.openxmlformats.org/officeDocument/2006/relationships" xmlns:p="http://schemas.openxmlformats.org/presentationml/2006/main">
+  <p:cSld>
+    <p:spTree>
+      <p:nvGrpSpPr>
+        <p:cNvPr id="1" name="">
+          <a:extLst>
+            <a:ext uri="{FF2B5EF4-FFF2-40B4-BE49-F238E27FC236}">
               <a16:creationId xmlns:a16="http://schemas.microsoft.com/office/drawing/2014/main" id="{79271DC2-F944-34DD-B764-85BED2F08796}"/>
             </a:ext>
           </a:extLst>
@@ -9871,7 +11253,7 @@
           <a:p>
             <a:fld id="{4408DED6-61EF-5240-95D8-926F20A98C89}" type="slidenum">
               <a:rPr lang="en-US" smtClean="0"/>
-              <a:t>4</a:t>
+              <a:t>5</a:t>
             </a:fld>
             <a:endParaRPr lang="en-US"/>
           </a:p>
@@ -9890,7 +11272,7 @@
 </p:notes>
 </file>
 
-<file path=ppt/notesSlides/notesSlide4.xml><?xml version="1.0" encoding="utf-8"?>
+<file path=ppt/notesSlides/notesSlide5.xml><?xml version="1.0" encoding="utf-8"?>
 <p:notes xmlns:a="http://schemas.openxmlformats.org/drawingml/2006/main" xmlns:r="http://schemas.openxmlformats.org/officeDocument/2006/relationships" xmlns:p="http://schemas.openxmlformats.org/presentationml/2006/main">
   <p:cSld>
     <p:spTree>
@@ -9979,7 +11361,7 @@
           <a:p>
             <a:fld id="{4408DED6-61EF-5240-95D8-926F20A98C89}" type="slidenum">
               <a:rPr lang="en-US" smtClean="0"/>
-              <a:t>6</a:t>
+              <a:t>7</a:t>
             </a:fld>
             <a:endParaRPr lang="en-US"/>
           </a:p>
@@ -9998,7 +11380,7 @@
 </p:notes>
 </file>
 
-<file path=ppt/notesSlides/notesSlide5.xml><?xml version="1.0" encoding="utf-8"?>
+<file path=ppt/notesSlides/notesSlide6.xml><?xml version="1.0" encoding="utf-8"?>
 <p:notes xmlns:a="http://schemas.openxmlformats.org/drawingml/2006/main" xmlns:r="http://schemas.openxmlformats.org/officeDocument/2006/relationships" xmlns:p="http://schemas.openxmlformats.org/presentationml/2006/main">
   <p:cSld>
     <p:spTree>
@@ -10087,7 +11469,7 @@
           <a:p>
             <a:fld id="{4408DED6-61EF-5240-95D8-926F20A98C89}" type="slidenum">
               <a:rPr lang="en-US" smtClean="0"/>
-              <a:t>7</a:t>
+              <a:t>8</a:t>
             </a:fld>
             <a:endParaRPr lang="en-US"/>
           </a:p>
@@ -10106,7 +11488,7 @@
 </p:notes>
 </file>
 
-<file path=ppt/notesSlides/notesSlide6.xml><?xml version="1.0" encoding="utf-8"?>
+<file path=ppt/notesSlides/notesSlide7.xml><?xml version="1.0" encoding="utf-8"?>
 <p:notes xmlns:a="http://schemas.openxmlformats.org/drawingml/2006/main" xmlns:r="http://schemas.openxmlformats.org/officeDocument/2006/relationships" xmlns:p="http://schemas.openxmlformats.org/presentationml/2006/main">
   <p:cSld>
     <p:spTree>
@@ -10195,7 +11577,7 @@
           <a:p>
             <a:fld id="{4408DED6-61EF-5240-95D8-926F20A98C89}" type="slidenum">
               <a:rPr lang="en-US" smtClean="0"/>
-              <a:t>8</a:t>
+              <a:t>9</a:t>
             </a:fld>
             <a:endParaRPr lang="en-US"/>
           </a:p>
@@ -10214,7 +11596,7 @@
 </p:notes>
 </file>
 
-<file path=ppt/notesSlides/notesSlide7.xml><?xml version="1.0" encoding="utf-8"?>
+<file path=ppt/notesSlides/notesSlide8.xml><?xml version="1.0" encoding="utf-8"?>
 <p:notes xmlns:a="http://schemas.openxmlformats.org/drawingml/2006/main" xmlns:r="http://schemas.openxmlformats.org/officeDocument/2006/relationships" xmlns:p="http://schemas.openxmlformats.org/presentationml/2006/main">
   <p:cSld>
     <p:spTree>
@@ -10303,7 +11685,7 @@
           <a:p>
             <a:fld id="{4408DED6-61EF-5240-95D8-926F20A98C89}" type="slidenum">
               <a:rPr lang="en-US" smtClean="0"/>
-              <a:t>9</a:t>
+              <a:t>10</a:t>
             </a:fld>
             <a:endParaRPr lang="en-US"/>
           </a:p>
@@ -30569,6 +31951,346 @@
   <p:cSld>
     <p:spTree>
       <p:nvGrpSpPr>
+        <p:cNvPr id="1" name="">
+          <a:extLst>
+            <a:ext uri="{FF2B5EF4-FFF2-40B4-BE49-F238E27FC236}">
+              <a16:creationId xmlns:a16="http://schemas.microsoft.com/office/drawing/2014/main" id="{282EA77C-7A9E-2604-6B02-6FB6C57A3149}"/>
+            </a:ext>
+          </a:extLst>
+        </p:cNvPr>
+        <p:cNvGrpSpPr/>
+        <p:nvPr/>
+      </p:nvGrpSpPr>
+      <p:grpSpPr>
+        <a:xfrm>
+          <a:off x="0" y="0"/>
+          <a:ext cx="0" cy="0"/>
+          <a:chOff x="0" y="0"/>
+          <a:chExt cx="0" cy="0"/>
+        </a:xfrm>
+      </p:grpSpPr>
+      <p:sp>
+        <p:nvSpPr>
+          <p:cNvPr id="2" name="Slide Number Placeholder 1">
+            <a:extLst>
+              <a:ext uri="{FF2B5EF4-FFF2-40B4-BE49-F238E27FC236}">
+                <a16:creationId xmlns:a16="http://schemas.microsoft.com/office/drawing/2014/main" id="{A5830A8F-64E7-1C1D-24C6-C12102806E66}"/>
+              </a:ext>
+            </a:extLst>
+          </p:cNvPr>
+          <p:cNvSpPr>
+            <a:spLocks noGrp="1"/>
+          </p:cNvSpPr>
+          <p:nvPr>
+            <p:ph type="sldNum" sz="quarter" idx="4"/>
+          </p:nvPr>
+        </p:nvSpPr>
+        <p:spPr/>
+        <p:txBody>
+          <a:bodyPr/>
+          <a:lstStyle/>
+          <a:p>
+            <a:fld id="{E242BD21-9B61-2246-BCB1-4BE5E1BEBE1C}" type="slidenum">
+              <a:rPr lang="en-US" smtClean="0"/>
+              <a:pPr/>
+              <a:t>10</a:t>
+            </a:fld>
+            <a:endParaRPr lang="en-US"/>
+          </a:p>
+        </p:txBody>
+      </p:sp>
+      <p:sp>
+        <p:nvSpPr>
+          <p:cNvPr id="3" name="Text Placeholder 2">
+            <a:extLst>
+              <a:ext uri="{FF2B5EF4-FFF2-40B4-BE49-F238E27FC236}">
+                <a16:creationId xmlns:a16="http://schemas.microsoft.com/office/drawing/2014/main" id="{66F722AC-8C8A-2B3B-1671-FE6B7573FDE0}"/>
+              </a:ext>
+            </a:extLst>
+          </p:cNvPr>
+          <p:cNvSpPr>
+            <a:spLocks noGrp="1"/>
+          </p:cNvSpPr>
+          <p:nvPr>
+            <p:ph type="body" sz="quarter" idx="12"/>
+          </p:nvPr>
+        </p:nvSpPr>
+        <p:spPr/>
+        <p:txBody>
+          <a:bodyPr/>
+          <a:lstStyle/>
+          <a:p>
+            <a:r>
+              <a:rPr lang="en-US"/>
+              <a:t>SIGRID OBJECTIVES</a:t>
+            </a:r>
+          </a:p>
+        </p:txBody>
+      </p:sp>
+      <p:sp>
+        <p:nvSpPr>
+          <p:cNvPr id="4" name="Title 3">
+            <a:extLst>
+              <a:ext uri="{FF2B5EF4-FFF2-40B4-BE49-F238E27FC236}">
+                <a16:creationId xmlns:a16="http://schemas.microsoft.com/office/drawing/2014/main" id="{4EFC0CB5-4975-B41B-F265-6AE5A3F2ADFE}"/>
+              </a:ext>
+            </a:extLst>
+          </p:cNvPr>
+          <p:cNvSpPr>
+            <a:spLocks noGrp="1"/>
+          </p:cNvSpPr>
+          <p:nvPr>
+            <p:ph type="title"/>
+          </p:nvPr>
+        </p:nvSpPr>
+        <p:spPr/>
+        <p:txBody>
+          <a:bodyPr/>
+          <a:lstStyle/>
+          <a:p>
+            <a:r>
+              <a:rPr lang="en-US"/>
+              <a:t>Progress towards objectives: Architecture</a:t>
+            </a:r>
+          </a:p>
+        </p:txBody>
+      </p:sp>
+      <p:graphicFrame>
+        <p:nvGraphicFramePr>
+          <p:cNvPr id="6" name="Chart 5">
+            <a:extLst>
+              <a:ext uri="{FF2B5EF4-FFF2-40B4-BE49-F238E27FC236}">
+                <a16:creationId xmlns:a16="http://schemas.microsoft.com/office/drawing/2014/main" id="{FBB521E4-96ED-814A-B322-AFBA0633E84C}"/>
+              </a:ext>
+            </a:extLst>
+          </p:cNvPr>
+          <p:cNvGraphicFramePr/>
+          <p:nvPr/>
+        </p:nvGraphicFramePr>
+        <p:xfrm>
+          <a:off x="478224" y="1606666"/>
+          <a:ext cx="11267443" cy="4236056"/>
+        </p:xfrm>
+        <a:graphic>
+          <a:graphicData uri="http://schemas.openxmlformats.org/drawingml/2006/chart">
+            <c:chart xmlns:c="http://schemas.openxmlformats.org/drawingml/2006/chart" xmlns:r="http://schemas.openxmlformats.org/officeDocument/2006/relationships" r:id="rId3"/>
+          </a:graphicData>
+        </a:graphic>
+      </p:graphicFrame>
+      <p:sp>
+        <p:nvSpPr>
+          <p:cNvPr id="7" name="TextBox 6">
+            <a:extLst>
+              <a:ext uri="{FF2B5EF4-FFF2-40B4-BE49-F238E27FC236}">
+                <a16:creationId xmlns:a16="http://schemas.microsoft.com/office/drawing/2014/main" id="{41183F90-63B2-0646-9068-7E4E2BCF14D9}"/>
+              </a:ext>
+            </a:extLst>
+          </p:cNvPr>
+          <p:cNvSpPr txBox="1"/>
+          <p:nvPr/>
+        </p:nvSpPr>
+        <p:spPr>
+          <a:xfrm>
+            <a:off x="8958648" y="-525758"/>
+            <a:ext cx="3635054" cy="369332"/>
+          </a:xfrm>
+          <a:prstGeom prst="rect">
+            <a:avLst/>
+          </a:prstGeom>
+          <a:noFill/>
+        </p:spPr>
+        <p:txBody>
+          <a:bodyPr wrap="none" lIns="90000" rtlCol="0" anchor="t">
+            <a:spAutoFit/>
+          </a:bodyPr>
+          <a:lstStyle/>
+          <a:p>
+            <a:r>
+              <a:rPr lang="en-US" b="1"/>
+              <a:t>OBJECTIVES_ARCHITECTURE_CHART</a:t>
+            </a:r>
+            <a:endParaRPr lang="en-US"/>
+          </a:p>
+        </p:txBody>
+      </p:sp>
+      <p:sp>
+        <p:nvSpPr>
+          <p:cNvPr id="8" name="TextBox 7">
+            <a:extLst>
+              <a:ext uri="{FF2B5EF4-FFF2-40B4-BE49-F238E27FC236}">
+                <a16:creationId xmlns:a16="http://schemas.microsoft.com/office/drawing/2014/main" id="{79FE74E7-A4E7-D99A-A30E-92E30405FE49}"/>
+              </a:ext>
+            </a:extLst>
+          </p:cNvPr>
+          <p:cNvSpPr txBox="1"/>
+          <p:nvPr/>
+        </p:nvSpPr>
+        <p:spPr>
+          <a:xfrm>
+            <a:off x="2791143" y="6026120"/>
+            <a:ext cx="6609715" cy="353558"/>
+          </a:xfrm>
+          <a:prstGeom prst="rect">
+            <a:avLst/>
+          </a:prstGeom>
+          <a:noFill/>
+        </p:spPr>
+        <p:txBody>
+          <a:bodyPr wrap="none" lIns="90000" rtlCol="0" anchor="t">
+            <a:spAutoFit/>
+          </a:bodyPr>
+          <a:lstStyle/>
+          <a:p>
+            <a:pPr>
+              <a:lnSpc>
+                <a:spcPct val="113000"/>
+              </a:lnSpc>
+            </a:pPr>
+            <a:r>
+              <a:rPr lang="en-US" sz="1600" dirty="0" err="1">
+                <a:solidFill>
+                  <a:srgbClr val="0066FF"/>
+                </a:solidFill>
+              </a:rPr>
+              <a:t>⬤</a:t>
+            </a:r>
+            <a:r>
+              <a:rPr lang="en-US" sz="1600" dirty="0" err="1">
+                <a:solidFill>
+                  <a:schemeClr val="tx2"/>
+                </a:solidFill>
+              </a:rPr>
+              <a:t> Objective met    </a:t>
+            </a:r>
+            <a:r>
+              <a:rPr lang="en-US" sz="1600" dirty="0" err="1">
+                <a:solidFill>
+                  <a:srgbClr val="67E77F"/>
+                </a:solidFill>
+              </a:rPr>
+              <a:t>⬤</a:t>
+            </a:r>
+            <a:r>
+              <a:rPr lang="en-US" sz="1600" dirty="0" err="1">
+                <a:solidFill>
+                  <a:schemeClr val="tx2"/>
+                </a:solidFill>
+              </a:rPr>
+              <a:t> Improved    </a:t>
+            </a:r>
+            <a:r>
+              <a:rPr lang="en-US" sz="1600" dirty="0" err="1">
+                <a:solidFill>
+                  <a:srgbClr val="BFC4CF"/>
+                </a:solidFill>
+              </a:rPr>
+              <a:t>⬤</a:t>
+            </a:r>
+            <a:r>
+              <a:rPr lang="en-US" sz="1600" dirty="0" err="1">
+                <a:solidFill>
+                  <a:schemeClr val="tx2"/>
+                </a:solidFill>
+              </a:rPr>
+              <a:t> Unchanged    </a:t>
+            </a:r>
+            <a:r>
+              <a:rPr lang="en-US" sz="1600" dirty="0" err="1">
+                <a:solidFill>
+                  <a:srgbClr val="F06241"/>
+                </a:solidFill>
+              </a:rPr>
+              <a:t>⬤</a:t>
+            </a:r>
+            <a:r>
+              <a:rPr lang="en-US" sz="1600" dirty="0" err="1">
+                <a:solidFill>
+                  <a:schemeClr val="tx2"/>
+                </a:solidFill>
+              </a:rPr>
+              <a:t> Worsened    </a:t>
+            </a:r>
+            <a:r>
+              <a:rPr lang="en-US" sz="1600" dirty="0" err="1">
+                <a:solidFill>
+                  <a:schemeClr val="bg1"/>
+                </a:solidFill>
+              </a:rPr>
+              <a:t>⬤</a:t>
+            </a:r>
+            <a:r>
+              <a:rPr lang="en-US" sz="1600" dirty="0" err="1">
+                <a:solidFill>
+                  <a:schemeClr val="tx2"/>
+                </a:solidFill>
+              </a:rPr>
+              <a:t> Unknown</a:t>
+            </a:r>
+          </a:p>
+        </p:txBody>
+      </p:sp>
+      <p:sp>
+        <p:nvSpPr>
+          <p:cNvPr id="9" name="TextBox 8">
+            <a:extLst>
+              <a:ext uri="{FF2B5EF4-FFF2-40B4-BE49-F238E27FC236}">
+                <a16:creationId xmlns:a16="http://schemas.microsoft.com/office/drawing/2014/main" id="{A55E5897-263B-F75F-BB48-770410B9BCFB}"/>
+              </a:ext>
+            </a:extLst>
+          </p:cNvPr>
+          <p:cNvSpPr txBox="1"/>
+          <p:nvPr/>
+        </p:nvSpPr>
+        <p:spPr>
+          <a:xfrm>
+            <a:off x="470981" y="1293279"/>
+            <a:ext cx="1622452" cy="289503"/>
+          </a:xfrm>
+          <a:prstGeom prst="rect">
+            <a:avLst/>
+          </a:prstGeom>
+          <a:noFill/>
+        </p:spPr>
+        <p:txBody>
+          <a:bodyPr wrap="none" lIns="90000" rtlCol="0" anchor="t">
+            <a:spAutoFit/>
+          </a:bodyPr>
+          <a:lstStyle/>
+          <a:p>
+            <a:pPr algn="l">
+              <a:lnSpc>
+                <a:spcPct val="113000"/>
+              </a:lnSpc>
+            </a:pPr>
+            <a:r>
+              <a:rPr lang="en-US" sz="1200" dirty="0" err="1">
+                <a:solidFill>
+                  <a:schemeClr val="tx2"/>
+                </a:solidFill>
+              </a:rPr>
+              <a:t>Percentage of portfolio</a:t>
+            </a:r>
+          </a:p>
+        </p:txBody>
+      </p:sp>
+    </p:spTree>
+    <p:extLst>
+      <p:ext uri="{BB962C8B-B14F-4D97-AF65-F5344CB8AC3E}">
+        <p14:creationId xmlns:p14="http://schemas.microsoft.com/office/powerpoint/2010/main" val="261354089"/>
+      </p:ext>
+    </p:extLst>
+  </p:cSld>
+  <p:clrMapOvr>
+    <a:masterClrMapping/>
+  </p:clrMapOvr>
+</p:sld>
+</file>
+
+<file path=ppt/slides/slide11.xml><?xml version="1.0" encoding="utf-8"?>
+<p:sld xmlns:a="http://schemas.openxmlformats.org/drawingml/2006/main" xmlns:r="http://schemas.openxmlformats.org/officeDocument/2006/relationships" xmlns:p="http://schemas.openxmlformats.org/presentationml/2006/main">
+  <p:cSld>
+    <p:spTree>
+      <p:nvGrpSpPr>
         <p:cNvPr id="1" name=""/>
         <p:cNvGrpSpPr/>
         <p:nvPr/>
@@ -31298,6 +33020,357 @@
         <p:cNvPr id="1" name="">
           <a:extLst>
             <a:ext uri="{FF2B5EF4-FFF2-40B4-BE49-F238E27FC236}">
+              <a16:creationId xmlns:a16="http://schemas.microsoft.com/office/drawing/2014/main" id="{D2B95A28-0797-82EC-8AAB-40E0AD48F10F}"/>
+            </a:ext>
+          </a:extLst>
+        </p:cNvPr>
+        <p:cNvGrpSpPr/>
+        <p:nvPr/>
+      </p:nvGrpSpPr>
+      <p:grpSpPr>
+        <a:xfrm>
+          <a:off x="0" y="0"/>
+          <a:ext cx="0" cy="0"/>
+          <a:chOff x="0" y="0"/>
+          <a:chExt cx="0" cy="0"/>
+        </a:xfrm>
+      </p:grpSpPr>
+      <p:sp>
+        <p:nvSpPr>
+          <p:cNvPr id="2" name="Slide Number Placeholder 1">
+            <a:extLst>
+              <a:ext uri="{FF2B5EF4-FFF2-40B4-BE49-F238E27FC236}">
+                <a16:creationId xmlns:a16="http://schemas.microsoft.com/office/drawing/2014/main" id="{A49429BB-1FAC-98FE-7D71-42B7D87DA3A3}"/>
+              </a:ext>
+            </a:extLst>
+          </p:cNvPr>
+          <p:cNvSpPr>
+            <a:spLocks noGrp="1"/>
+          </p:cNvSpPr>
+          <p:nvPr>
+            <p:ph type="sldNum" sz="quarter" idx="4"/>
+          </p:nvPr>
+        </p:nvSpPr>
+        <p:spPr/>
+        <p:txBody>
+          <a:bodyPr/>
+          <a:lstStyle/>
+          <a:p>
+            <a:fld id="{E242BD21-9B61-2246-BCB1-4BE5E1BEBE1C}" type="slidenum">
+              <a:rPr lang="en-US" smtClean="0"/>
+              <a:pPr/>
+              <a:t>4</a:t>
+            </a:fld>
+            <a:endParaRPr lang="en-US"/>
+          </a:p>
+        </p:txBody>
+      </p:sp>
+      <p:sp>
+        <p:nvSpPr>
+          <p:cNvPr id="3" name="Text Placeholder 2">
+            <a:extLst>
+              <a:ext uri="{FF2B5EF4-FFF2-40B4-BE49-F238E27FC236}">
+                <a16:creationId xmlns:a16="http://schemas.microsoft.com/office/drawing/2014/main" id="{DA581411-6610-CAFD-EA1C-81FD4B023805}"/>
+              </a:ext>
+            </a:extLst>
+          </p:cNvPr>
+          <p:cNvSpPr>
+            <a:spLocks noGrp="1"/>
+          </p:cNvSpPr>
+          <p:nvPr>
+            <p:ph type="body" sz="quarter" idx="12"/>
+          </p:nvPr>
+        </p:nvSpPr>
+        <p:spPr/>
+        <p:txBody>
+          <a:bodyPr/>
+          <a:lstStyle/>
+          <a:p>
+            <a:r>
+              <a:rPr lang="en-US"/>
+              <a:t>SIGRID OBJECTIVES</a:t>
+            </a:r>
+          </a:p>
+        </p:txBody>
+      </p:sp>
+      <p:sp>
+        <p:nvSpPr>
+          <p:cNvPr id="4" name="Title 3">
+            <a:extLst>
+              <a:ext uri="{FF2B5EF4-FFF2-40B4-BE49-F238E27FC236}">
+                <a16:creationId xmlns:a16="http://schemas.microsoft.com/office/drawing/2014/main" id="{28F4B936-22AE-53AE-D47F-598EDA21157C}"/>
+              </a:ext>
+            </a:extLst>
+          </p:cNvPr>
+          <p:cNvSpPr>
+            <a:spLocks noGrp="1"/>
+          </p:cNvSpPr>
+          <p:nvPr>
+            <p:ph type="title"/>
+          </p:nvPr>
+        </p:nvSpPr>
+        <p:spPr/>
+        <p:txBody>
+          <a:bodyPr/>
+          <a:lstStyle/>
+          <a:p>
+            <a:r>
+              <a:rPr lang="en-US"/>
+              <a:t>Progress towards objectives per capability between </a:t>
+            </a:r>
+            <a:r>
+              <a:rPr lang="en-US" dirty="0"/>
+              <a:t>OBJECTIVES_PERIOD_START and OBJECTIVES_PERIOD_END</a:t>
+            </a:r>
+            <a:endParaRPr lang="en-US"/>
+          </a:p>
+        </p:txBody>
+      </p:sp>
+      <p:graphicFrame>
+        <p:nvGraphicFramePr>
+          <p:cNvPr id="6" name="Chart 5">
+            <a:extLst>
+              <a:ext uri="{FF2B5EF4-FFF2-40B4-BE49-F238E27FC236}">
+                <a16:creationId xmlns:a16="http://schemas.microsoft.com/office/drawing/2014/main" id="{2774041C-71AE-0495-78BB-3253007E9E90}"/>
+              </a:ext>
+            </a:extLst>
+          </p:cNvPr>
+          <p:cNvGraphicFramePr/>
+          <p:nvPr>
+            <p:extLst>
+              <p:ext uri="{D42A27DB-BD31-4B8C-83A1-F6EECF244321}">
+                <p14:modId xmlns:p14="http://schemas.microsoft.com/office/powerpoint/2010/main" val="8265904"/>
+              </p:ext>
+            </p:extLst>
+          </p:nvPr>
+        </p:nvGraphicFramePr>
+        <p:xfrm>
+          <a:off x="478224" y="1507525"/>
+          <a:ext cx="11267443" cy="4337221"/>
+        </p:xfrm>
+        <a:graphic>
+          <a:graphicData uri="http://schemas.openxmlformats.org/drawingml/2006/chart">
+            <c:chart xmlns:c="http://schemas.openxmlformats.org/drawingml/2006/chart" xmlns:r="http://schemas.openxmlformats.org/officeDocument/2006/relationships" r:id="rId3"/>
+          </a:graphicData>
+        </a:graphic>
+      </p:graphicFrame>
+      <p:sp>
+        <p:nvSpPr>
+          <p:cNvPr id="7" name="TextBox 6">
+            <a:extLst>
+              <a:ext uri="{FF2B5EF4-FFF2-40B4-BE49-F238E27FC236}">
+                <a16:creationId xmlns:a16="http://schemas.microsoft.com/office/drawing/2014/main" id="{E75AA9D8-EEB6-8709-C209-D32FF5C291E0}"/>
+              </a:ext>
+            </a:extLst>
+          </p:cNvPr>
+          <p:cNvSpPr txBox="1"/>
+          <p:nvPr/>
+        </p:nvSpPr>
+        <p:spPr>
+          <a:xfrm>
+            <a:off x="8958648" y="-525758"/>
+            <a:ext cx="3278675" cy="369332"/>
+          </a:xfrm>
+          <a:prstGeom prst="rect">
+            <a:avLst/>
+          </a:prstGeom>
+          <a:noFill/>
+        </p:spPr>
+        <p:txBody>
+          <a:bodyPr wrap="none" lIns="90000" rtlCol="0" anchor="t">
+            <a:spAutoFit/>
+          </a:bodyPr>
+          <a:lstStyle/>
+          <a:p>
+            <a:r>
+              <a:rPr lang="en-US" b="1"/>
+              <a:t>OBJECTIVES_CAPABILITY_CHART</a:t>
+            </a:r>
+            <a:endParaRPr lang="en-US"/>
+          </a:p>
+        </p:txBody>
+      </p:sp>
+      <p:sp>
+        <p:nvSpPr>
+          <p:cNvPr id="8" name="TextBox 7">
+            <a:extLst>
+              <a:ext uri="{FF2B5EF4-FFF2-40B4-BE49-F238E27FC236}">
+                <a16:creationId xmlns:a16="http://schemas.microsoft.com/office/drawing/2014/main" id="{E64208DC-0422-1C0A-F36A-3E68057F3E5B}"/>
+              </a:ext>
+            </a:extLst>
+          </p:cNvPr>
+          <p:cNvSpPr txBox="1"/>
+          <p:nvPr/>
+        </p:nvSpPr>
+        <p:spPr>
+          <a:xfrm>
+            <a:off x="2791143" y="5988637"/>
+            <a:ext cx="6609715" cy="353558"/>
+          </a:xfrm>
+          <a:prstGeom prst="rect">
+            <a:avLst/>
+          </a:prstGeom>
+          <a:noFill/>
+        </p:spPr>
+        <p:txBody>
+          <a:bodyPr wrap="none" lIns="90000" rtlCol="0" anchor="t">
+            <a:spAutoFit/>
+          </a:bodyPr>
+          <a:lstStyle/>
+          <a:p>
+            <a:pPr>
+              <a:lnSpc>
+                <a:spcPct val="113000"/>
+              </a:lnSpc>
+            </a:pPr>
+            <a:r>
+              <a:rPr lang="en-US" sz="1600" dirty="0" err="1">
+                <a:solidFill>
+                  <a:srgbClr val="0066FF"/>
+                </a:solidFill>
+              </a:rPr>
+              <a:t>⬤</a:t>
+            </a:r>
+            <a:r>
+              <a:rPr lang="en-US" sz="1600" dirty="0" err="1">
+                <a:solidFill>
+                  <a:schemeClr val="tx2"/>
+                </a:solidFill>
+              </a:rPr>
+              <a:t> Objective met    </a:t>
+            </a:r>
+            <a:r>
+              <a:rPr lang="en-US" sz="1600" dirty="0" err="1">
+                <a:solidFill>
+                  <a:srgbClr val="67E77F"/>
+                </a:solidFill>
+              </a:rPr>
+              <a:t>⬤</a:t>
+            </a:r>
+            <a:r>
+              <a:rPr lang="en-US" sz="1600" dirty="0" err="1">
+                <a:solidFill>
+                  <a:schemeClr val="tx2"/>
+                </a:solidFill>
+              </a:rPr>
+              <a:t> Improved    </a:t>
+            </a:r>
+            <a:r>
+              <a:rPr lang="en-US" sz="1600" dirty="0" err="1">
+                <a:solidFill>
+                  <a:srgbClr val="BFC4CF"/>
+                </a:solidFill>
+              </a:rPr>
+              <a:t>⬤</a:t>
+            </a:r>
+            <a:r>
+              <a:rPr lang="en-US" sz="1600" dirty="0" err="1">
+                <a:solidFill>
+                  <a:schemeClr val="tx2"/>
+                </a:solidFill>
+              </a:rPr>
+              <a:t> Unchanged    </a:t>
+            </a:r>
+            <a:r>
+              <a:rPr lang="en-US" sz="1600" dirty="0" err="1">
+                <a:solidFill>
+                  <a:srgbClr val="F06241"/>
+                </a:solidFill>
+              </a:rPr>
+              <a:t>⬤</a:t>
+            </a:r>
+            <a:r>
+              <a:rPr lang="en-US" sz="1600" dirty="0" err="1">
+                <a:solidFill>
+                  <a:schemeClr val="tx2"/>
+                </a:solidFill>
+              </a:rPr>
+              <a:t> Worsened    </a:t>
+            </a:r>
+            <a:r>
+              <a:rPr lang="en-US" sz="1600" dirty="0" err="1">
+                <a:solidFill>
+                  <a:schemeClr val="bg1"/>
+                </a:solidFill>
+              </a:rPr>
+              <a:t>⬤</a:t>
+            </a:r>
+            <a:r>
+              <a:rPr lang="en-US" sz="1600" dirty="0" err="1">
+                <a:solidFill>
+                  <a:schemeClr val="tx2"/>
+                </a:solidFill>
+              </a:rPr>
+              <a:t> Unknown</a:t>
+            </a:r>
+          </a:p>
+        </p:txBody>
+      </p:sp>
+      <p:sp>
+        <p:nvSpPr>
+          <p:cNvPr id="9" name="TextBox 8">
+            <a:extLst>
+              <a:ext uri="{FF2B5EF4-FFF2-40B4-BE49-F238E27FC236}">
+                <a16:creationId xmlns:a16="http://schemas.microsoft.com/office/drawing/2014/main" id="{C377E27A-346A-7209-76CD-BF5DB2681082}"/>
+              </a:ext>
+            </a:extLst>
+          </p:cNvPr>
+          <p:cNvSpPr txBox="1"/>
+          <p:nvPr/>
+        </p:nvSpPr>
+        <p:spPr>
+          <a:xfrm>
+            <a:off x="9905465" y="1325702"/>
+            <a:ext cx="1622453" cy="289503"/>
+          </a:xfrm>
+          <a:prstGeom prst="rect">
+            <a:avLst/>
+          </a:prstGeom>
+          <a:noFill/>
+        </p:spPr>
+        <p:txBody>
+          <a:bodyPr wrap="none" lIns="90000" rtlCol="0" anchor="t">
+            <a:spAutoFit/>
+          </a:bodyPr>
+          <a:lstStyle/>
+          <a:p>
+            <a:pPr algn="ctr">
+              <a:lnSpc>
+                <a:spcPct val="113000"/>
+              </a:lnSpc>
+            </a:pPr>
+            <a:r>
+              <a:rPr lang="en-US" sz="1200" dirty="0" err="1">
+                <a:solidFill>
+                  <a:schemeClr val="tx2"/>
+                </a:solidFill>
+              </a:rPr>
+              <a:t>Percentage of portfolio</a:t>
+            </a:r>
+          </a:p>
+        </p:txBody>
+      </p:sp>
+    </p:spTree>
+    <p:extLst>
+      <p:ext uri="{BB962C8B-B14F-4D97-AF65-F5344CB8AC3E}">
+        <p14:creationId xmlns:p14="http://schemas.microsoft.com/office/powerpoint/2010/main" val="3600400574"/>
+      </p:ext>
+    </p:extLst>
+  </p:cSld>
+  <p:clrMapOvr>
+    <a:masterClrMapping/>
+  </p:clrMapOvr>
+</p:sld>
+</file>
+
+<file path=ppt/slides/slide5.xml><?xml version="1.0" encoding="utf-8"?>
+<p:sld xmlns:a="http://schemas.openxmlformats.org/drawingml/2006/main" xmlns:r="http://schemas.openxmlformats.org/officeDocument/2006/relationships" xmlns:p="http://schemas.openxmlformats.org/presentationml/2006/main">
+  <p:cSld>
+    <p:spTree>
+      <p:nvGrpSpPr>
+        <p:cNvPr id="1" name="">
+          <a:extLst>
+            <a:ext uri="{FF2B5EF4-FFF2-40B4-BE49-F238E27FC236}">
               <a16:creationId xmlns:a16="http://schemas.microsoft.com/office/drawing/2014/main" id="{216F600E-1C52-CB46-5D36-227AF7C7B663}"/>
             </a:ext>
           </a:extLst>
@@ -31337,7 +33410,7 @@
             <a:fld id="{E242BD21-9B61-2246-BCB1-4BE5E1BEBE1C}" type="slidenum">
               <a:rPr lang="en-US" smtClean="0"/>
               <a:pPr/>
-              <a:t>4</a:t>
+              <a:t>5</a:t>
             </a:fld>
             <a:endParaRPr lang="en-US"/>
           </a:p>
@@ -31630,7 +33703,7 @@
 </p:sld>
 </file>
 
-<file path=ppt/slides/slide5.xml><?xml version="1.0" encoding="utf-8"?>
+<file path=ppt/slides/slide6.xml><?xml version="1.0" encoding="utf-8"?>
 <p:sld xmlns:a="http://schemas.openxmlformats.org/drawingml/2006/main" xmlns:r="http://schemas.openxmlformats.org/officeDocument/2006/relationships" xmlns:p="http://schemas.openxmlformats.org/presentationml/2006/main">
   <p:cSld>
     <p:spTree>
@@ -31671,7 +33744,7 @@
             <a:fld id="{E242BD21-9B61-2246-BCB1-4BE5E1BEBE1C}" type="slidenum">
               <a:rPr lang="en-US" smtClean="0"/>
               <a:pPr/>
-              <a:t>5</a:t>
+              <a:t>6</a:t>
             </a:fld>
             <a:endParaRPr lang="en-US"/>
           </a:p>
@@ -31845,7 +33918,7 @@
 </p:sld>
 </file>
 
-<file path=ppt/slides/slide6.xml><?xml version="1.0" encoding="utf-8"?>
+<file path=ppt/slides/slide7.xml><?xml version="1.0" encoding="utf-8"?>
 <p:sld xmlns:a="http://schemas.openxmlformats.org/drawingml/2006/main" xmlns:r="http://schemas.openxmlformats.org/officeDocument/2006/relationships" xmlns:p="http://schemas.openxmlformats.org/presentationml/2006/main">
   <p:cSld>
     <p:spTree>
@@ -31892,7 +33965,7 @@
             <a:fld id="{E242BD21-9B61-2246-BCB1-4BE5E1BEBE1C}" type="slidenum">
               <a:rPr lang="en-US" smtClean="0"/>
               <a:pPr/>
-              <a:t>6</a:t>
+              <a:t>7</a:t>
             </a:fld>
             <a:endParaRPr lang="en-US"/>
           </a:p>
@@ -32185,7 +34258,7 @@
 </p:sld>
 </file>
 
-<file path=ppt/slides/slide7.xml><?xml version="1.0" encoding="utf-8"?>
+<file path=ppt/slides/slide8.xml><?xml version="1.0" encoding="utf-8"?>
 <p:sld xmlns:a="http://schemas.openxmlformats.org/drawingml/2006/main" xmlns:r="http://schemas.openxmlformats.org/officeDocument/2006/relationships" xmlns:p="http://schemas.openxmlformats.org/presentationml/2006/main">
   <p:cSld>
     <p:spTree>
@@ -32232,7 +34305,7 @@
             <a:fld id="{E242BD21-9B61-2246-BCB1-4BE5E1BEBE1C}" type="slidenum">
               <a:rPr lang="en-US" smtClean="0"/>
               <a:pPr/>
-              <a:t>7</a:t>
+              <a:t>8</a:t>
             </a:fld>
             <a:endParaRPr lang="en-US"/>
           </a:p>
@@ -32525,7 +34598,7 @@
 </p:sld>
 </file>
 
-<file path=ppt/slides/slide8.xml><?xml version="1.0" encoding="utf-8"?>
+<file path=ppt/slides/slide9.xml><?xml version="1.0" encoding="utf-8"?>
 <p:sld xmlns:a="http://schemas.openxmlformats.org/drawingml/2006/main" xmlns:r="http://schemas.openxmlformats.org/officeDocument/2006/relationships" xmlns:p="http://schemas.openxmlformats.org/presentationml/2006/main">
   <p:cSld>
     <p:spTree>
@@ -32572,7 +34645,7 @@
             <a:fld id="{E242BD21-9B61-2246-BCB1-4BE5E1BEBE1C}" type="slidenum">
               <a:rPr lang="en-US" smtClean="0"/>
               <a:pPr/>
-              <a:t>8</a:t>
+              <a:t>9</a:t>
             </a:fld>
             <a:endParaRPr lang="en-US"/>
           </a:p>
@@ -32856,346 +34929,6 @@
     <p:extLst>
       <p:ext uri="{BB962C8B-B14F-4D97-AF65-F5344CB8AC3E}">
         <p14:creationId xmlns:p14="http://schemas.microsoft.com/office/powerpoint/2010/main" val="1600949005"/>
-      </p:ext>
-    </p:extLst>
-  </p:cSld>
-  <p:clrMapOvr>
-    <a:masterClrMapping/>
-  </p:clrMapOvr>
-</p:sld>
-</file>
-
-<file path=ppt/slides/slide9.xml><?xml version="1.0" encoding="utf-8"?>
-<p:sld xmlns:a="http://schemas.openxmlformats.org/drawingml/2006/main" xmlns:r="http://schemas.openxmlformats.org/officeDocument/2006/relationships" xmlns:p="http://schemas.openxmlformats.org/presentationml/2006/main">
-  <p:cSld>
-    <p:spTree>
-      <p:nvGrpSpPr>
-        <p:cNvPr id="1" name="">
-          <a:extLst>
-            <a:ext uri="{FF2B5EF4-FFF2-40B4-BE49-F238E27FC236}">
-              <a16:creationId xmlns:a16="http://schemas.microsoft.com/office/drawing/2014/main" id="{282EA77C-7A9E-2604-6B02-6FB6C57A3149}"/>
-            </a:ext>
-          </a:extLst>
-        </p:cNvPr>
-        <p:cNvGrpSpPr/>
-        <p:nvPr/>
-      </p:nvGrpSpPr>
-      <p:grpSpPr>
-        <a:xfrm>
-          <a:off x="0" y="0"/>
-          <a:ext cx="0" cy="0"/>
-          <a:chOff x="0" y="0"/>
-          <a:chExt cx="0" cy="0"/>
-        </a:xfrm>
-      </p:grpSpPr>
-      <p:sp>
-        <p:nvSpPr>
-          <p:cNvPr id="2" name="Slide Number Placeholder 1">
-            <a:extLst>
-              <a:ext uri="{FF2B5EF4-FFF2-40B4-BE49-F238E27FC236}">
-                <a16:creationId xmlns:a16="http://schemas.microsoft.com/office/drawing/2014/main" id="{A5830A8F-64E7-1C1D-24C6-C12102806E66}"/>
-              </a:ext>
-            </a:extLst>
-          </p:cNvPr>
-          <p:cNvSpPr>
-            <a:spLocks noGrp="1"/>
-          </p:cNvSpPr>
-          <p:nvPr>
-            <p:ph type="sldNum" sz="quarter" idx="4"/>
-          </p:nvPr>
-        </p:nvSpPr>
-        <p:spPr/>
-        <p:txBody>
-          <a:bodyPr/>
-          <a:lstStyle/>
-          <a:p>
-            <a:fld id="{E242BD21-9B61-2246-BCB1-4BE5E1BEBE1C}" type="slidenum">
-              <a:rPr lang="en-US" smtClean="0"/>
-              <a:pPr/>
-              <a:t>9</a:t>
-            </a:fld>
-            <a:endParaRPr lang="en-US"/>
-          </a:p>
-        </p:txBody>
-      </p:sp>
-      <p:sp>
-        <p:nvSpPr>
-          <p:cNvPr id="3" name="Text Placeholder 2">
-            <a:extLst>
-              <a:ext uri="{FF2B5EF4-FFF2-40B4-BE49-F238E27FC236}">
-                <a16:creationId xmlns:a16="http://schemas.microsoft.com/office/drawing/2014/main" id="{66F722AC-8C8A-2B3B-1671-FE6B7573FDE0}"/>
-              </a:ext>
-            </a:extLst>
-          </p:cNvPr>
-          <p:cNvSpPr>
-            <a:spLocks noGrp="1"/>
-          </p:cNvSpPr>
-          <p:nvPr>
-            <p:ph type="body" sz="quarter" idx="12"/>
-          </p:nvPr>
-        </p:nvSpPr>
-        <p:spPr/>
-        <p:txBody>
-          <a:bodyPr/>
-          <a:lstStyle/>
-          <a:p>
-            <a:r>
-              <a:rPr lang="en-US"/>
-              <a:t>SIGRID OBJECTIVES</a:t>
-            </a:r>
-          </a:p>
-        </p:txBody>
-      </p:sp>
-      <p:sp>
-        <p:nvSpPr>
-          <p:cNvPr id="4" name="Title 3">
-            <a:extLst>
-              <a:ext uri="{FF2B5EF4-FFF2-40B4-BE49-F238E27FC236}">
-                <a16:creationId xmlns:a16="http://schemas.microsoft.com/office/drawing/2014/main" id="{4EFC0CB5-4975-B41B-F265-6AE5A3F2ADFE}"/>
-              </a:ext>
-            </a:extLst>
-          </p:cNvPr>
-          <p:cNvSpPr>
-            <a:spLocks noGrp="1"/>
-          </p:cNvSpPr>
-          <p:nvPr>
-            <p:ph type="title"/>
-          </p:nvPr>
-        </p:nvSpPr>
-        <p:spPr/>
-        <p:txBody>
-          <a:bodyPr/>
-          <a:lstStyle/>
-          <a:p>
-            <a:r>
-              <a:rPr lang="en-US"/>
-              <a:t>Progress towards objectives: Architecture</a:t>
-            </a:r>
-          </a:p>
-        </p:txBody>
-      </p:sp>
-      <p:graphicFrame>
-        <p:nvGraphicFramePr>
-          <p:cNvPr id="6" name="Chart 5">
-            <a:extLst>
-              <a:ext uri="{FF2B5EF4-FFF2-40B4-BE49-F238E27FC236}">
-                <a16:creationId xmlns:a16="http://schemas.microsoft.com/office/drawing/2014/main" id="{FBB521E4-96ED-814A-B322-AFBA0633E84C}"/>
-              </a:ext>
-            </a:extLst>
-          </p:cNvPr>
-          <p:cNvGraphicFramePr/>
-          <p:nvPr/>
-        </p:nvGraphicFramePr>
-        <p:xfrm>
-          <a:off x="478224" y="1606666"/>
-          <a:ext cx="11267443" cy="4236056"/>
-        </p:xfrm>
-        <a:graphic>
-          <a:graphicData uri="http://schemas.openxmlformats.org/drawingml/2006/chart">
-            <c:chart xmlns:c="http://schemas.openxmlformats.org/drawingml/2006/chart" xmlns:r="http://schemas.openxmlformats.org/officeDocument/2006/relationships" r:id="rId3"/>
-          </a:graphicData>
-        </a:graphic>
-      </p:graphicFrame>
-      <p:sp>
-        <p:nvSpPr>
-          <p:cNvPr id="7" name="TextBox 6">
-            <a:extLst>
-              <a:ext uri="{FF2B5EF4-FFF2-40B4-BE49-F238E27FC236}">
-                <a16:creationId xmlns:a16="http://schemas.microsoft.com/office/drawing/2014/main" id="{41183F90-63B2-0646-9068-7E4E2BCF14D9}"/>
-              </a:ext>
-            </a:extLst>
-          </p:cNvPr>
-          <p:cNvSpPr txBox="1"/>
-          <p:nvPr/>
-        </p:nvSpPr>
-        <p:spPr>
-          <a:xfrm>
-            <a:off x="8958648" y="-525758"/>
-            <a:ext cx="3635054" cy="369332"/>
-          </a:xfrm>
-          <a:prstGeom prst="rect">
-            <a:avLst/>
-          </a:prstGeom>
-          <a:noFill/>
-        </p:spPr>
-        <p:txBody>
-          <a:bodyPr wrap="none" lIns="90000" rtlCol="0" anchor="t">
-            <a:spAutoFit/>
-          </a:bodyPr>
-          <a:lstStyle/>
-          <a:p>
-            <a:r>
-              <a:rPr lang="en-US" b="1"/>
-              <a:t>OBJECTIVES_ARCHITECTURE_CHART</a:t>
-            </a:r>
-            <a:endParaRPr lang="en-US"/>
-          </a:p>
-        </p:txBody>
-      </p:sp>
-      <p:sp>
-        <p:nvSpPr>
-          <p:cNvPr id="8" name="TextBox 7">
-            <a:extLst>
-              <a:ext uri="{FF2B5EF4-FFF2-40B4-BE49-F238E27FC236}">
-                <a16:creationId xmlns:a16="http://schemas.microsoft.com/office/drawing/2014/main" id="{79FE74E7-A4E7-D99A-A30E-92E30405FE49}"/>
-              </a:ext>
-            </a:extLst>
-          </p:cNvPr>
-          <p:cNvSpPr txBox="1"/>
-          <p:nvPr/>
-        </p:nvSpPr>
-        <p:spPr>
-          <a:xfrm>
-            <a:off x="2791143" y="6026120"/>
-            <a:ext cx="6609715" cy="353558"/>
-          </a:xfrm>
-          <a:prstGeom prst="rect">
-            <a:avLst/>
-          </a:prstGeom>
-          <a:noFill/>
-        </p:spPr>
-        <p:txBody>
-          <a:bodyPr wrap="none" lIns="90000" rtlCol="0" anchor="t">
-            <a:spAutoFit/>
-          </a:bodyPr>
-          <a:lstStyle/>
-          <a:p>
-            <a:pPr>
-              <a:lnSpc>
-                <a:spcPct val="113000"/>
-              </a:lnSpc>
-            </a:pPr>
-            <a:r>
-              <a:rPr lang="en-US" sz="1600" dirty="0" err="1">
-                <a:solidFill>
-                  <a:srgbClr val="0066FF"/>
-                </a:solidFill>
-              </a:rPr>
-              <a:t>⬤</a:t>
-            </a:r>
-            <a:r>
-              <a:rPr lang="en-US" sz="1600" dirty="0" err="1">
-                <a:solidFill>
-                  <a:schemeClr val="tx2"/>
-                </a:solidFill>
-              </a:rPr>
-              <a:t> Objective met    </a:t>
-            </a:r>
-            <a:r>
-              <a:rPr lang="en-US" sz="1600" dirty="0" err="1">
-                <a:solidFill>
-                  <a:srgbClr val="67E77F"/>
-                </a:solidFill>
-              </a:rPr>
-              <a:t>⬤</a:t>
-            </a:r>
-            <a:r>
-              <a:rPr lang="en-US" sz="1600" dirty="0" err="1">
-                <a:solidFill>
-                  <a:schemeClr val="tx2"/>
-                </a:solidFill>
-              </a:rPr>
-              <a:t> Improved    </a:t>
-            </a:r>
-            <a:r>
-              <a:rPr lang="en-US" sz="1600" dirty="0" err="1">
-                <a:solidFill>
-                  <a:srgbClr val="BFC4CF"/>
-                </a:solidFill>
-              </a:rPr>
-              <a:t>⬤</a:t>
-            </a:r>
-            <a:r>
-              <a:rPr lang="en-US" sz="1600" dirty="0" err="1">
-                <a:solidFill>
-                  <a:schemeClr val="tx2"/>
-                </a:solidFill>
-              </a:rPr>
-              <a:t> Unchanged    </a:t>
-            </a:r>
-            <a:r>
-              <a:rPr lang="en-US" sz="1600" dirty="0" err="1">
-                <a:solidFill>
-                  <a:srgbClr val="F06241"/>
-                </a:solidFill>
-              </a:rPr>
-              <a:t>⬤</a:t>
-            </a:r>
-            <a:r>
-              <a:rPr lang="en-US" sz="1600" dirty="0" err="1">
-                <a:solidFill>
-                  <a:schemeClr val="tx2"/>
-                </a:solidFill>
-              </a:rPr>
-              <a:t> Worsened    </a:t>
-            </a:r>
-            <a:r>
-              <a:rPr lang="en-US" sz="1600" dirty="0" err="1">
-                <a:solidFill>
-                  <a:schemeClr val="bg1"/>
-                </a:solidFill>
-              </a:rPr>
-              <a:t>⬤</a:t>
-            </a:r>
-            <a:r>
-              <a:rPr lang="en-US" sz="1600" dirty="0" err="1">
-                <a:solidFill>
-                  <a:schemeClr val="tx2"/>
-                </a:solidFill>
-              </a:rPr>
-              <a:t> Unknown</a:t>
-            </a:r>
-          </a:p>
-        </p:txBody>
-      </p:sp>
-      <p:sp>
-        <p:nvSpPr>
-          <p:cNvPr id="9" name="TextBox 8">
-            <a:extLst>
-              <a:ext uri="{FF2B5EF4-FFF2-40B4-BE49-F238E27FC236}">
-                <a16:creationId xmlns:a16="http://schemas.microsoft.com/office/drawing/2014/main" id="{A55E5897-263B-F75F-BB48-770410B9BCFB}"/>
-              </a:ext>
-            </a:extLst>
-          </p:cNvPr>
-          <p:cNvSpPr txBox="1"/>
-          <p:nvPr/>
-        </p:nvSpPr>
-        <p:spPr>
-          <a:xfrm>
-            <a:off x="470981" y="1293279"/>
-            <a:ext cx="1622452" cy="289503"/>
-          </a:xfrm>
-          <a:prstGeom prst="rect">
-            <a:avLst/>
-          </a:prstGeom>
-          <a:noFill/>
-        </p:spPr>
-        <p:txBody>
-          <a:bodyPr wrap="none" lIns="90000" rtlCol="0" anchor="t">
-            <a:spAutoFit/>
-          </a:bodyPr>
-          <a:lstStyle/>
-          <a:p>
-            <a:pPr algn="l">
-              <a:lnSpc>
-                <a:spcPct val="113000"/>
-              </a:lnSpc>
-            </a:pPr>
-            <a:r>
-              <a:rPr lang="en-US" sz="1200" dirty="0" err="1">
-                <a:solidFill>
-                  <a:schemeClr val="tx2"/>
-                </a:solidFill>
-              </a:rPr>
-              <a:t>Percentage of portfolio</a:t>
-            </a:r>
-          </a:p>
-        </p:txBody>
-      </p:sp>
-    </p:spTree>
-    <p:extLst>
-      <p:ext uri="{BB962C8B-B14F-4D97-AF65-F5344CB8AC3E}">
-        <p14:creationId xmlns:p14="http://schemas.microsoft.com/office/powerpoint/2010/main" val="261354089"/>
       </p:ext>
     </p:extLst>
   </p:cSld>

</xml_diff>